<commit_message>
fix typo and add outline
</commit_message>
<xml_diff>
--- a/SACC2014/SACC2014.pptx
+++ b/SACC2014/SACC2014.pptx
@@ -27,19 +27,20 @@
     <p:sldId id="278" r:id="rId21"/>
     <p:sldId id="280" r:id="rId22"/>
     <p:sldId id="281" r:id="rId23"/>
-    <p:sldId id="265" r:id="rId24"/>
-    <p:sldId id="266" r:id="rId25"/>
-    <p:sldId id="268" r:id="rId26"/>
-    <p:sldId id="269" r:id="rId27"/>
-    <p:sldId id="270" r:id="rId28"/>
-    <p:sldId id="271" r:id="rId29"/>
-    <p:sldId id="272" r:id="rId30"/>
-    <p:sldId id="273" r:id="rId31"/>
-    <p:sldId id="274" r:id="rId32"/>
-    <p:sldId id="275" r:id="rId33"/>
-    <p:sldId id="276" r:id="rId34"/>
-    <p:sldId id="283" r:id="rId35"/>
-    <p:sldId id="258" r:id="rId36"/>
+    <p:sldId id="285" r:id="rId24"/>
+    <p:sldId id="265" r:id="rId25"/>
+    <p:sldId id="266" r:id="rId26"/>
+    <p:sldId id="268" r:id="rId27"/>
+    <p:sldId id="269" r:id="rId28"/>
+    <p:sldId id="270" r:id="rId29"/>
+    <p:sldId id="271" r:id="rId30"/>
+    <p:sldId id="272" r:id="rId31"/>
+    <p:sldId id="273" r:id="rId32"/>
+    <p:sldId id="274" r:id="rId33"/>
+    <p:sldId id="275" r:id="rId34"/>
+    <p:sldId id="276" r:id="rId35"/>
+    <p:sldId id="283" r:id="rId36"/>
+    <p:sldId id="258" r:id="rId37"/>
   </p:sldIdLst>
   <p:sldSz cx="9144000" cy="6858000" type="screen4x3"/>
   <p:notesSz cx="6858000" cy="9144000"/>
@@ -140,7 +141,7 @@
   </p:defaultTextStyle>
   <p:extLst>
     <p:ext uri="{EFAFB233-063F-42B5-8137-9DF3F51BA10A}">
-      <p15:sldGuideLst xmlns:p15="http://schemas.microsoft.com/office/powerpoint/2012/main" xmlns="">
+      <p15:sldGuideLst xmlns="" xmlns:p15="http://schemas.microsoft.com/office/powerpoint/2012/main">
         <p15:guide id="1" orient="horz" pos="2160">
           <p15:clr>
             <a:srgbClr val="A4A3A4"/>
@@ -338,7 +339,7 @@
           <a:p>
             <a:fld id="{530820CF-B880-4189-942D-D702A7CBA730}" type="datetimeFigureOut">
               <a:rPr lang="zh-CN" altLang="en-US" smtClean="0"/>
-              <a:t>14-9-4</a:t>
+              <a:t>14-9-6</a:t>
             </a:fld>
             <a:endParaRPr lang="zh-CN" altLang="en-US"/>
           </a:p>
@@ -503,7 +504,7 @@
           <a:p>
             <a:fld id="{530820CF-B880-4189-942D-D702A7CBA730}" type="datetimeFigureOut">
               <a:rPr lang="zh-CN" altLang="en-US" smtClean="0"/>
-              <a:t>14-9-4</a:t>
+              <a:t>14-9-6</a:t>
             </a:fld>
             <a:endParaRPr lang="zh-CN" altLang="en-US"/>
           </a:p>
@@ -678,7 +679,7 @@
           <a:p>
             <a:fld id="{530820CF-B880-4189-942D-D702A7CBA730}" type="datetimeFigureOut">
               <a:rPr lang="zh-CN" altLang="en-US" smtClean="0"/>
-              <a:t>14-9-4</a:t>
+              <a:t>14-9-6</a:t>
             </a:fld>
             <a:endParaRPr lang="zh-CN" altLang="en-US"/>
           </a:p>
@@ -924,7 +925,7 @@
                 <a:ea typeface="宋体"/>
               </a:rPr>
               <a:pPr/>
-              <a:t>14-9-4</a:t>
+              <a:t>14-9-6</a:t>
             </a:fld>
             <a:endParaRPr lang="zh-CN" altLang="en-US">
               <a:solidFill>
@@ -1136,7 +1137,7 @@
                 <a:ea typeface="宋体"/>
               </a:rPr>
               <a:pPr/>
-              <a:t>14-9-4</a:t>
+              <a:t>14-9-6</a:t>
             </a:fld>
             <a:endParaRPr lang="zh-CN" altLang="en-US">
               <a:solidFill>
@@ -1424,7 +1425,7 @@
                 <a:ea typeface="宋体"/>
               </a:rPr>
               <a:pPr/>
-              <a:t>14-9-4</a:t>
+              <a:t>14-9-6</a:t>
             </a:fld>
             <a:endParaRPr lang="zh-CN" altLang="en-US">
               <a:solidFill>
@@ -1754,7 +1755,7 @@
                 <a:ea typeface="宋体"/>
               </a:rPr>
               <a:pPr/>
-              <a:t>14-9-4</a:t>
+              <a:t>14-9-6</a:t>
             </a:fld>
             <a:endParaRPr lang="zh-CN" altLang="en-US">
               <a:solidFill>
@@ -2218,7 +2219,7 @@
                 <a:ea typeface="宋体"/>
               </a:rPr>
               <a:pPr/>
-              <a:t>14-9-4</a:t>
+              <a:t>14-9-6</a:t>
             </a:fld>
             <a:endParaRPr lang="zh-CN" altLang="en-US">
               <a:solidFill>
@@ -2378,7 +2379,7 @@
                 <a:ea typeface="宋体"/>
               </a:rPr>
               <a:pPr/>
-              <a:t>14-9-4</a:t>
+              <a:t>14-9-6</a:t>
             </a:fld>
             <a:endParaRPr lang="zh-CN" altLang="en-US">
               <a:solidFill>
@@ -2515,7 +2516,7 @@
                 <a:ea typeface="宋体"/>
               </a:rPr>
               <a:pPr/>
-              <a:t>14-9-4</a:t>
+              <a:t>14-9-6</a:t>
             </a:fld>
             <a:endParaRPr lang="zh-CN" altLang="en-US">
               <a:solidFill>
@@ -2834,7 +2835,7 @@
                 <a:ea typeface="宋体"/>
               </a:rPr>
               <a:pPr/>
-              <a:t>14-9-4</a:t>
+              <a:t>14-9-6</a:t>
             </a:fld>
             <a:endParaRPr lang="zh-CN" altLang="en-US">
               <a:solidFill>
@@ -3037,7 +3038,7 @@
           <a:p>
             <a:fld id="{530820CF-B880-4189-942D-D702A7CBA730}" type="datetimeFigureOut">
               <a:rPr lang="zh-CN" altLang="en-US" smtClean="0"/>
-              <a:t>14-9-4</a:t>
+              <a:t>14-9-6</a:t>
             </a:fld>
             <a:endParaRPr lang="zh-CN" altLang="en-US"/>
           </a:p>
@@ -3294,7 +3295,7 @@
                 <a:ea typeface="宋体"/>
               </a:rPr>
               <a:pPr/>
-              <a:t>14-9-4</a:t>
+              <a:t>14-9-6</a:t>
             </a:fld>
             <a:endParaRPr lang="zh-CN" altLang="en-US">
               <a:solidFill>
@@ -3506,7 +3507,7 @@
                 <a:ea typeface="宋体"/>
               </a:rPr>
               <a:pPr/>
-              <a:t>14-9-4</a:t>
+              <a:t>14-9-6</a:t>
             </a:fld>
             <a:endParaRPr lang="zh-CN" altLang="en-US">
               <a:solidFill>
@@ -3728,7 +3729,7 @@
                 <a:ea typeface="宋体"/>
               </a:rPr>
               <a:pPr/>
-              <a:t>14-9-4</a:t>
+              <a:t>14-9-6</a:t>
             </a:fld>
             <a:endParaRPr lang="zh-CN" altLang="en-US">
               <a:solidFill>
@@ -4012,7 +4013,7 @@
                 <a:ea typeface="宋体"/>
               </a:rPr>
               <a:pPr/>
-              <a:t>14-9-4</a:t>
+              <a:t>14-9-6</a:t>
             </a:fld>
             <a:endParaRPr lang="zh-CN" altLang="en-US">
               <a:solidFill>
@@ -4224,7 +4225,7 @@
                 <a:ea typeface="宋体"/>
               </a:rPr>
               <a:pPr/>
-              <a:t>14-9-4</a:t>
+              <a:t>14-9-6</a:t>
             </a:fld>
             <a:endParaRPr lang="zh-CN" altLang="en-US">
               <a:solidFill>
@@ -4512,7 +4513,7 @@
                 <a:ea typeface="宋体"/>
               </a:rPr>
               <a:pPr/>
-              <a:t>14-9-4</a:t>
+              <a:t>14-9-6</a:t>
             </a:fld>
             <a:endParaRPr lang="zh-CN" altLang="en-US">
               <a:solidFill>
@@ -4842,7 +4843,7 @@
                 <a:ea typeface="宋体"/>
               </a:rPr>
               <a:pPr/>
-              <a:t>14-9-4</a:t>
+              <a:t>14-9-6</a:t>
             </a:fld>
             <a:endParaRPr lang="zh-CN" altLang="en-US">
               <a:solidFill>
@@ -5306,7 +5307,7 @@
                 <a:ea typeface="宋体"/>
               </a:rPr>
               <a:pPr/>
-              <a:t>14-9-4</a:t>
+              <a:t>14-9-6</a:t>
             </a:fld>
             <a:endParaRPr lang="zh-CN" altLang="en-US">
               <a:solidFill>
@@ -5466,7 +5467,7 @@
                 <a:ea typeface="宋体"/>
               </a:rPr>
               <a:pPr/>
-              <a:t>14-9-4</a:t>
+              <a:t>14-9-6</a:t>
             </a:fld>
             <a:endParaRPr lang="zh-CN" altLang="en-US">
               <a:solidFill>
@@ -5603,7 +5604,7 @@
                 <a:ea typeface="宋体"/>
               </a:rPr>
               <a:pPr/>
-              <a:t>14-9-4</a:t>
+              <a:t>14-9-6</a:t>
             </a:fld>
             <a:endParaRPr lang="zh-CN" altLang="en-US">
               <a:solidFill>
@@ -5882,7 +5883,7 @@
           <a:p>
             <a:fld id="{530820CF-B880-4189-942D-D702A7CBA730}" type="datetimeFigureOut">
               <a:rPr lang="zh-CN" altLang="en-US" smtClean="0"/>
-              <a:t>14-9-4</a:t>
+              <a:t>14-9-6</a:t>
             </a:fld>
             <a:endParaRPr lang="zh-CN" altLang="en-US"/>
           </a:p>
@@ -6163,7 +6164,7 @@
                 <a:ea typeface="宋体"/>
               </a:rPr>
               <a:pPr/>
-              <a:t>14-9-4</a:t>
+              <a:t>14-9-6</a:t>
             </a:fld>
             <a:endParaRPr lang="zh-CN" altLang="en-US">
               <a:solidFill>
@@ -6458,7 +6459,7 @@
                 <a:ea typeface="宋体"/>
               </a:rPr>
               <a:pPr/>
-              <a:t>14-9-4</a:t>
+              <a:t>14-9-6</a:t>
             </a:fld>
             <a:endParaRPr lang="zh-CN" altLang="en-US">
               <a:solidFill>
@@ -6670,7 +6671,7 @@
                 <a:ea typeface="宋体"/>
               </a:rPr>
               <a:pPr/>
-              <a:t>14-9-4</a:t>
+              <a:t>14-9-6</a:t>
             </a:fld>
             <a:endParaRPr lang="zh-CN" altLang="en-US">
               <a:solidFill>
@@ -6892,7 +6893,7 @@
                 <a:ea typeface="宋体"/>
               </a:rPr>
               <a:pPr/>
-              <a:t>14-9-4</a:t>
+              <a:t>14-9-6</a:t>
             </a:fld>
             <a:endParaRPr lang="zh-CN" altLang="en-US">
               <a:solidFill>
@@ -7176,7 +7177,7 @@
                 <a:ea typeface="宋体"/>
               </a:rPr>
               <a:pPr/>
-              <a:t>14-9-4</a:t>
+              <a:t>14-9-6</a:t>
             </a:fld>
             <a:endParaRPr lang="zh-CN" altLang="en-US">
               <a:solidFill>
@@ -7388,7 +7389,7 @@
                 <a:ea typeface="宋体"/>
               </a:rPr>
               <a:pPr/>
-              <a:t>14-9-4</a:t>
+              <a:t>14-9-6</a:t>
             </a:fld>
             <a:endParaRPr lang="zh-CN" altLang="en-US">
               <a:solidFill>
@@ -7676,7 +7677,7 @@
                 <a:ea typeface="宋体"/>
               </a:rPr>
               <a:pPr/>
-              <a:t>14-9-4</a:t>
+              <a:t>14-9-6</a:t>
             </a:fld>
             <a:endParaRPr lang="zh-CN" altLang="en-US">
               <a:solidFill>
@@ -8006,7 +8007,7 @@
                 <a:ea typeface="宋体"/>
               </a:rPr>
               <a:pPr/>
-              <a:t>14-9-4</a:t>
+              <a:t>14-9-6</a:t>
             </a:fld>
             <a:endParaRPr lang="zh-CN" altLang="en-US">
               <a:solidFill>
@@ -8470,7 +8471,7 @@
                 <a:ea typeface="宋体"/>
               </a:rPr>
               <a:pPr/>
-              <a:t>14-9-4</a:t>
+              <a:t>14-9-6</a:t>
             </a:fld>
             <a:endParaRPr lang="zh-CN" altLang="en-US">
               <a:solidFill>
@@ -8630,7 +8631,7 @@
                 <a:ea typeface="宋体"/>
               </a:rPr>
               <a:pPr/>
-              <a:t>14-9-4</a:t>
+              <a:t>14-9-6</a:t>
             </a:fld>
             <a:endParaRPr lang="zh-CN" altLang="en-US">
               <a:solidFill>
@@ -8951,7 +8952,7 @@
           <a:p>
             <a:fld id="{530820CF-B880-4189-942D-D702A7CBA730}" type="datetimeFigureOut">
               <a:rPr lang="zh-CN" altLang="en-US" smtClean="0"/>
-              <a:t>14-9-4</a:t>
+              <a:t>14-9-6</a:t>
             </a:fld>
             <a:endParaRPr lang="zh-CN" altLang="en-US"/>
           </a:p>
@@ -9050,7 +9051,7 @@
                 <a:ea typeface="宋体"/>
               </a:rPr>
               <a:pPr/>
-              <a:t>14-9-4</a:t>
+              <a:t>14-9-6</a:t>
             </a:fld>
             <a:endParaRPr lang="zh-CN" altLang="en-US">
               <a:solidFill>
@@ -9369,7 +9370,7 @@
                 <a:ea typeface="宋体"/>
               </a:rPr>
               <a:pPr/>
-              <a:t>14-9-4</a:t>
+              <a:t>14-9-6</a:t>
             </a:fld>
             <a:endParaRPr lang="zh-CN" altLang="en-US">
               <a:solidFill>
@@ -9664,7 +9665,7 @@
                 <a:ea typeface="宋体"/>
               </a:rPr>
               <a:pPr/>
-              <a:t>14-9-4</a:t>
+              <a:t>14-9-6</a:t>
             </a:fld>
             <a:endParaRPr lang="zh-CN" altLang="en-US">
               <a:solidFill>
@@ -9876,7 +9877,7 @@
                 <a:ea typeface="宋体"/>
               </a:rPr>
               <a:pPr/>
-              <a:t>14-9-4</a:t>
+              <a:t>14-9-6</a:t>
             </a:fld>
             <a:endParaRPr lang="zh-CN" altLang="en-US">
               <a:solidFill>
@@ -10098,7 +10099,7 @@
                 <a:ea typeface="宋体"/>
               </a:rPr>
               <a:pPr/>
-              <a:t>14-9-4</a:t>
+              <a:t>14-9-6</a:t>
             </a:fld>
             <a:endParaRPr lang="zh-CN" altLang="en-US">
               <a:solidFill>
@@ -10382,7 +10383,7 @@
                 <a:ea typeface="宋体"/>
               </a:rPr>
               <a:pPr/>
-              <a:t>14-9-4</a:t>
+              <a:t>14-9-6</a:t>
             </a:fld>
             <a:endParaRPr lang="zh-CN" altLang="en-US">
               <a:solidFill>
@@ -10594,7 +10595,7 @@
                 <a:ea typeface="宋体"/>
               </a:rPr>
               <a:pPr/>
-              <a:t>14-9-4</a:t>
+              <a:t>14-9-6</a:t>
             </a:fld>
             <a:endParaRPr lang="zh-CN" altLang="en-US">
               <a:solidFill>
@@ -10882,7 +10883,7 @@
                 <a:ea typeface="宋体"/>
               </a:rPr>
               <a:pPr/>
-              <a:t>14-9-4</a:t>
+              <a:t>14-9-6</a:t>
             </a:fld>
             <a:endParaRPr lang="zh-CN" altLang="en-US">
               <a:solidFill>
@@ -11212,7 +11213,7 @@
                 <a:ea typeface="宋体"/>
               </a:rPr>
               <a:pPr/>
-              <a:t>14-9-4</a:t>
+              <a:t>14-9-6</a:t>
             </a:fld>
             <a:endParaRPr lang="zh-CN" altLang="en-US">
               <a:solidFill>
@@ -11676,7 +11677,7 @@
                 <a:ea typeface="宋体"/>
               </a:rPr>
               <a:pPr/>
-              <a:t>14-9-4</a:t>
+              <a:t>14-9-6</a:t>
             </a:fld>
             <a:endParaRPr lang="zh-CN" altLang="en-US">
               <a:solidFill>
@@ -12131,7 +12132,7 @@
           <a:p>
             <a:fld id="{530820CF-B880-4189-942D-D702A7CBA730}" type="datetimeFigureOut">
               <a:rPr lang="zh-CN" altLang="en-US" smtClean="0"/>
-              <a:t>14-9-4</a:t>
+              <a:t>14-9-6</a:t>
             </a:fld>
             <a:endParaRPr lang="zh-CN" altLang="en-US"/>
           </a:p>
@@ -12253,7 +12254,7 @@
                 <a:ea typeface="宋体"/>
               </a:rPr>
               <a:pPr/>
-              <a:t>14-9-4</a:t>
+              <a:t>14-9-6</a:t>
             </a:fld>
             <a:endParaRPr lang="zh-CN" altLang="en-US">
               <a:solidFill>
@@ -12390,7 +12391,7 @@
                 <a:ea typeface="宋体"/>
               </a:rPr>
               <a:pPr/>
-              <a:t>14-9-4</a:t>
+              <a:t>14-9-6</a:t>
             </a:fld>
             <a:endParaRPr lang="zh-CN" altLang="en-US">
               <a:solidFill>
@@ -12709,7 +12710,7 @@
                 <a:ea typeface="宋体"/>
               </a:rPr>
               <a:pPr/>
-              <a:t>14-9-4</a:t>
+              <a:t>14-9-6</a:t>
             </a:fld>
             <a:endParaRPr lang="zh-CN" altLang="en-US">
               <a:solidFill>
@@ -13004,7 +13005,7 @@
                 <a:ea typeface="宋体"/>
               </a:rPr>
               <a:pPr/>
-              <a:t>14-9-4</a:t>
+              <a:t>14-9-6</a:t>
             </a:fld>
             <a:endParaRPr lang="zh-CN" altLang="en-US">
               <a:solidFill>
@@ -13216,7 +13217,7 @@
                 <a:ea typeface="宋体"/>
               </a:rPr>
               <a:pPr/>
-              <a:t>14-9-4</a:t>
+              <a:t>14-9-6</a:t>
             </a:fld>
             <a:endParaRPr lang="zh-CN" altLang="en-US">
               <a:solidFill>
@@ -13438,7 +13439,7 @@
                 <a:ea typeface="宋体"/>
               </a:rPr>
               <a:pPr/>
-              <a:t>14-9-4</a:t>
+              <a:t>14-9-6</a:t>
             </a:fld>
             <a:endParaRPr lang="zh-CN" altLang="en-US">
               <a:solidFill>
@@ -13722,7 +13723,7 @@
                 <a:ea typeface="宋体"/>
               </a:rPr>
               <a:pPr/>
-              <a:t>14-9-4</a:t>
+              <a:t>14-9-6</a:t>
             </a:fld>
             <a:endParaRPr lang="zh-CN" altLang="en-US">
               <a:solidFill>
@@ -13934,7 +13935,7 @@
                 <a:ea typeface="宋体"/>
               </a:rPr>
               <a:pPr/>
-              <a:t>14-9-4</a:t>
+              <a:t>14-9-6</a:t>
             </a:fld>
             <a:endParaRPr lang="zh-CN" altLang="en-US">
               <a:solidFill>
@@ -14222,7 +14223,7 @@
                 <a:ea typeface="宋体"/>
               </a:rPr>
               <a:pPr/>
-              <a:t>14-9-4</a:t>
+              <a:t>14-9-6</a:t>
             </a:fld>
             <a:endParaRPr lang="zh-CN" altLang="en-US">
               <a:solidFill>
@@ -14552,7 +14553,7 @@
                 <a:ea typeface="宋体"/>
               </a:rPr>
               <a:pPr/>
-              <a:t>14-9-4</a:t>
+              <a:t>14-9-6</a:t>
             </a:fld>
             <a:endParaRPr lang="zh-CN" altLang="en-US">
               <a:solidFill>
@@ -14703,7 +14704,7 @@
           <a:p>
             <a:fld id="{530820CF-B880-4189-942D-D702A7CBA730}" type="datetimeFigureOut">
               <a:rPr lang="zh-CN" altLang="en-US" smtClean="0"/>
-              <a:t>14-9-4</a:t>
+              <a:t>14-9-6</a:t>
             </a:fld>
             <a:endParaRPr lang="zh-CN" altLang="en-US"/>
           </a:p>
@@ -15129,7 +15130,7 @@
                 <a:ea typeface="宋体"/>
               </a:rPr>
               <a:pPr/>
-              <a:t>14-9-4</a:t>
+              <a:t>14-9-6</a:t>
             </a:fld>
             <a:endParaRPr lang="zh-CN" altLang="en-US">
               <a:solidFill>
@@ -15289,7 +15290,7 @@
                 <a:ea typeface="宋体"/>
               </a:rPr>
               <a:pPr/>
-              <a:t>14-9-4</a:t>
+              <a:t>14-9-6</a:t>
             </a:fld>
             <a:endParaRPr lang="zh-CN" altLang="en-US">
               <a:solidFill>
@@ -15426,7 +15427,7 @@
                 <a:ea typeface="宋体"/>
               </a:rPr>
               <a:pPr/>
-              <a:t>14-9-4</a:t>
+              <a:t>14-9-6</a:t>
             </a:fld>
             <a:endParaRPr lang="zh-CN" altLang="en-US">
               <a:solidFill>
@@ -15745,7 +15746,7 @@
                 <a:ea typeface="宋体"/>
               </a:rPr>
               <a:pPr/>
-              <a:t>14-9-4</a:t>
+              <a:t>14-9-6</a:t>
             </a:fld>
             <a:endParaRPr lang="zh-CN" altLang="en-US">
               <a:solidFill>
@@ -16040,7 +16041,7 @@
                 <a:ea typeface="宋体"/>
               </a:rPr>
               <a:pPr/>
-              <a:t>14-9-4</a:t>
+              <a:t>14-9-6</a:t>
             </a:fld>
             <a:endParaRPr lang="zh-CN" altLang="en-US">
               <a:solidFill>
@@ -16252,7 +16253,7 @@
                 <a:ea typeface="宋体"/>
               </a:rPr>
               <a:pPr/>
-              <a:t>14-9-4</a:t>
+              <a:t>14-9-6</a:t>
             </a:fld>
             <a:endParaRPr lang="zh-CN" altLang="en-US">
               <a:solidFill>
@@ -16474,7 +16475,7 @@
                 <a:ea typeface="宋体"/>
               </a:rPr>
               <a:pPr/>
-              <a:t>14-9-4</a:t>
+              <a:t>14-9-6</a:t>
             </a:fld>
             <a:endParaRPr lang="zh-CN" altLang="en-US">
               <a:solidFill>
@@ -16758,7 +16759,7 @@
                 <a:ea typeface="宋体"/>
               </a:rPr>
               <a:pPr/>
-              <a:t>14-9-4</a:t>
+              <a:t>14-9-6</a:t>
             </a:fld>
             <a:endParaRPr lang="zh-CN" altLang="en-US">
               <a:solidFill>
@@ -16970,7 +16971,7 @@
                 <a:ea typeface="宋体"/>
               </a:rPr>
               <a:pPr/>
-              <a:t>14-9-4</a:t>
+              <a:t>14-9-6</a:t>
             </a:fld>
             <a:endParaRPr lang="zh-CN" altLang="en-US">
               <a:solidFill>
@@ -17258,7 +17259,7 @@
                 <a:ea typeface="宋体"/>
               </a:rPr>
               <a:pPr/>
-              <a:t>14-9-4</a:t>
+              <a:t>14-9-6</a:t>
             </a:fld>
             <a:endParaRPr lang="zh-CN" altLang="en-US">
               <a:solidFill>
@@ -17386,7 +17387,7 @@
           <a:p>
             <a:fld id="{530820CF-B880-4189-942D-D702A7CBA730}" type="datetimeFigureOut">
               <a:rPr lang="zh-CN" altLang="en-US" smtClean="0"/>
-              <a:t>14-9-4</a:t>
+              <a:t>14-9-6</a:t>
             </a:fld>
             <a:endParaRPr lang="zh-CN" altLang="en-US"/>
           </a:p>
@@ -17678,7 +17679,7 @@
                 <a:ea typeface="宋体"/>
               </a:rPr>
               <a:pPr/>
-              <a:t>14-9-4</a:t>
+              <a:t>14-9-6</a:t>
             </a:fld>
             <a:endParaRPr lang="zh-CN" altLang="en-US">
               <a:solidFill>
@@ -18142,7 +18143,7 @@
                 <a:ea typeface="宋体"/>
               </a:rPr>
               <a:pPr/>
-              <a:t>14-9-4</a:t>
+              <a:t>14-9-6</a:t>
             </a:fld>
             <a:endParaRPr lang="zh-CN" altLang="en-US">
               <a:solidFill>
@@ -18302,7 +18303,7 @@
                 <a:ea typeface="宋体"/>
               </a:rPr>
               <a:pPr/>
-              <a:t>14-9-4</a:t>
+              <a:t>14-9-6</a:t>
             </a:fld>
             <a:endParaRPr lang="zh-CN" altLang="en-US">
               <a:solidFill>
@@ -18439,7 +18440,7 @@
                 <a:ea typeface="宋体"/>
               </a:rPr>
               <a:pPr/>
-              <a:t>14-9-4</a:t>
+              <a:t>14-9-6</a:t>
             </a:fld>
             <a:endParaRPr lang="zh-CN" altLang="en-US">
               <a:solidFill>
@@ -18758,7 +18759,7 @@
                 <a:ea typeface="宋体"/>
               </a:rPr>
               <a:pPr/>
-              <a:t>14-9-4</a:t>
+              <a:t>14-9-6</a:t>
             </a:fld>
             <a:endParaRPr lang="zh-CN" altLang="en-US">
               <a:solidFill>
@@ -19053,7 +19054,7 @@
                 <a:ea typeface="宋体"/>
               </a:rPr>
               <a:pPr/>
-              <a:t>14-9-4</a:t>
+              <a:t>14-9-6</a:t>
             </a:fld>
             <a:endParaRPr lang="zh-CN" altLang="en-US">
               <a:solidFill>
@@ -19265,7 +19266,7 @@
                 <a:ea typeface="宋体"/>
               </a:rPr>
               <a:pPr/>
-              <a:t>14-9-4</a:t>
+              <a:t>14-9-6</a:t>
             </a:fld>
             <a:endParaRPr lang="zh-CN" altLang="en-US">
               <a:solidFill>
@@ -19487,7 +19488,7 @@
                 <a:ea typeface="宋体"/>
               </a:rPr>
               <a:pPr/>
-              <a:t>14-9-4</a:t>
+              <a:t>14-9-6</a:t>
             </a:fld>
             <a:endParaRPr lang="zh-CN" altLang="en-US">
               <a:solidFill>
@@ -19771,7 +19772,7 @@
                 <a:ea typeface="宋体"/>
               </a:rPr>
               <a:pPr/>
-              <a:t>14-9-4</a:t>
+              <a:t>14-9-6</a:t>
             </a:fld>
             <a:endParaRPr lang="zh-CN" altLang="en-US">
               <a:solidFill>
@@ -19983,7 +19984,7 @@
                 <a:ea typeface="宋体"/>
               </a:rPr>
               <a:pPr/>
-              <a:t>14-9-4</a:t>
+              <a:t>14-9-6</a:t>
             </a:fld>
             <a:endParaRPr lang="zh-CN" altLang="en-US">
               <a:solidFill>
@@ -20293,7 +20294,7 @@
           <a:p>
             <a:fld id="{530820CF-B880-4189-942D-D702A7CBA730}" type="datetimeFigureOut">
               <a:rPr lang="zh-CN" altLang="en-US" smtClean="0"/>
-              <a:t>14-9-4</a:t>
+              <a:t>14-9-6</a:t>
             </a:fld>
             <a:endParaRPr lang="zh-CN" altLang="en-US"/>
           </a:p>
@@ -20543,7 +20544,7 @@
                 <a:ea typeface="宋体"/>
               </a:rPr>
               <a:pPr/>
-              <a:t>14-9-4</a:t>
+              <a:t>14-9-6</a:t>
             </a:fld>
             <a:endParaRPr lang="zh-CN" altLang="en-US">
               <a:solidFill>
@@ -20873,7 +20874,7 @@
                 <a:ea typeface="宋体"/>
               </a:rPr>
               <a:pPr/>
-              <a:t>14-9-4</a:t>
+              <a:t>14-9-6</a:t>
             </a:fld>
             <a:endParaRPr lang="zh-CN" altLang="en-US">
               <a:solidFill>
@@ -21337,7 +21338,7 @@
                 <a:ea typeface="宋体"/>
               </a:rPr>
               <a:pPr/>
-              <a:t>14-9-4</a:t>
+              <a:t>14-9-6</a:t>
             </a:fld>
             <a:endParaRPr lang="zh-CN" altLang="en-US">
               <a:solidFill>
@@ -21497,7 +21498,7 @@
                 <a:ea typeface="宋体"/>
               </a:rPr>
               <a:pPr/>
-              <a:t>14-9-4</a:t>
+              <a:t>14-9-6</a:t>
             </a:fld>
             <a:endParaRPr lang="zh-CN" altLang="en-US">
               <a:solidFill>
@@ -21634,7 +21635,7 @@
                 <a:ea typeface="宋体"/>
               </a:rPr>
               <a:pPr/>
-              <a:t>14-9-4</a:t>
+              <a:t>14-9-6</a:t>
             </a:fld>
             <a:endParaRPr lang="zh-CN" altLang="en-US">
               <a:solidFill>
@@ -21953,7 +21954,7 @@
                 <a:ea typeface="宋体"/>
               </a:rPr>
               <a:pPr/>
-              <a:t>14-9-4</a:t>
+              <a:t>14-9-6</a:t>
             </a:fld>
             <a:endParaRPr lang="zh-CN" altLang="en-US">
               <a:solidFill>
@@ -22248,7 +22249,7 @@
                 <a:ea typeface="宋体"/>
               </a:rPr>
               <a:pPr/>
-              <a:t>14-9-4</a:t>
+              <a:t>14-9-6</a:t>
             </a:fld>
             <a:endParaRPr lang="zh-CN" altLang="en-US">
               <a:solidFill>
@@ -22460,7 +22461,7 @@
                 <a:ea typeface="宋体"/>
               </a:rPr>
               <a:pPr/>
-              <a:t>14-9-4</a:t>
+              <a:t>14-9-6</a:t>
             </a:fld>
             <a:endParaRPr lang="zh-CN" altLang="en-US">
               <a:solidFill>
@@ -22682,7 +22683,7 @@
                 <a:ea typeface="宋体"/>
               </a:rPr>
               <a:pPr/>
-              <a:t>14-9-4</a:t>
+              <a:t>14-9-6</a:t>
             </a:fld>
             <a:endParaRPr lang="zh-CN" altLang="en-US">
               <a:solidFill>
@@ -22966,7 +22967,7 @@
                 <a:ea typeface="宋体"/>
               </a:rPr>
               <a:pPr/>
-              <a:t>14-9-4</a:t>
+              <a:t>14-9-6</a:t>
             </a:fld>
             <a:endParaRPr lang="zh-CN" altLang="en-US">
               <a:solidFill>
@@ -23252,7 +23253,7 @@
           <a:p>
             <a:fld id="{530820CF-B880-4189-942D-D702A7CBA730}" type="datetimeFigureOut">
               <a:rPr lang="zh-CN" altLang="en-US" smtClean="0"/>
-              <a:t>14-9-4</a:t>
+              <a:t>14-9-6</a:t>
             </a:fld>
             <a:endParaRPr lang="zh-CN" altLang="en-US"/>
           </a:p>
@@ -23426,7 +23427,7 @@
                 <a:ea typeface="宋体"/>
               </a:rPr>
               <a:pPr/>
-              <a:t>14-9-4</a:t>
+              <a:t>14-9-6</a:t>
             </a:fld>
             <a:endParaRPr lang="zh-CN" altLang="en-US">
               <a:solidFill>
@@ -23714,7 +23715,7 @@
                 <a:ea typeface="宋体"/>
               </a:rPr>
               <a:pPr/>
-              <a:t>14-9-4</a:t>
+              <a:t>14-9-6</a:t>
             </a:fld>
             <a:endParaRPr lang="zh-CN" altLang="en-US">
               <a:solidFill>
@@ -24044,7 +24045,7 @@
                 <a:ea typeface="宋体"/>
               </a:rPr>
               <a:pPr/>
-              <a:t>14-9-4</a:t>
+              <a:t>14-9-6</a:t>
             </a:fld>
             <a:endParaRPr lang="zh-CN" altLang="en-US">
               <a:solidFill>
@@ -24508,7 +24509,7 @@
                 <a:ea typeface="宋体"/>
               </a:rPr>
               <a:pPr/>
-              <a:t>14-9-4</a:t>
+              <a:t>14-9-6</a:t>
             </a:fld>
             <a:endParaRPr lang="zh-CN" altLang="en-US">
               <a:solidFill>
@@ -24668,7 +24669,7 @@
                 <a:ea typeface="宋体"/>
               </a:rPr>
               <a:pPr/>
-              <a:t>14-9-4</a:t>
+              <a:t>14-9-6</a:t>
             </a:fld>
             <a:endParaRPr lang="zh-CN" altLang="en-US">
               <a:solidFill>
@@ -24805,7 +24806,7 @@
                 <a:ea typeface="宋体"/>
               </a:rPr>
               <a:pPr/>
-              <a:t>14-9-4</a:t>
+              <a:t>14-9-6</a:t>
             </a:fld>
             <a:endParaRPr lang="zh-CN" altLang="en-US">
               <a:solidFill>
@@ -25124,7 +25125,7 @@
                 <a:ea typeface="宋体"/>
               </a:rPr>
               <a:pPr/>
-              <a:t>14-9-4</a:t>
+              <a:t>14-9-6</a:t>
             </a:fld>
             <a:endParaRPr lang="zh-CN" altLang="en-US">
               <a:solidFill>
@@ -25419,7 +25420,7 @@
                 <a:ea typeface="宋体"/>
               </a:rPr>
               <a:pPr/>
-              <a:t>14-9-4</a:t>
+              <a:t>14-9-6</a:t>
             </a:fld>
             <a:endParaRPr lang="zh-CN" altLang="en-US">
               <a:solidFill>
@@ -25631,7 +25632,7 @@
                 <a:ea typeface="宋体"/>
               </a:rPr>
               <a:pPr/>
-              <a:t>14-9-4</a:t>
+              <a:t>14-9-6</a:t>
             </a:fld>
             <a:endParaRPr lang="zh-CN" altLang="en-US">
               <a:solidFill>
@@ -25853,7 +25854,7 @@
                 <a:ea typeface="宋体"/>
               </a:rPr>
               <a:pPr/>
-              <a:t>14-9-4</a:t>
+              <a:t>14-9-6</a:t>
             </a:fld>
             <a:endParaRPr lang="zh-CN" altLang="en-US">
               <a:solidFill>
@@ -26099,7 +26100,7 @@
           <a:p>
             <a:fld id="{530820CF-B880-4189-942D-D702A7CBA730}" type="datetimeFigureOut">
               <a:rPr lang="zh-CN" altLang="en-US" smtClean="0"/>
-              <a:t>14-9-4</a:t>
+              <a:t>14-9-6</a:t>
             </a:fld>
             <a:endParaRPr lang="zh-CN" altLang="en-US"/>
           </a:p>
@@ -26613,7 +26614,7 @@
                 <a:ea typeface="宋体"/>
               </a:rPr>
               <a:pPr/>
-              <a:t>14-9-4</a:t>
+              <a:t>14-9-6</a:t>
             </a:fld>
             <a:endParaRPr lang="zh-CN" altLang="en-US">
               <a:solidFill>
@@ -27165,7 +27166,7 @@
                 <a:ea typeface="宋体"/>
               </a:rPr>
               <a:pPr/>
-              <a:t>14-9-4</a:t>
+              <a:t>14-9-6</a:t>
             </a:fld>
             <a:endParaRPr lang="zh-CN" altLang="en-US">
               <a:solidFill>
@@ -27717,7 +27718,7 @@
                 <a:ea typeface="宋体"/>
               </a:rPr>
               <a:pPr/>
-              <a:t>14-9-4</a:t>
+              <a:t>14-9-6</a:t>
             </a:fld>
             <a:endParaRPr lang="zh-CN" altLang="en-US">
               <a:solidFill>
@@ -28269,7 +28270,7 @@
                 <a:ea typeface="宋体"/>
               </a:rPr>
               <a:pPr/>
-              <a:t>14-9-4</a:t>
+              <a:t>14-9-6</a:t>
             </a:fld>
             <a:endParaRPr lang="zh-CN" altLang="en-US">
               <a:solidFill>
@@ -28821,7 +28822,7 @@
                 <a:ea typeface="宋体"/>
               </a:rPr>
               <a:pPr/>
-              <a:t>14-9-4</a:t>
+              <a:t>14-9-6</a:t>
             </a:fld>
             <a:endParaRPr lang="zh-CN" altLang="en-US">
               <a:solidFill>
@@ -29373,7 +29374,7 @@
                 <a:ea typeface="宋体"/>
               </a:rPr>
               <a:pPr/>
-              <a:t>14-9-4</a:t>
+              <a:t>14-9-6</a:t>
             </a:fld>
             <a:endParaRPr lang="zh-CN" altLang="en-US">
               <a:solidFill>
@@ -29925,7 +29926,7 @@
                 <a:ea typeface="宋体"/>
               </a:rPr>
               <a:pPr/>
-              <a:t>14-9-4</a:t>
+              <a:t>14-9-6</a:t>
             </a:fld>
             <a:endParaRPr lang="zh-CN" altLang="en-US">
               <a:solidFill>
@@ -30477,7 +30478,7 @@
                 <a:ea typeface="宋体"/>
               </a:rPr>
               <a:pPr/>
-              <a:t>14-9-4</a:t>
+              <a:t>14-9-6</a:t>
             </a:fld>
             <a:endParaRPr lang="zh-CN" altLang="en-US">
               <a:solidFill>
@@ -32124,7 +32125,11 @@
           <a:p>
             <a:r>
               <a:rPr lang="en-US" altLang="zh-CN" dirty="0" smtClean="0"/>
-              <a:t>shuffle</a:t>
+              <a:t>S</a:t>
+            </a:r>
+            <a:r>
+              <a:rPr lang="en-US" altLang="zh-CN" dirty="0" smtClean="0"/>
+              <a:t>huffle</a:t>
             </a:r>
             <a:endParaRPr lang="zh-CN" altLang="en-US" dirty="0"/>
           </a:p>
@@ -32371,6 +32376,281 @@
 </file>
 
 <file path=ppt/slides/slide15.xml><?xml version="1.0" encoding="utf-8"?>
+<p:sld xmlns:a="http://schemas.openxmlformats.org/drawingml/2006/main" xmlns:r="http://schemas.openxmlformats.org/officeDocument/2006/relationships" xmlns:p="http://schemas.openxmlformats.org/presentationml/2006/main">
+  <p:cSld>
+    <p:spTree>
+      <p:nvGrpSpPr>
+        <p:cNvPr id="1" name=""/>
+        <p:cNvGrpSpPr/>
+        <p:nvPr/>
+      </p:nvGrpSpPr>
+      <p:grpSpPr>
+        <a:xfrm>
+          <a:off x="0" y="0"/>
+          <a:ext cx="0" cy="0"/>
+          <a:chOff x="0" y="0"/>
+          <a:chExt cx="0" cy="0"/>
+        </a:xfrm>
+      </p:grpSpPr>
+      <p:sp>
+        <p:nvSpPr>
+          <p:cNvPr id="2" name="标题 1"/>
+          <p:cNvSpPr>
+            <a:spLocks noGrp="1"/>
+          </p:cNvSpPr>
+          <p:nvPr>
+            <p:ph type="title"/>
+          </p:nvPr>
+        </p:nvSpPr>
+        <p:spPr>
+          <a:xfrm>
+            <a:off x="395536" y="404664"/>
+            <a:ext cx="8229600" cy="1143000"/>
+          </a:xfrm>
+        </p:spPr>
+        <p:txBody>
+          <a:bodyPr/>
+          <a:lstStyle/>
+          <a:p>
+            <a:r>
+              <a:rPr lang="en-US" altLang="zh-CN" dirty="0" smtClean="0"/>
+              <a:t>outline</a:t>
+            </a:r>
+            <a:endParaRPr lang="zh-CN" altLang="en-US" dirty="0"/>
+          </a:p>
+        </p:txBody>
+      </p:sp>
+      <p:sp>
+        <p:nvSpPr>
+          <p:cNvPr id="3" name="内容占位符 2"/>
+          <p:cNvSpPr>
+            <a:spLocks noGrp="1"/>
+          </p:cNvSpPr>
+          <p:nvPr>
+            <p:ph idx="1"/>
+          </p:nvPr>
+        </p:nvSpPr>
+        <p:spPr/>
+        <p:txBody>
+          <a:bodyPr/>
+          <a:lstStyle/>
+          <a:p>
+            <a:endParaRPr lang="en-US" altLang="zh-CN" dirty="0" smtClean="0"/>
+          </a:p>
+          <a:p>
+            <a:endParaRPr lang="en-US" altLang="zh-CN" dirty="0"/>
+          </a:p>
+          <a:p>
+            <a:r>
+              <a:rPr lang="en-US" altLang="zh-CN" dirty="0"/>
+              <a:t>b</a:t>
+            </a:r>
+            <a:r>
+              <a:rPr lang="en-US" altLang="zh-CN" dirty="0"/>
+              <a:t>asis &amp; internals</a:t>
+            </a:r>
+          </a:p>
+          <a:p>
+            <a:endParaRPr lang="en-US" altLang="zh-CN" dirty="0"/>
+          </a:p>
+          <a:p>
+            <a:r>
+              <a:rPr lang="en-US" altLang="zh-CN" b="1" i="1" dirty="0" smtClean="0">
+                <a:solidFill>
+                  <a:srgbClr val="800000"/>
+                </a:solidFill>
+              </a:rPr>
+              <a:t>ecosystem</a:t>
+            </a:r>
+            <a:endParaRPr lang="zh-CN" altLang="en-US" b="1" i="1" dirty="0">
+              <a:solidFill>
+                <a:srgbClr val="800000"/>
+              </a:solidFill>
+            </a:endParaRPr>
+          </a:p>
+        </p:txBody>
+      </p:sp>
+      <p:sp>
+        <p:nvSpPr>
+          <p:cNvPr id="5" name="文本框 4"/>
+          <p:cNvSpPr txBox="1"/>
+          <p:nvPr/>
+        </p:nvSpPr>
+        <p:spPr>
+          <a:xfrm>
+            <a:off x="9042400" y="6034505"/>
+            <a:ext cx="184666" cy="369332"/>
+          </a:xfrm>
+          <a:prstGeom prst="rect">
+            <a:avLst/>
+          </a:prstGeom>
+          <a:noFill/>
+        </p:spPr>
+        <p:txBody>
+          <a:bodyPr wrap="none" rtlCol="0">
+            <a:spAutoFit/>
+          </a:bodyPr>
+          <a:lstStyle/>
+          <a:p>
+            <a:endParaRPr kumimoji="1" lang="zh-CN" altLang="en-US" dirty="0">
+              <a:solidFill>
+                <a:prstClr val="black"/>
+              </a:solidFill>
+              <a:latin typeface="Calibri"/>
+              <a:ea typeface="宋体"/>
+            </a:endParaRPr>
+          </a:p>
+        </p:txBody>
+      </p:sp>
+      <p:sp>
+        <p:nvSpPr>
+          <p:cNvPr id="6" name="文本框 5"/>
+          <p:cNvSpPr txBox="1"/>
+          <p:nvPr/>
+        </p:nvSpPr>
+        <p:spPr>
+          <a:xfrm>
+            <a:off x="9194800" y="6186905"/>
+            <a:ext cx="184666" cy="369332"/>
+          </a:xfrm>
+          <a:prstGeom prst="rect">
+            <a:avLst/>
+          </a:prstGeom>
+          <a:noFill/>
+        </p:spPr>
+        <p:txBody>
+          <a:bodyPr wrap="none" rtlCol="0">
+            <a:spAutoFit/>
+          </a:bodyPr>
+          <a:lstStyle/>
+          <a:p>
+            <a:endParaRPr kumimoji="1" lang="zh-CN" altLang="en-US" dirty="0">
+              <a:solidFill>
+                <a:prstClr val="black"/>
+              </a:solidFill>
+              <a:latin typeface="Calibri"/>
+              <a:ea typeface="宋体"/>
+            </a:endParaRPr>
+          </a:p>
+        </p:txBody>
+      </p:sp>
+      <p:sp>
+        <p:nvSpPr>
+          <p:cNvPr id="7" name="文本框 6"/>
+          <p:cNvSpPr txBox="1"/>
+          <p:nvPr/>
+        </p:nvSpPr>
+        <p:spPr>
+          <a:xfrm>
+            <a:off x="8890000" y="5882105"/>
+            <a:ext cx="184666" cy="369332"/>
+          </a:xfrm>
+          <a:prstGeom prst="rect">
+            <a:avLst/>
+          </a:prstGeom>
+          <a:noFill/>
+        </p:spPr>
+        <p:txBody>
+          <a:bodyPr wrap="none" rtlCol="0">
+            <a:spAutoFit/>
+          </a:bodyPr>
+          <a:lstStyle/>
+          <a:p>
+            <a:endParaRPr kumimoji="1" lang="zh-CN" altLang="en-US" dirty="0">
+              <a:solidFill>
+                <a:prstClr val="black"/>
+              </a:solidFill>
+              <a:latin typeface="Calibri"/>
+              <a:ea typeface="宋体"/>
+            </a:endParaRPr>
+          </a:p>
+        </p:txBody>
+      </p:sp>
+      <p:sp>
+        <p:nvSpPr>
+          <p:cNvPr id="8" name="文本框 7"/>
+          <p:cNvSpPr txBox="1"/>
+          <p:nvPr/>
+        </p:nvSpPr>
+        <p:spPr>
+          <a:xfrm>
+            <a:off x="9042400" y="6034505"/>
+            <a:ext cx="184666" cy="369332"/>
+          </a:xfrm>
+          <a:prstGeom prst="rect">
+            <a:avLst/>
+          </a:prstGeom>
+          <a:noFill/>
+        </p:spPr>
+        <p:txBody>
+          <a:bodyPr wrap="none" rtlCol="0">
+            <a:spAutoFit/>
+          </a:bodyPr>
+          <a:lstStyle/>
+          <a:p>
+            <a:endParaRPr kumimoji="1" lang="zh-CN" altLang="en-US" dirty="0">
+              <a:solidFill>
+                <a:prstClr val="black"/>
+              </a:solidFill>
+              <a:latin typeface="Calibri"/>
+              <a:ea typeface="宋体"/>
+            </a:endParaRPr>
+          </a:p>
+        </p:txBody>
+      </p:sp>
+      <p:sp>
+        <p:nvSpPr>
+          <p:cNvPr id="9" name="文本框 8"/>
+          <p:cNvSpPr txBox="1"/>
+          <p:nvPr/>
+        </p:nvSpPr>
+        <p:spPr>
+          <a:xfrm>
+            <a:off x="9347200" y="6339305"/>
+            <a:ext cx="184666" cy="369332"/>
+          </a:xfrm>
+          <a:prstGeom prst="rect">
+            <a:avLst/>
+          </a:prstGeom>
+          <a:noFill/>
+        </p:spPr>
+        <p:txBody>
+          <a:bodyPr wrap="none" rtlCol="0">
+            <a:spAutoFit/>
+          </a:bodyPr>
+          <a:lstStyle/>
+          <a:p>
+            <a:endParaRPr kumimoji="1" lang="zh-CN" altLang="en-US" dirty="0">
+              <a:solidFill>
+                <a:prstClr val="black"/>
+              </a:solidFill>
+              <a:latin typeface="Calibri"/>
+              <a:ea typeface="宋体"/>
+            </a:endParaRPr>
+          </a:p>
+        </p:txBody>
+      </p:sp>
+    </p:spTree>
+    <p:extLst>
+      <p:ext uri="{BB962C8B-B14F-4D97-AF65-F5344CB8AC3E}">
+        <p14:creationId xmlns:p14="http://schemas.microsoft.com/office/powerpoint/2010/main" val="1877540810"/>
+      </p:ext>
+    </p:extLst>
+  </p:cSld>
+  <p:clrMapOvr>
+    <a:masterClrMapping/>
+  </p:clrMapOvr>
+  <p:timing>
+    <p:tnLst>
+      <p:par>
+        <p:cTn xmlns:p14="http://schemas.microsoft.com/office/powerpoint/2010/main" id="1" dur="indefinite" restart="never" nodeType="tmRoot"/>
+      </p:par>
+    </p:tnLst>
+  </p:timing>
+</p:sld>
+</file>
+
+<file path=ppt/slides/slide16.xml><?xml version="1.0" encoding="utf-8"?>
 <p:sld xmlns:a="http://schemas.openxmlformats.org/drawingml/2006/main" xmlns:r="http://schemas.openxmlformats.org/officeDocument/2006/relationships" xmlns:p="http://schemas.openxmlformats.org/presentationml/2006/main">
   <p:cSld>
     <p:bg>
@@ -32658,7 +32938,7 @@
 </p:sld>
 </file>
 
-<file path=ppt/slides/slide16.xml><?xml version="1.0" encoding="utf-8"?>
+<file path=ppt/slides/slide17.xml><?xml version="1.0" encoding="utf-8"?>
 <p:sld xmlns:a="http://schemas.openxmlformats.org/drawingml/2006/main" xmlns:r="http://schemas.openxmlformats.org/officeDocument/2006/relationships" xmlns:p="http://schemas.openxmlformats.org/presentationml/2006/main">
   <p:cSld>
     <p:bg>
@@ -33002,291 +33282,6 @@
 </p:sld>
 </file>
 
-<file path=ppt/slides/slide17.xml><?xml version="1.0" encoding="utf-8"?>
-<p:sld xmlns:a="http://schemas.openxmlformats.org/drawingml/2006/main" xmlns:r="http://schemas.openxmlformats.org/officeDocument/2006/relationships" xmlns:p="http://schemas.openxmlformats.org/presentationml/2006/main">
-  <p:cSld>
-    <p:bg>
-      <p:bgPr>
-        <a:blipFill dpi="0" rotWithShape="1">
-          <a:blip r:embed="rId2">
-            <a:lum/>
-          </a:blip>
-          <a:srcRect/>
-          <a:stretch>
-            <a:fillRect/>
-          </a:stretch>
-        </a:blipFill>
-        <a:effectLst/>
-      </p:bgPr>
-    </p:bg>
-    <p:spTree>
-      <p:nvGrpSpPr>
-        <p:cNvPr id="1" name=""/>
-        <p:cNvGrpSpPr/>
-        <p:nvPr/>
-      </p:nvGrpSpPr>
-      <p:grpSpPr>
-        <a:xfrm>
-          <a:off x="0" y="0"/>
-          <a:ext cx="0" cy="0"/>
-          <a:chOff x="0" y="0"/>
-          <a:chExt cx="0" cy="0"/>
-        </a:xfrm>
-      </p:grpSpPr>
-      <p:sp>
-        <p:nvSpPr>
-          <p:cNvPr id="2" name="标题 1"/>
-          <p:cNvSpPr>
-            <a:spLocks noGrp="1"/>
-          </p:cNvSpPr>
-          <p:nvPr>
-            <p:ph type="title"/>
-          </p:nvPr>
-        </p:nvSpPr>
-        <p:spPr>
-          <a:xfrm>
-            <a:off x="395536" y="404664"/>
-            <a:ext cx="8229600" cy="1143000"/>
-          </a:xfrm>
-        </p:spPr>
-        <p:txBody>
-          <a:bodyPr/>
-          <a:lstStyle/>
-          <a:p>
-            <a:r>
-              <a:rPr lang="en-US" altLang="zh-CN" dirty="0" err="1"/>
-              <a:t>GraphX</a:t>
-            </a:r>
-            <a:endParaRPr lang="zh-CN" altLang="en-US" dirty="0"/>
-          </a:p>
-        </p:txBody>
-      </p:sp>
-      <p:pic>
-        <p:nvPicPr>
-          <p:cNvPr id="4" name="内容占位符 3"/>
-          <p:cNvPicPr>
-            <a:picLocks noGrp="1" noChangeAspect="1"/>
-          </p:cNvPicPr>
-          <p:nvPr>
-            <p:ph idx="1"/>
-          </p:nvPr>
-        </p:nvPicPr>
-        <p:blipFill rotWithShape="1">
-          <a:blip r:embed="rId3"/>
-          <a:srcRect l="-78688" t="-1104" r="-92697" b="-187114"/>
-          <a:stretch/>
-        </p:blipFill>
-        <p:spPr>
-          <a:xfrm>
-            <a:off x="-3835400" y="1624013"/>
-            <a:ext cx="16805275" cy="4664649"/>
-          </a:xfrm>
-        </p:spPr>
-      </p:pic>
-      <p:sp>
-        <p:nvSpPr>
-          <p:cNvPr id="5" name="文本框 4"/>
-          <p:cNvSpPr txBox="1"/>
-          <p:nvPr/>
-        </p:nvSpPr>
-        <p:spPr>
-          <a:xfrm>
-            <a:off x="9042400" y="6034505"/>
-            <a:ext cx="184666" cy="369332"/>
-          </a:xfrm>
-          <a:prstGeom prst="rect">
-            <a:avLst/>
-          </a:prstGeom>
-          <a:noFill/>
-        </p:spPr>
-        <p:txBody>
-          <a:bodyPr wrap="none" rtlCol="0">
-            <a:spAutoFit/>
-          </a:bodyPr>
-          <a:lstStyle/>
-          <a:p>
-            <a:endParaRPr kumimoji="1" lang="zh-CN" altLang="en-US" dirty="0">
-              <a:solidFill>
-                <a:prstClr val="black"/>
-              </a:solidFill>
-              <a:latin typeface="Calibri"/>
-              <a:ea typeface="宋体"/>
-            </a:endParaRPr>
-          </a:p>
-        </p:txBody>
-      </p:sp>
-      <p:sp>
-        <p:nvSpPr>
-          <p:cNvPr id="6" name="文本框 5"/>
-          <p:cNvSpPr txBox="1"/>
-          <p:nvPr/>
-        </p:nvSpPr>
-        <p:spPr>
-          <a:xfrm>
-            <a:off x="9194800" y="6186905"/>
-            <a:ext cx="184666" cy="369332"/>
-          </a:xfrm>
-          <a:prstGeom prst="rect">
-            <a:avLst/>
-          </a:prstGeom>
-          <a:noFill/>
-        </p:spPr>
-        <p:txBody>
-          <a:bodyPr wrap="none" rtlCol="0">
-            <a:spAutoFit/>
-          </a:bodyPr>
-          <a:lstStyle/>
-          <a:p>
-            <a:endParaRPr kumimoji="1" lang="zh-CN" altLang="en-US" dirty="0">
-              <a:solidFill>
-                <a:prstClr val="black"/>
-              </a:solidFill>
-              <a:latin typeface="Calibri"/>
-              <a:ea typeface="宋体"/>
-            </a:endParaRPr>
-          </a:p>
-        </p:txBody>
-      </p:sp>
-      <p:sp>
-        <p:nvSpPr>
-          <p:cNvPr id="7" name="文本框 6"/>
-          <p:cNvSpPr txBox="1"/>
-          <p:nvPr/>
-        </p:nvSpPr>
-        <p:spPr>
-          <a:xfrm>
-            <a:off x="8890000" y="5882105"/>
-            <a:ext cx="184666" cy="369332"/>
-          </a:xfrm>
-          <a:prstGeom prst="rect">
-            <a:avLst/>
-          </a:prstGeom>
-          <a:noFill/>
-        </p:spPr>
-        <p:txBody>
-          <a:bodyPr wrap="none" rtlCol="0">
-            <a:spAutoFit/>
-          </a:bodyPr>
-          <a:lstStyle/>
-          <a:p>
-            <a:endParaRPr kumimoji="1" lang="zh-CN" altLang="en-US" dirty="0">
-              <a:solidFill>
-                <a:prstClr val="black"/>
-              </a:solidFill>
-              <a:latin typeface="Calibri"/>
-              <a:ea typeface="宋体"/>
-            </a:endParaRPr>
-          </a:p>
-        </p:txBody>
-      </p:sp>
-      <p:sp>
-        <p:nvSpPr>
-          <p:cNvPr id="8" name="文本框 7"/>
-          <p:cNvSpPr txBox="1"/>
-          <p:nvPr/>
-        </p:nvSpPr>
-        <p:spPr>
-          <a:xfrm>
-            <a:off x="9042400" y="6034505"/>
-            <a:ext cx="184666" cy="369332"/>
-          </a:xfrm>
-          <a:prstGeom prst="rect">
-            <a:avLst/>
-          </a:prstGeom>
-          <a:noFill/>
-        </p:spPr>
-        <p:txBody>
-          <a:bodyPr wrap="none" rtlCol="0">
-            <a:spAutoFit/>
-          </a:bodyPr>
-          <a:lstStyle/>
-          <a:p>
-            <a:endParaRPr kumimoji="1" lang="zh-CN" altLang="en-US" dirty="0">
-              <a:solidFill>
-                <a:prstClr val="black"/>
-              </a:solidFill>
-              <a:latin typeface="Calibri"/>
-              <a:ea typeface="宋体"/>
-            </a:endParaRPr>
-          </a:p>
-        </p:txBody>
-      </p:sp>
-      <p:sp>
-        <p:nvSpPr>
-          <p:cNvPr id="9" name="文本框 8"/>
-          <p:cNvSpPr txBox="1"/>
-          <p:nvPr/>
-        </p:nvSpPr>
-        <p:spPr>
-          <a:xfrm>
-            <a:off x="9347200" y="6339305"/>
-            <a:ext cx="184666" cy="369332"/>
-          </a:xfrm>
-          <a:prstGeom prst="rect">
-            <a:avLst/>
-          </a:prstGeom>
-          <a:noFill/>
-        </p:spPr>
-        <p:txBody>
-          <a:bodyPr wrap="none" rtlCol="0">
-            <a:spAutoFit/>
-          </a:bodyPr>
-          <a:lstStyle/>
-          <a:p>
-            <a:endParaRPr kumimoji="1" lang="zh-CN" altLang="en-US" dirty="0">
-              <a:solidFill>
-                <a:prstClr val="black"/>
-              </a:solidFill>
-              <a:latin typeface="Calibri"/>
-              <a:ea typeface="宋体"/>
-            </a:endParaRPr>
-          </a:p>
-        </p:txBody>
-      </p:sp>
-      <p:pic>
-        <p:nvPicPr>
-          <p:cNvPr id="11" name="图片 10"/>
-          <p:cNvPicPr>
-            <a:picLocks noChangeAspect="1"/>
-          </p:cNvPicPr>
-          <p:nvPr/>
-        </p:nvPicPr>
-        <p:blipFill>
-          <a:blip r:embed="rId4"/>
-          <a:stretch>
-            <a:fillRect/>
-          </a:stretch>
-        </p:blipFill>
-        <p:spPr>
-          <a:xfrm>
-            <a:off x="971599" y="3429000"/>
-            <a:ext cx="6949307" cy="2664296"/>
-          </a:xfrm>
-          <a:prstGeom prst="rect">
-            <a:avLst/>
-          </a:prstGeom>
-        </p:spPr>
-      </p:pic>
-    </p:spTree>
-    <p:extLst>
-      <p:ext uri="{BB962C8B-B14F-4D97-AF65-F5344CB8AC3E}">
-        <p14:creationId xmlns:p14="http://schemas.microsoft.com/office/powerpoint/2010/main" val="2359114229"/>
-      </p:ext>
-    </p:extLst>
-  </p:cSld>
-  <p:clrMapOvr>
-    <a:masterClrMapping/>
-  </p:clrMapOvr>
-  <p:timing>
-    <p:tnLst>
-      <p:par>
-        <p:cTn xmlns:p14="http://schemas.microsoft.com/office/powerpoint/2010/main" id="1" dur="indefinite" restart="never" nodeType="tmRoot"/>
-      </p:par>
-    </p:tnLst>
-  </p:timing>
-</p:sld>
-</file>
-
 <file path=ppt/slides/slide18.xml><?xml version="1.0" encoding="utf-8"?>
 <p:sld xmlns:a="http://schemas.openxmlformats.org/drawingml/2006/main" xmlns:r="http://schemas.openxmlformats.org/officeDocument/2006/relationships" xmlns:p="http://schemas.openxmlformats.org/presentationml/2006/main">
   <p:cSld>
@@ -33348,7 +33343,7 @@
       </p:sp>
       <p:pic>
         <p:nvPicPr>
-          <p:cNvPr id="10" name="内容占位符 9"/>
+          <p:cNvPr id="4" name="内容占位符 3"/>
           <p:cNvPicPr>
             <a:picLocks noGrp="1" noChangeAspect="1"/>
           </p:cNvPicPr>
@@ -33356,17 +33351,15 @@
             <p:ph idx="1"/>
           </p:nvPr>
         </p:nvPicPr>
-        <p:blipFill>
+        <p:blipFill rotWithShape="1">
           <a:blip r:embed="rId3"/>
-          <a:srcRect t="1801" b="1801"/>
-          <a:stretch>
-            <a:fillRect/>
-          </a:stretch>
+          <a:srcRect l="-78688" t="-1104" r="-92697" b="-187114"/>
+          <a:stretch/>
         </p:blipFill>
         <p:spPr>
           <a:xfrm>
-            <a:off x="1043608" y="1772816"/>
-            <a:ext cx="7355160" cy="4045055"/>
+            <a:off x="-3835400" y="1624013"/>
+            <a:ext cx="16805275" cy="4664649"/>
           </a:xfrm>
         </p:spPr>
       </p:pic>
@@ -33530,10 +33523,34 @@
           </a:p>
         </p:txBody>
       </p:sp>
+      <p:pic>
+        <p:nvPicPr>
+          <p:cNvPr id="11" name="图片 10"/>
+          <p:cNvPicPr>
+            <a:picLocks noChangeAspect="1"/>
+          </p:cNvPicPr>
+          <p:nvPr/>
+        </p:nvPicPr>
+        <p:blipFill>
+          <a:blip r:embed="rId4"/>
+          <a:stretch>
+            <a:fillRect/>
+          </a:stretch>
+        </p:blipFill>
+        <p:spPr>
+          <a:xfrm>
+            <a:off x="971599" y="3429000"/>
+            <a:ext cx="6949307" cy="2664296"/>
+          </a:xfrm>
+          <a:prstGeom prst="rect">
+            <a:avLst/>
+          </a:prstGeom>
+        </p:spPr>
+      </p:pic>
     </p:spTree>
     <p:extLst>
       <p:ext uri="{BB962C8B-B14F-4D97-AF65-F5344CB8AC3E}">
-        <p14:creationId xmlns:p14="http://schemas.microsoft.com/office/powerpoint/2010/main" val="3541963494"/>
+        <p14:creationId xmlns:p14="http://schemas.microsoft.com/office/powerpoint/2010/main" val="2359114229"/>
       </p:ext>
     </p:extLst>
   </p:cSld>
@@ -33602,8 +33619,8 @@
           <a:lstStyle/>
           <a:p>
             <a:r>
-              <a:rPr lang="en-US" altLang="zh-CN" dirty="0"/>
-              <a:t>Spark SQL</a:t>
+              <a:rPr lang="en-US" altLang="zh-CN" dirty="0" err="1"/>
+              <a:t>GraphX</a:t>
             </a:r>
             <a:endParaRPr lang="zh-CN" altLang="en-US" dirty="0"/>
           </a:p>
@@ -33611,7 +33628,7 @@
       </p:sp>
       <p:pic>
         <p:nvPicPr>
-          <p:cNvPr id="4" name="内容占位符 3"/>
+          <p:cNvPr id="10" name="内容占位符 9"/>
           <p:cNvPicPr>
             <a:picLocks noGrp="1" noChangeAspect="1"/>
           </p:cNvPicPr>
@@ -33619,15 +33636,17 @@
             <p:ph idx="1"/>
           </p:nvPr>
         </p:nvPicPr>
-        <p:blipFill rotWithShape="1">
+        <p:blipFill>
           <a:blip r:embed="rId3"/>
-          <a:srcRect l="-135" r="-135"/>
-          <a:stretch/>
+          <a:srcRect t="1801" b="1801"/>
+          <a:stretch>
+            <a:fillRect/>
+          </a:stretch>
         </p:blipFill>
         <p:spPr>
           <a:xfrm>
-            <a:off x="395536" y="1772816"/>
-            <a:ext cx="8172400" cy="4045055"/>
+            <a:off x="1043608" y="1772816"/>
+            <a:ext cx="7355160" cy="4045055"/>
           </a:xfrm>
         </p:spPr>
       </p:pic>
@@ -33794,7 +33813,7 @@
     </p:spTree>
     <p:extLst>
       <p:ext uri="{BB962C8B-B14F-4D97-AF65-F5344CB8AC3E}">
-        <p14:creationId xmlns:p14="http://schemas.microsoft.com/office/powerpoint/2010/main" val="34869093"/>
+        <p14:creationId xmlns:p14="http://schemas.microsoft.com/office/powerpoint/2010/main" val="3541963494"/>
       </p:ext>
     </p:extLst>
   </p:cSld>
@@ -33892,11 +33911,19 @@
           </a:p>
           <a:p>
             <a:r>
-              <a:rPr lang="en-US" altLang="zh-CN" dirty="0"/>
+              <a:rPr lang="en-US" altLang="zh-CN" b="1" i="1" dirty="0">
+                <a:solidFill>
+                  <a:srgbClr val="800000"/>
+                </a:solidFill>
+              </a:rPr>
               <a:t>b</a:t>
             </a:r>
             <a:r>
-              <a:rPr lang="en-US" altLang="zh-CN" dirty="0" smtClean="0"/>
+              <a:rPr lang="en-US" altLang="zh-CN" b="1" i="1" dirty="0" smtClean="0">
+                <a:solidFill>
+                  <a:srgbClr val="800000"/>
+                </a:solidFill>
+              </a:rPr>
               <a:t>asis &amp; internals</a:t>
             </a:r>
           </a:p>
@@ -34151,56 +34178,28 @@
           </a:p>
         </p:txBody>
       </p:sp>
-      <p:sp>
-        <p:nvSpPr>
-          <p:cNvPr id="3" name="内容占位符 2"/>
-          <p:cNvSpPr>
-            <a:spLocks noGrp="1"/>
-          </p:cNvSpPr>
+      <p:pic>
+        <p:nvPicPr>
+          <p:cNvPr id="4" name="内容占位符 3"/>
+          <p:cNvPicPr>
+            <a:picLocks noGrp="1" noChangeAspect="1"/>
+          </p:cNvPicPr>
           <p:nvPr>
             <p:ph idx="1"/>
           </p:nvPr>
-        </p:nvSpPr>
-        <p:spPr/>
-        <p:txBody>
-          <a:bodyPr>
-            <a:normAutofit/>
-          </a:bodyPr>
-          <a:lstStyle/>
-          <a:p>
-            <a:endParaRPr lang="en-US" altLang="zh-CN" dirty="0" smtClean="0"/>
-          </a:p>
-          <a:p>
-            <a:r>
-              <a:rPr lang="en-US" altLang="zh-CN" dirty="0" smtClean="0"/>
-              <a:t>Data </a:t>
-            </a:r>
-            <a:r>
-              <a:rPr lang="en-US" altLang="zh-CN" dirty="0"/>
-              <a:t>Sources</a:t>
-            </a:r>
-          </a:p>
-          <a:p>
-            <a:r>
-              <a:rPr lang="en-US" altLang="zh-CN" dirty="0"/>
-              <a:t>RDDs/Parquet Files/JSON Datasets/Hive Table</a:t>
-            </a:r>
-          </a:p>
-          <a:p>
-            <a:r>
-              <a:rPr lang="en-US" altLang="zh-CN" dirty="0"/>
-              <a:t>DSL</a:t>
-            </a:r>
-          </a:p>
-          <a:p>
-            <a:r>
-              <a:rPr lang="en-US" altLang="zh-CN" dirty="0"/>
-              <a:t>JDBC Server</a:t>
-            </a:r>
-            <a:endParaRPr lang="zh-CN" altLang="en-US" dirty="0"/>
-          </a:p>
-        </p:txBody>
-      </p:sp>
+        </p:nvPicPr>
+        <p:blipFill rotWithShape="1">
+          <a:blip r:embed="rId3"/>
+          <a:srcRect l="-135" r="-135"/>
+          <a:stretch/>
+        </p:blipFill>
+        <p:spPr>
+          <a:xfrm>
+            <a:off x="395536" y="1772816"/>
+            <a:ext cx="8172400" cy="4045055"/>
+          </a:xfrm>
+        </p:spPr>
+      </p:pic>
       <p:sp>
         <p:nvSpPr>
           <p:cNvPr id="5" name="文本框 4"/>
@@ -34364,7 +34363,7 @@
     </p:spTree>
     <p:extLst>
       <p:ext uri="{BB962C8B-B14F-4D97-AF65-F5344CB8AC3E}">
-        <p14:creationId xmlns:p14="http://schemas.microsoft.com/office/powerpoint/2010/main" val="3618966661"/>
+        <p14:creationId xmlns:p14="http://schemas.microsoft.com/office/powerpoint/2010/main" val="34869093"/>
       </p:ext>
     </p:extLst>
   </p:cSld>
@@ -34433,43 +34432,58 @@
           <a:lstStyle/>
           <a:p>
             <a:r>
+              <a:rPr lang="en-US" altLang="zh-CN" dirty="0"/>
+              <a:t>Spark SQL</a:t>
+            </a:r>
+            <a:endParaRPr lang="zh-CN" altLang="en-US" dirty="0"/>
+          </a:p>
+        </p:txBody>
+      </p:sp>
+      <p:sp>
+        <p:nvSpPr>
+          <p:cNvPr id="3" name="内容占位符 2"/>
+          <p:cNvSpPr>
+            <a:spLocks noGrp="1"/>
+          </p:cNvSpPr>
+          <p:nvPr>
+            <p:ph idx="1"/>
+          </p:nvPr>
+        </p:nvSpPr>
+        <p:spPr/>
+        <p:txBody>
+          <a:bodyPr>
+            <a:normAutofit/>
+          </a:bodyPr>
+          <a:lstStyle/>
+          <a:p>
+            <a:endParaRPr lang="en-US" altLang="zh-CN" dirty="0" smtClean="0"/>
+          </a:p>
+          <a:p>
+            <a:r>
               <a:rPr lang="en-US" altLang="zh-CN" dirty="0" smtClean="0"/>
-              <a:t>Shark</a:t>
-            </a:r>
-            <a:endParaRPr lang="zh-CN" altLang="en-US" dirty="0"/>
-          </a:p>
-        </p:txBody>
-      </p:sp>
-      <p:sp>
-        <p:nvSpPr>
-          <p:cNvPr id="3" name="内容占位符 2"/>
-          <p:cNvSpPr>
-            <a:spLocks noGrp="1"/>
-          </p:cNvSpPr>
-          <p:nvPr>
-            <p:ph idx="1"/>
-          </p:nvPr>
-        </p:nvSpPr>
-        <p:spPr/>
-        <p:txBody>
-          <a:bodyPr/>
-          <a:lstStyle/>
-          <a:p>
-            <a:endParaRPr lang="en-US" altLang="zh-CN" dirty="0" smtClean="0"/>
-          </a:p>
-          <a:p>
-            <a:r>
-              <a:rPr lang="en-US" altLang="zh-CN" dirty="0" smtClean="0"/>
-              <a:t>Development in Shark has been ended and subsumed by Spark SQL</a:t>
-            </a:r>
-          </a:p>
-          <a:p>
-            <a:endParaRPr lang="en-US" altLang="zh-CN" dirty="0"/>
-          </a:p>
-          <a:p>
-            <a:r>
-              <a:rPr lang="en-US" altLang="zh-CN" dirty="0" smtClean="0"/>
-              <a:t>Mission completed !!!</a:t>
+              <a:t>Data </a:t>
+            </a:r>
+            <a:r>
+              <a:rPr lang="en-US" altLang="zh-CN" dirty="0"/>
+              <a:t>Sources</a:t>
+            </a:r>
+          </a:p>
+          <a:p>
+            <a:r>
+              <a:rPr lang="en-US" altLang="zh-CN" dirty="0"/>
+              <a:t>RDDs/Parquet Files/JSON Datasets/Hive Table</a:t>
+            </a:r>
+          </a:p>
+          <a:p>
+            <a:r>
+              <a:rPr lang="en-US" altLang="zh-CN" dirty="0"/>
+              <a:t>DSL</a:t>
+            </a:r>
+          </a:p>
+          <a:p>
+            <a:r>
+              <a:rPr lang="en-US" altLang="zh-CN" dirty="0"/>
+              <a:t>JDBC Server</a:t>
             </a:r>
             <a:endParaRPr lang="zh-CN" altLang="en-US" dirty="0"/>
           </a:p>
@@ -34638,7 +34652,7 @@
     </p:spTree>
     <p:extLst>
       <p:ext uri="{BB962C8B-B14F-4D97-AF65-F5344CB8AC3E}">
-        <p14:creationId xmlns:p14="http://schemas.microsoft.com/office/powerpoint/2010/main" val="2136418070"/>
+        <p14:creationId xmlns:p14="http://schemas.microsoft.com/office/powerpoint/2010/main" val="3618966661"/>
       </p:ext>
     </p:extLst>
   </p:cSld>
@@ -34698,7 +34712,7 @@
         </p:nvSpPr>
         <p:spPr>
           <a:xfrm>
-            <a:off x="467544" y="188640"/>
+            <a:off x="395536" y="404664"/>
             <a:ext cx="8229600" cy="1143000"/>
           </a:xfrm>
         </p:spPr>
@@ -34707,35 +34721,48 @@
           <a:lstStyle/>
           <a:p>
             <a:r>
-              <a:rPr lang="en-US" altLang="zh-CN" dirty="0"/>
-              <a:t>Tachyon</a:t>
+              <a:rPr lang="en-US" altLang="zh-CN" dirty="0" smtClean="0"/>
+              <a:t>Shark</a:t>
             </a:r>
             <a:endParaRPr lang="zh-CN" altLang="en-US" dirty="0"/>
           </a:p>
         </p:txBody>
       </p:sp>
-      <p:pic>
-        <p:nvPicPr>
-          <p:cNvPr id="4" name="内容占位符 3"/>
-          <p:cNvPicPr>
-            <a:picLocks noGrp="1" noChangeAspect="1"/>
-          </p:cNvPicPr>
+      <p:sp>
+        <p:nvSpPr>
+          <p:cNvPr id="3" name="内容占位符 2"/>
+          <p:cNvSpPr>
+            <a:spLocks noGrp="1"/>
+          </p:cNvSpPr>
           <p:nvPr>
             <p:ph idx="1"/>
           </p:nvPr>
-        </p:nvPicPr>
-        <p:blipFill rotWithShape="1">
-          <a:blip r:embed="rId3"/>
-          <a:srcRect t="14022" b="-6806"/>
-          <a:stretch/>
-        </p:blipFill>
-        <p:spPr>
-          <a:xfrm>
-            <a:off x="467544" y="980728"/>
-            <a:ext cx="8229600" cy="5717017"/>
-          </a:xfrm>
-        </p:spPr>
-      </p:pic>
+        </p:nvSpPr>
+        <p:spPr/>
+        <p:txBody>
+          <a:bodyPr/>
+          <a:lstStyle/>
+          <a:p>
+            <a:endParaRPr lang="en-US" altLang="zh-CN" dirty="0" smtClean="0"/>
+          </a:p>
+          <a:p>
+            <a:r>
+              <a:rPr lang="en-US" altLang="zh-CN" dirty="0" smtClean="0"/>
+              <a:t>Development in Shark has been ended and subsumed by Spark SQL</a:t>
+            </a:r>
+          </a:p>
+          <a:p>
+            <a:endParaRPr lang="en-US" altLang="zh-CN" dirty="0"/>
+          </a:p>
+          <a:p>
+            <a:r>
+              <a:rPr lang="en-US" altLang="zh-CN" dirty="0" smtClean="0"/>
+              <a:t>Mission completed !!!</a:t>
+            </a:r>
+            <a:endParaRPr lang="zh-CN" altLang="en-US" dirty="0"/>
+          </a:p>
+        </p:txBody>
+      </p:sp>
       <p:sp>
         <p:nvSpPr>
           <p:cNvPr id="5" name="文本框 4"/>
@@ -34899,7 +34926,7 @@
     </p:spTree>
     <p:extLst>
       <p:ext uri="{BB962C8B-B14F-4D97-AF65-F5344CB8AC3E}">
-        <p14:creationId xmlns:p14="http://schemas.microsoft.com/office/powerpoint/2010/main" val="974719742"/>
+        <p14:creationId xmlns:p14="http://schemas.microsoft.com/office/powerpoint/2010/main" val="2136418070"/>
       </p:ext>
     </p:extLst>
   </p:cSld>
@@ -34959,7 +34986,7 @@
         </p:nvSpPr>
         <p:spPr>
           <a:xfrm>
-            <a:off x="395536" y="404664"/>
+            <a:off x="467544" y="188640"/>
             <a:ext cx="8229600" cy="1143000"/>
           </a:xfrm>
         </p:spPr>
@@ -34987,13 +35014,13 @@
         </p:nvPicPr>
         <p:blipFill rotWithShape="1">
           <a:blip r:embed="rId3"/>
-          <a:srcRect l="-26862" t="-4373" r="-28899" b="-23035"/>
+          <a:srcRect t="14022" b="-6806"/>
           <a:stretch/>
         </p:blipFill>
         <p:spPr>
           <a:xfrm>
-            <a:off x="-1692696" y="1628800"/>
-            <a:ext cx="12745416" cy="4525963"/>
+            <a:off x="467544" y="980728"/>
+            <a:ext cx="8229600" cy="5717017"/>
           </a:xfrm>
         </p:spPr>
       </p:pic>
@@ -35160,7 +35187,7 @@
     </p:spTree>
     <p:extLst>
       <p:ext uri="{BB962C8B-B14F-4D97-AF65-F5344CB8AC3E}">
-        <p14:creationId xmlns:p14="http://schemas.microsoft.com/office/powerpoint/2010/main" val="4232010978"/>
+        <p14:creationId xmlns:p14="http://schemas.microsoft.com/office/powerpoint/2010/main" val="974719742"/>
       </p:ext>
     </p:extLst>
   </p:cSld>
@@ -35220,7 +35247,7 @@
         </p:nvSpPr>
         <p:spPr>
           <a:xfrm>
-            <a:off x="395536" y="188640"/>
+            <a:off x="395536" y="404664"/>
             <a:ext cx="8229600" cy="1143000"/>
           </a:xfrm>
         </p:spPr>
@@ -35229,8 +35256,8 @@
           <a:lstStyle/>
           <a:p>
             <a:r>
-              <a:rPr lang="en-US" altLang="zh-CN" dirty="0" err="1"/>
-              <a:t>SparkR</a:t>
+              <a:rPr lang="en-US" altLang="zh-CN" dirty="0"/>
+              <a:t>Tachyon</a:t>
             </a:r>
             <a:endParaRPr lang="zh-CN" altLang="en-US" dirty="0"/>
           </a:p>
@@ -35246,14 +35273,17 @@
             <p:ph idx="1"/>
           </p:nvPr>
         </p:nvPicPr>
-        <p:blipFill>
+        <p:blipFill rotWithShape="1">
           <a:blip r:embed="rId3"/>
-          <a:srcRect t="4884" b="4884"/>
-          <a:stretch>
-            <a:fillRect/>
-          </a:stretch>
+          <a:srcRect l="-26862" t="-4373" r="-28899" b="-23035"/>
+          <a:stretch/>
         </p:blipFill>
-        <p:spPr/>
+        <p:spPr>
+          <a:xfrm>
+            <a:off x="-1692696" y="1628800"/>
+            <a:ext cx="12745416" cy="4525963"/>
+          </a:xfrm>
+        </p:spPr>
       </p:pic>
       <p:sp>
         <p:nvSpPr>
@@ -35418,7 +35448,7 @@
     </p:spTree>
     <p:extLst>
       <p:ext uri="{BB962C8B-B14F-4D97-AF65-F5344CB8AC3E}">
-        <p14:creationId xmlns:p14="http://schemas.microsoft.com/office/powerpoint/2010/main" val="3650346757"/>
+        <p14:creationId xmlns:p14="http://schemas.microsoft.com/office/powerpoint/2010/main" val="4232010978"/>
       </p:ext>
     </p:extLst>
   </p:cSld>
@@ -35478,7 +35508,7 @@
         </p:nvSpPr>
         <p:spPr>
           <a:xfrm>
-            <a:off x="395536" y="404664"/>
+            <a:off x="395536" y="188640"/>
             <a:ext cx="8229600" cy="1143000"/>
           </a:xfrm>
         </p:spPr>
@@ -35487,45 +35517,32 @@
           <a:lstStyle/>
           <a:p>
             <a:r>
-              <a:rPr lang="en-US" altLang="zh-CN" dirty="0" err="1" smtClean="0"/>
-              <a:t>BlinkDB</a:t>
+              <a:rPr lang="en-US" altLang="zh-CN" dirty="0" err="1"/>
+              <a:t>SparkR</a:t>
             </a:r>
             <a:endParaRPr lang="zh-CN" altLang="en-US" dirty="0"/>
           </a:p>
         </p:txBody>
       </p:sp>
-      <p:sp>
-        <p:nvSpPr>
-          <p:cNvPr id="3" name="内容占位符 2"/>
-          <p:cNvSpPr>
-            <a:spLocks noGrp="1"/>
-          </p:cNvSpPr>
+      <p:pic>
+        <p:nvPicPr>
+          <p:cNvPr id="4" name="内容占位符 3"/>
+          <p:cNvPicPr>
+            <a:picLocks noGrp="1" noChangeAspect="1"/>
+          </p:cNvPicPr>
           <p:nvPr>
             <p:ph idx="1"/>
           </p:nvPr>
-        </p:nvSpPr>
+        </p:nvPicPr>
+        <p:blipFill>
+          <a:blip r:embed="rId3"/>
+          <a:srcRect t="4884" b="4884"/>
+          <a:stretch>
+            <a:fillRect/>
+          </a:stretch>
+        </p:blipFill>
         <p:spPr/>
-        <p:txBody>
-          <a:bodyPr/>
-          <a:lstStyle/>
-          <a:p>
-            <a:r>
-              <a:rPr lang="en-US" altLang="zh-CN" dirty="0"/>
-              <a:t>Queries with Bounded Errors and Bounded Response Times on Very Large </a:t>
-            </a:r>
-            <a:r>
-              <a:rPr lang="en-US" altLang="zh-CN" dirty="0" smtClean="0"/>
-              <a:t>Data</a:t>
-            </a:r>
-          </a:p>
-          <a:p>
-            <a:endParaRPr lang="en-US" altLang="zh-CN" dirty="0"/>
-          </a:p>
-          <a:p>
-            <a:endParaRPr lang="zh-CN" altLang="en-US" dirty="0"/>
-          </a:p>
-        </p:txBody>
-      </p:sp>
+      </p:pic>
       <p:sp>
         <p:nvSpPr>
           <p:cNvPr id="5" name="文本框 4"/>
@@ -35686,34 +35703,10 @@
           </a:p>
         </p:txBody>
       </p:sp>
-      <p:pic>
-        <p:nvPicPr>
-          <p:cNvPr id="4" name="图片 3"/>
-          <p:cNvPicPr>
-            <a:picLocks noChangeAspect="1"/>
-          </p:cNvPicPr>
-          <p:nvPr/>
-        </p:nvPicPr>
-        <p:blipFill>
-          <a:blip r:embed="rId3"/>
-          <a:stretch>
-            <a:fillRect/>
-          </a:stretch>
-        </p:blipFill>
-        <p:spPr>
-          <a:xfrm>
-            <a:off x="468824" y="2708920"/>
-            <a:ext cx="8195706" cy="2592288"/>
-          </a:xfrm>
-          <a:prstGeom prst="rect">
-            <a:avLst/>
-          </a:prstGeom>
-        </p:spPr>
-      </p:pic>
     </p:spTree>
     <p:extLst>
       <p:ext uri="{BB962C8B-B14F-4D97-AF65-F5344CB8AC3E}">
-        <p14:creationId xmlns:p14="http://schemas.microsoft.com/office/powerpoint/2010/main" val="2302750302"/>
+        <p14:creationId xmlns:p14="http://schemas.microsoft.com/office/powerpoint/2010/main" val="3650346757"/>
       </p:ext>
     </p:extLst>
   </p:cSld>
@@ -35781,6 +35774,301 @@
           <a:bodyPr/>
           <a:lstStyle/>
           <a:p>
+            <a:r>
+              <a:rPr lang="en-US" altLang="zh-CN" dirty="0" err="1" smtClean="0"/>
+              <a:t>BlinkDB</a:t>
+            </a:r>
+            <a:endParaRPr lang="zh-CN" altLang="en-US" dirty="0"/>
+          </a:p>
+        </p:txBody>
+      </p:sp>
+      <p:sp>
+        <p:nvSpPr>
+          <p:cNvPr id="3" name="内容占位符 2"/>
+          <p:cNvSpPr>
+            <a:spLocks noGrp="1"/>
+          </p:cNvSpPr>
+          <p:nvPr>
+            <p:ph idx="1"/>
+          </p:nvPr>
+        </p:nvSpPr>
+        <p:spPr/>
+        <p:txBody>
+          <a:bodyPr/>
+          <a:lstStyle/>
+          <a:p>
+            <a:r>
+              <a:rPr lang="en-US" altLang="zh-CN" dirty="0"/>
+              <a:t>Queries with Bounded Errors and Bounded Response Times on Very Large </a:t>
+            </a:r>
+            <a:r>
+              <a:rPr lang="en-US" altLang="zh-CN" dirty="0" smtClean="0"/>
+              <a:t>Data</a:t>
+            </a:r>
+          </a:p>
+          <a:p>
+            <a:endParaRPr lang="en-US" altLang="zh-CN" dirty="0"/>
+          </a:p>
+          <a:p>
+            <a:endParaRPr lang="zh-CN" altLang="en-US" dirty="0"/>
+          </a:p>
+        </p:txBody>
+      </p:sp>
+      <p:sp>
+        <p:nvSpPr>
+          <p:cNvPr id="5" name="文本框 4"/>
+          <p:cNvSpPr txBox="1"/>
+          <p:nvPr/>
+        </p:nvSpPr>
+        <p:spPr>
+          <a:xfrm>
+            <a:off x="9042400" y="6034505"/>
+            <a:ext cx="184666" cy="369332"/>
+          </a:xfrm>
+          <a:prstGeom prst="rect">
+            <a:avLst/>
+          </a:prstGeom>
+          <a:noFill/>
+        </p:spPr>
+        <p:txBody>
+          <a:bodyPr wrap="none" rtlCol="0">
+            <a:spAutoFit/>
+          </a:bodyPr>
+          <a:lstStyle/>
+          <a:p>
+            <a:endParaRPr kumimoji="1" lang="zh-CN" altLang="en-US" dirty="0">
+              <a:solidFill>
+                <a:prstClr val="black"/>
+              </a:solidFill>
+              <a:latin typeface="Calibri"/>
+              <a:ea typeface="宋体"/>
+            </a:endParaRPr>
+          </a:p>
+        </p:txBody>
+      </p:sp>
+      <p:sp>
+        <p:nvSpPr>
+          <p:cNvPr id="6" name="文本框 5"/>
+          <p:cNvSpPr txBox="1"/>
+          <p:nvPr/>
+        </p:nvSpPr>
+        <p:spPr>
+          <a:xfrm>
+            <a:off x="9194800" y="6186905"/>
+            <a:ext cx="184666" cy="369332"/>
+          </a:xfrm>
+          <a:prstGeom prst="rect">
+            <a:avLst/>
+          </a:prstGeom>
+          <a:noFill/>
+        </p:spPr>
+        <p:txBody>
+          <a:bodyPr wrap="none" rtlCol="0">
+            <a:spAutoFit/>
+          </a:bodyPr>
+          <a:lstStyle/>
+          <a:p>
+            <a:endParaRPr kumimoji="1" lang="zh-CN" altLang="en-US" dirty="0">
+              <a:solidFill>
+                <a:prstClr val="black"/>
+              </a:solidFill>
+              <a:latin typeface="Calibri"/>
+              <a:ea typeface="宋体"/>
+            </a:endParaRPr>
+          </a:p>
+        </p:txBody>
+      </p:sp>
+      <p:sp>
+        <p:nvSpPr>
+          <p:cNvPr id="7" name="文本框 6"/>
+          <p:cNvSpPr txBox="1"/>
+          <p:nvPr/>
+        </p:nvSpPr>
+        <p:spPr>
+          <a:xfrm>
+            <a:off x="8890000" y="5882105"/>
+            <a:ext cx="184666" cy="369332"/>
+          </a:xfrm>
+          <a:prstGeom prst="rect">
+            <a:avLst/>
+          </a:prstGeom>
+          <a:noFill/>
+        </p:spPr>
+        <p:txBody>
+          <a:bodyPr wrap="none" rtlCol="0">
+            <a:spAutoFit/>
+          </a:bodyPr>
+          <a:lstStyle/>
+          <a:p>
+            <a:endParaRPr kumimoji="1" lang="zh-CN" altLang="en-US" dirty="0">
+              <a:solidFill>
+                <a:prstClr val="black"/>
+              </a:solidFill>
+              <a:latin typeface="Calibri"/>
+              <a:ea typeface="宋体"/>
+            </a:endParaRPr>
+          </a:p>
+        </p:txBody>
+      </p:sp>
+      <p:sp>
+        <p:nvSpPr>
+          <p:cNvPr id="8" name="文本框 7"/>
+          <p:cNvSpPr txBox="1"/>
+          <p:nvPr/>
+        </p:nvSpPr>
+        <p:spPr>
+          <a:xfrm>
+            <a:off x="9042400" y="6034505"/>
+            <a:ext cx="184666" cy="369332"/>
+          </a:xfrm>
+          <a:prstGeom prst="rect">
+            <a:avLst/>
+          </a:prstGeom>
+          <a:noFill/>
+        </p:spPr>
+        <p:txBody>
+          <a:bodyPr wrap="none" rtlCol="0">
+            <a:spAutoFit/>
+          </a:bodyPr>
+          <a:lstStyle/>
+          <a:p>
+            <a:endParaRPr kumimoji="1" lang="zh-CN" altLang="en-US" dirty="0">
+              <a:solidFill>
+                <a:prstClr val="black"/>
+              </a:solidFill>
+              <a:latin typeface="Calibri"/>
+              <a:ea typeface="宋体"/>
+            </a:endParaRPr>
+          </a:p>
+        </p:txBody>
+      </p:sp>
+      <p:sp>
+        <p:nvSpPr>
+          <p:cNvPr id="9" name="文本框 8"/>
+          <p:cNvSpPr txBox="1"/>
+          <p:nvPr/>
+        </p:nvSpPr>
+        <p:spPr>
+          <a:xfrm>
+            <a:off x="9347200" y="6339305"/>
+            <a:ext cx="184666" cy="369332"/>
+          </a:xfrm>
+          <a:prstGeom prst="rect">
+            <a:avLst/>
+          </a:prstGeom>
+          <a:noFill/>
+        </p:spPr>
+        <p:txBody>
+          <a:bodyPr wrap="none" rtlCol="0">
+            <a:spAutoFit/>
+          </a:bodyPr>
+          <a:lstStyle/>
+          <a:p>
+            <a:endParaRPr kumimoji="1" lang="zh-CN" altLang="en-US" dirty="0">
+              <a:solidFill>
+                <a:prstClr val="black"/>
+              </a:solidFill>
+              <a:latin typeface="Calibri"/>
+              <a:ea typeface="宋体"/>
+            </a:endParaRPr>
+          </a:p>
+        </p:txBody>
+      </p:sp>
+      <p:pic>
+        <p:nvPicPr>
+          <p:cNvPr id="4" name="图片 3"/>
+          <p:cNvPicPr>
+            <a:picLocks noChangeAspect="1"/>
+          </p:cNvPicPr>
+          <p:nvPr/>
+        </p:nvPicPr>
+        <p:blipFill>
+          <a:blip r:embed="rId3"/>
+          <a:stretch>
+            <a:fillRect/>
+          </a:stretch>
+        </p:blipFill>
+        <p:spPr>
+          <a:xfrm>
+            <a:off x="468824" y="2708920"/>
+            <a:ext cx="8195706" cy="2592288"/>
+          </a:xfrm>
+          <a:prstGeom prst="rect">
+            <a:avLst/>
+          </a:prstGeom>
+        </p:spPr>
+      </p:pic>
+    </p:spTree>
+    <p:extLst>
+      <p:ext uri="{BB962C8B-B14F-4D97-AF65-F5344CB8AC3E}">
+        <p14:creationId xmlns:p14="http://schemas.microsoft.com/office/powerpoint/2010/main" val="2302750302"/>
+      </p:ext>
+    </p:extLst>
+  </p:cSld>
+  <p:clrMapOvr>
+    <a:masterClrMapping/>
+  </p:clrMapOvr>
+  <p:timing>
+    <p:tnLst>
+      <p:par>
+        <p:cTn xmlns:p14="http://schemas.microsoft.com/office/powerpoint/2010/main" id="1" dur="indefinite" restart="never" nodeType="tmRoot"/>
+      </p:par>
+    </p:tnLst>
+  </p:timing>
+</p:sld>
+</file>
+
+<file path=ppt/slides/slide27.xml><?xml version="1.0" encoding="utf-8"?>
+<p:sld xmlns:a="http://schemas.openxmlformats.org/drawingml/2006/main" xmlns:r="http://schemas.openxmlformats.org/officeDocument/2006/relationships" xmlns:p="http://schemas.openxmlformats.org/presentationml/2006/main">
+  <p:cSld>
+    <p:bg>
+      <p:bgPr>
+        <a:blipFill dpi="0" rotWithShape="1">
+          <a:blip r:embed="rId2">
+            <a:lum/>
+          </a:blip>
+          <a:srcRect/>
+          <a:stretch>
+            <a:fillRect/>
+          </a:stretch>
+        </a:blipFill>
+        <a:effectLst/>
+      </p:bgPr>
+    </p:bg>
+    <p:spTree>
+      <p:nvGrpSpPr>
+        <p:cNvPr id="1" name=""/>
+        <p:cNvGrpSpPr/>
+        <p:nvPr/>
+      </p:nvGrpSpPr>
+      <p:grpSpPr>
+        <a:xfrm>
+          <a:off x="0" y="0"/>
+          <a:ext cx="0" cy="0"/>
+          <a:chOff x="0" y="0"/>
+          <a:chExt cx="0" cy="0"/>
+        </a:xfrm>
+      </p:grpSpPr>
+      <p:sp>
+        <p:nvSpPr>
+          <p:cNvPr id="2" name="标题 1"/>
+          <p:cNvSpPr>
+            <a:spLocks noGrp="1"/>
+          </p:cNvSpPr>
+          <p:nvPr>
+            <p:ph type="title"/>
+          </p:nvPr>
+        </p:nvSpPr>
+        <p:spPr>
+          <a:xfrm>
+            <a:off x="395536" y="404664"/>
+            <a:ext cx="8229600" cy="1143000"/>
+          </a:xfrm>
+        </p:spPr>
+        <p:txBody>
+          <a:bodyPr/>
+          <a:lstStyle/>
+          <a:p>
             <a:endParaRPr lang="zh-CN" altLang="en-US" dirty="0"/>
           </a:p>
         </p:txBody>
@@ -36039,7 +36327,7 @@
 </p:sld>
 </file>
 
-<file path=ppt/slides/slide27.xml><?xml version="1.0" encoding="utf-8"?>
+<file path=ppt/slides/slide28.xml><?xml version="1.0" encoding="utf-8"?>
 <p:sld xmlns:a="http://schemas.openxmlformats.org/drawingml/2006/main" xmlns:r="http://schemas.openxmlformats.org/officeDocument/2006/relationships" xmlns:p="http://schemas.openxmlformats.org/presentationml/2006/main">
   <p:cSld>
     <p:bg>

</xml_diff>

<commit_message>
add Spark releasd version
</commit_message>
<xml_diff>
--- a/SACC2014/SACC2014.pptx
+++ b/SACC2014/SACC2014.pptx
@@ -15,32 +15,33 @@
   <p:sldIdLst>
     <p:sldId id="256" r:id="rId10"/>
     <p:sldId id="284" r:id="rId11"/>
-    <p:sldId id="257" r:id="rId12"/>
-    <p:sldId id="259" r:id="rId13"/>
-    <p:sldId id="260" r:id="rId14"/>
-    <p:sldId id="261" r:id="rId15"/>
-    <p:sldId id="262" r:id="rId16"/>
-    <p:sldId id="263" r:id="rId17"/>
-    <p:sldId id="267" r:id="rId18"/>
-    <p:sldId id="264" r:id="rId19"/>
-    <p:sldId id="277" r:id="rId20"/>
-    <p:sldId id="278" r:id="rId21"/>
-    <p:sldId id="280" r:id="rId22"/>
-    <p:sldId id="281" r:id="rId23"/>
-    <p:sldId id="285" r:id="rId24"/>
-    <p:sldId id="265" r:id="rId25"/>
-    <p:sldId id="266" r:id="rId26"/>
-    <p:sldId id="268" r:id="rId27"/>
-    <p:sldId id="269" r:id="rId28"/>
-    <p:sldId id="270" r:id="rId29"/>
-    <p:sldId id="271" r:id="rId30"/>
-    <p:sldId id="272" r:id="rId31"/>
-    <p:sldId id="273" r:id="rId32"/>
-    <p:sldId id="274" r:id="rId33"/>
-    <p:sldId id="275" r:id="rId34"/>
-    <p:sldId id="276" r:id="rId35"/>
-    <p:sldId id="283" r:id="rId36"/>
-    <p:sldId id="258" r:id="rId37"/>
+    <p:sldId id="286" r:id="rId12"/>
+    <p:sldId id="257" r:id="rId13"/>
+    <p:sldId id="259" r:id="rId14"/>
+    <p:sldId id="260" r:id="rId15"/>
+    <p:sldId id="261" r:id="rId16"/>
+    <p:sldId id="262" r:id="rId17"/>
+    <p:sldId id="263" r:id="rId18"/>
+    <p:sldId id="267" r:id="rId19"/>
+    <p:sldId id="264" r:id="rId20"/>
+    <p:sldId id="277" r:id="rId21"/>
+    <p:sldId id="278" r:id="rId22"/>
+    <p:sldId id="280" r:id="rId23"/>
+    <p:sldId id="281" r:id="rId24"/>
+    <p:sldId id="285" r:id="rId25"/>
+    <p:sldId id="265" r:id="rId26"/>
+    <p:sldId id="266" r:id="rId27"/>
+    <p:sldId id="268" r:id="rId28"/>
+    <p:sldId id="269" r:id="rId29"/>
+    <p:sldId id="270" r:id="rId30"/>
+    <p:sldId id="271" r:id="rId31"/>
+    <p:sldId id="272" r:id="rId32"/>
+    <p:sldId id="273" r:id="rId33"/>
+    <p:sldId id="274" r:id="rId34"/>
+    <p:sldId id="275" r:id="rId35"/>
+    <p:sldId id="276" r:id="rId36"/>
+    <p:sldId id="283" r:id="rId37"/>
+    <p:sldId id="258" r:id="rId38"/>
   </p:sldIdLst>
   <p:sldSz cx="9144000" cy="6858000" type="screen4x3"/>
   <p:notesSz cx="6858000" cy="9144000"/>
@@ -141,7 +142,7 @@
   </p:defaultTextStyle>
   <p:extLst>
     <p:ext uri="{EFAFB233-063F-42B5-8137-9DF3F51BA10A}">
-      <p15:sldGuideLst xmlns="" xmlns:p15="http://schemas.microsoft.com/office/powerpoint/2012/main">
+      <p15:sldGuideLst xmlns:p15="http://schemas.microsoft.com/office/powerpoint/2012/main" xmlns="">
         <p15:guide id="1" orient="horz" pos="2160">
           <p15:clr>
             <a:srgbClr val="A4A3A4"/>
@@ -339,7 +340,7 @@
           <a:p>
             <a:fld id="{530820CF-B880-4189-942D-D702A7CBA730}" type="datetimeFigureOut">
               <a:rPr lang="zh-CN" altLang="en-US" smtClean="0"/>
-              <a:t>14-9-6</a:t>
+              <a:t>14-9-8</a:t>
             </a:fld>
             <a:endParaRPr lang="zh-CN" altLang="en-US"/>
           </a:p>
@@ -504,7 +505,7 @@
           <a:p>
             <a:fld id="{530820CF-B880-4189-942D-D702A7CBA730}" type="datetimeFigureOut">
               <a:rPr lang="zh-CN" altLang="en-US" smtClean="0"/>
-              <a:t>14-9-6</a:t>
+              <a:t>14-9-8</a:t>
             </a:fld>
             <a:endParaRPr lang="zh-CN" altLang="en-US"/>
           </a:p>
@@ -679,7 +680,7 @@
           <a:p>
             <a:fld id="{530820CF-B880-4189-942D-D702A7CBA730}" type="datetimeFigureOut">
               <a:rPr lang="zh-CN" altLang="en-US" smtClean="0"/>
-              <a:t>14-9-6</a:t>
+              <a:t>14-9-8</a:t>
             </a:fld>
             <a:endParaRPr lang="zh-CN" altLang="en-US"/>
           </a:p>
@@ -925,7 +926,7 @@
                 <a:ea typeface="宋体"/>
               </a:rPr>
               <a:pPr/>
-              <a:t>14-9-6</a:t>
+              <a:t>14-9-8</a:t>
             </a:fld>
             <a:endParaRPr lang="zh-CN" altLang="en-US">
               <a:solidFill>
@@ -1137,7 +1138,7 @@
                 <a:ea typeface="宋体"/>
               </a:rPr>
               <a:pPr/>
-              <a:t>14-9-6</a:t>
+              <a:t>14-9-8</a:t>
             </a:fld>
             <a:endParaRPr lang="zh-CN" altLang="en-US">
               <a:solidFill>
@@ -1425,7 +1426,7 @@
                 <a:ea typeface="宋体"/>
               </a:rPr>
               <a:pPr/>
-              <a:t>14-9-6</a:t>
+              <a:t>14-9-8</a:t>
             </a:fld>
             <a:endParaRPr lang="zh-CN" altLang="en-US">
               <a:solidFill>
@@ -1755,7 +1756,7 @@
                 <a:ea typeface="宋体"/>
               </a:rPr>
               <a:pPr/>
-              <a:t>14-9-6</a:t>
+              <a:t>14-9-8</a:t>
             </a:fld>
             <a:endParaRPr lang="zh-CN" altLang="en-US">
               <a:solidFill>
@@ -2219,7 +2220,7 @@
                 <a:ea typeface="宋体"/>
               </a:rPr>
               <a:pPr/>
-              <a:t>14-9-6</a:t>
+              <a:t>14-9-8</a:t>
             </a:fld>
             <a:endParaRPr lang="zh-CN" altLang="en-US">
               <a:solidFill>
@@ -2379,7 +2380,7 @@
                 <a:ea typeface="宋体"/>
               </a:rPr>
               <a:pPr/>
-              <a:t>14-9-6</a:t>
+              <a:t>14-9-8</a:t>
             </a:fld>
             <a:endParaRPr lang="zh-CN" altLang="en-US">
               <a:solidFill>
@@ -2516,7 +2517,7 @@
                 <a:ea typeface="宋体"/>
               </a:rPr>
               <a:pPr/>
-              <a:t>14-9-6</a:t>
+              <a:t>14-9-8</a:t>
             </a:fld>
             <a:endParaRPr lang="zh-CN" altLang="en-US">
               <a:solidFill>
@@ -2835,7 +2836,7 @@
                 <a:ea typeface="宋体"/>
               </a:rPr>
               <a:pPr/>
-              <a:t>14-9-6</a:t>
+              <a:t>14-9-8</a:t>
             </a:fld>
             <a:endParaRPr lang="zh-CN" altLang="en-US">
               <a:solidFill>
@@ -3038,7 +3039,7 @@
           <a:p>
             <a:fld id="{530820CF-B880-4189-942D-D702A7CBA730}" type="datetimeFigureOut">
               <a:rPr lang="zh-CN" altLang="en-US" smtClean="0"/>
-              <a:t>14-9-6</a:t>
+              <a:t>14-9-8</a:t>
             </a:fld>
             <a:endParaRPr lang="zh-CN" altLang="en-US"/>
           </a:p>
@@ -3295,7 +3296,7 @@
                 <a:ea typeface="宋体"/>
               </a:rPr>
               <a:pPr/>
-              <a:t>14-9-6</a:t>
+              <a:t>14-9-8</a:t>
             </a:fld>
             <a:endParaRPr lang="zh-CN" altLang="en-US">
               <a:solidFill>
@@ -3507,7 +3508,7 @@
                 <a:ea typeface="宋体"/>
               </a:rPr>
               <a:pPr/>
-              <a:t>14-9-6</a:t>
+              <a:t>14-9-8</a:t>
             </a:fld>
             <a:endParaRPr lang="zh-CN" altLang="en-US">
               <a:solidFill>
@@ -3729,7 +3730,7 @@
                 <a:ea typeface="宋体"/>
               </a:rPr>
               <a:pPr/>
-              <a:t>14-9-6</a:t>
+              <a:t>14-9-8</a:t>
             </a:fld>
             <a:endParaRPr lang="zh-CN" altLang="en-US">
               <a:solidFill>
@@ -4013,7 +4014,7 @@
                 <a:ea typeface="宋体"/>
               </a:rPr>
               <a:pPr/>
-              <a:t>14-9-6</a:t>
+              <a:t>14-9-8</a:t>
             </a:fld>
             <a:endParaRPr lang="zh-CN" altLang="en-US">
               <a:solidFill>
@@ -4225,7 +4226,7 @@
                 <a:ea typeface="宋体"/>
               </a:rPr>
               <a:pPr/>
-              <a:t>14-9-6</a:t>
+              <a:t>14-9-8</a:t>
             </a:fld>
             <a:endParaRPr lang="zh-CN" altLang="en-US">
               <a:solidFill>
@@ -4513,7 +4514,7 @@
                 <a:ea typeface="宋体"/>
               </a:rPr>
               <a:pPr/>
-              <a:t>14-9-6</a:t>
+              <a:t>14-9-8</a:t>
             </a:fld>
             <a:endParaRPr lang="zh-CN" altLang="en-US">
               <a:solidFill>
@@ -4843,7 +4844,7 @@
                 <a:ea typeface="宋体"/>
               </a:rPr>
               <a:pPr/>
-              <a:t>14-9-6</a:t>
+              <a:t>14-9-8</a:t>
             </a:fld>
             <a:endParaRPr lang="zh-CN" altLang="en-US">
               <a:solidFill>
@@ -5307,7 +5308,7 @@
                 <a:ea typeface="宋体"/>
               </a:rPr>
               <a:pPr/>
-              <a:t>14-9-6</a:t>
+              <a:t>14-9-8</a:t>
             </a:fld>
             <a:endParaRPr lang="zh-CN" altLang="en-US">
               <a:solidFill>
@@ -5467,7 +5468,7 @@
                 <a:ea typeface="宋体"/>
               </a:rPr>
               <a:pPr/>
-              <a:t>14-9-6</a:t>
+              <a:t>14-9-8</a:t>
             </a:fld>
             <a:endParaRPr lang="zh-CN" altLang="en-US">
               <a:solidFill>
@@ -5604,7 +5605,7 @@
                 <a:ea typeface="宋体"/>
               </a:rPr>
               <a:pPr/>
-              <a:t>14-9-6</a:t>
+              <a:t>14-9-8</a:t>
             </a:fld>
             <a:endParaRPr lang="zh-CN" altLang="en-US">
               <a:solidFill>
@@ -5883,7 +5884,7 @@
           <a:p>
             <a:fld id="{530820CF-B880-4189-942D-D702A7CBA730}" type="datetimeFigureOut">
               <a:rPr lang="zh-CN" altLang="en-US" smtClean="0"/>
-              <a:t>14-9-6</a:t>
+              <a:t>14-9-8</a:t>
             </a:fld>
             <a:endParaRPr lang="zh-CN" altLang="en-US"/>
           </a:p>
@@ -6164,7 +6165,7 @@
                 <a:ea typeface="宋体"/>
               </a:rPr>
               <a:pPr/>
-              <a:t>14-9-6</a:t>
+              <a:t>14-9-8</a:t>
             </a:fld>
             <a:endParaRPr lang="zh-CN" altLang="en-US">
               <a:solidFill>
@@ -6459,7 +6460,7 @@
                 <a:ea typeface="宋体"/>
               </a:rPr>
               <a:pPr/>
-              <a:t>14-9-6</a:t>
+              <a:t>14-9-8</a:t>
             </a:fld>
             <a:endParaRPr lang="zh-CN" altLang="en-US">
               <a:solidFill>
@@ -6671,7 +6672,7 @@
                 <a:ea typeface="宋体"/>
               </a:rPr>
               <a:pPr/>
-              <a:t>14-9-6</a:t>
+              <a:t>14-9-8</a:t>
             </a:fld>
             <a:endParaRPr lang="zh-CN" altLang="en-US">
               <a:solidFill>
@@ -6893,7 +6894,7 @@
                 <a:ea typeface="宋体"/>
               </a:rPr>
               <a:pPr/>
-              <a:t>14-9-6</a:t>
+              <a:t>14-9-8</a:t>
             </a:fld>
             <a:endParaRPr lang="zh-CN" altLang="en-US">
               <a:solidFill>
@@ -7177,7 +7178,7 @@
                 <a:ea typeface="宋体"/>
               </a:rPr>
               <a:pPr/>
-              <a:t>14-9-6</a:t>
+              <a:t>14-9-8</a:t>
             </a:fld>
             <a:endParaRPr lang="zh-CN" altLang="en-US">
               <a:solidFill>
@@ -7389,7 +7390,7 @@
                 <a:ea typeface="宋体"/>
               </a:rPr>
               <a:pPr/>
-              <a:t>14-9-6</a:t>
+              <a:t>14-9-8</a:t>
             </a:fld>
             <a:endParaRPr lang="zh-CN" altLang="en-US">
               <a:solidFill>
@@ -7677,7 +7678,7 @@
                 <a:ea typeface="宋体"/>
               </a:rPr>
               <a:pPr/>
-              <a:t>14-9-6</a:t>
+              <a:t>14-9-8</a:t>
             </a:fld>
             <a:endParaRPr lang="zh-CN" altLang="en-US">
               <a:solidFill>
@@ -8007,7 +8008,7 @@
                 <a:ea typeface="宋体"/>
               </a:rPr>
               <a:pPr/>
-              <a:t>14-9-6</a:t>
+              <a:t>14-9-8</a:t>
             </a:fld>
             <a:endParaRPr lang="zh-CN" altLang="en-US">
               <a:solidFill>
@@ -8471,7 +8472,7 @@
                 <a:ea typeface="宋体"/>
               </a:rPr>
               <a:pPr/>
-              <a:t>14-9-6</a:t>
+              <a:t>14-9-8</a:t>
             </a:fld>
             <a:endParaRPr lang="zh-CN" altLang="en-US">
               <a:solidFill>
@@ -8631,7 +8632,7 @@
                 <a:ea typeface="宋体"/>
               </a:rPr>
               <a:pPr/>
-              <a:t>14-9-6</a:t>
+              <a:t>14-9-8</a:t>
             </a:fld>
             <a:endParaRPr lang="zh-CN" altLang="en-US">
               <a:solidFill>
@@ -8952,7 +8953,7 @@
           <a:p>
             <a:fld id="{530820CF-B880-4189-942D-D702A7CBA730}" type="datetimeFigureOut">
               <a:rPr lang="zh-CN" altLang="en-US" smtClean="0"/>
-              <a:t>14-9-6</a:t>
+              <a:t>14-9-8</a:t>
             </a:fld>
             <a:endParaRPr lang="zh-CN" altLang="en-US"/>
           </a:p>
@@ -9051,7 +9052,7 @@
                 <a:ea typeface="宋体"/>
               </a:rPr>
               <a:pPr/>
-              <a:t>14-9-6</a:t>
+              <a:t>14-9-8</a:t>
             </a:fld>
             <a:endParaRPr lang="zh-CN" altLang="en-US">
               <a:solidFill>
@@ -9370,7 +9371,7 @@
                 <a:ea typeface="宋体"/>
               </a:rPr>
               <a:pPr/>
-              <a:t>14-9-6</a:t>
+              <a:t>14-9-8</a:t>
             </a:fld>
             <a:endParaRPr lang="zh-CN" altLang="en-US">
               <a:solidFill>
@@ -9665,7 +9666,7 @@
                 <a:ea typeface="宋体"/>
               </a:rPr>
               <a:pPr/>
-              <a:t>14-9-6</a:t>
+              <a:t>14-9-8</a:t>
             </a:fld>
             <a:endParaRPr lang="zh-CN" altLang="en-US">
               <a:solidFill>
@@ -9877,7 +9878,7 @@
                 <a:ea typeface="宋体"/>
               </a:rPr>
               <a:pPr/>
-              <a:t>14-9-6</a:t>
+              <a:t>14-9-8</a:t>
             </a:fld>
             <a:endParaRPr lang="zh-CN" altLang="en-US">
               <a:solidFill>
@@ -10099,7 +10100,7 @@
                 <a:ea typeface="宋体"/>
               </a:rPr>
               <a:pPr/>
-              <a:t>14-9-6</a:t>
+              <a:t>14-9-8</a:t>
             </a:fld>
             <a:endParaRPr lang="zh-CN" altLang="en-US">
               <a:solidFill>
@@ -10383,7 +10384,7 @@
                 <a:ea typeface="宋体"/>
               </a:rPr>
               <a:pPr/>
-              <a:t>14-9-6</a:t>
+              <a:t>14-9-8</a:t>
             </a:fld>
             <a:endParaRPr lang="zh-CN" altLang="en-US">
               <a:solidFill>
@@ -10595,7 +10596,7 @@
                 <a:ea typeface="宋体"/>
               </a:rPr>
               <a:pPr/>
-              <a:t>14-9-6</a:t>
+              <a:t>14-9-8</a:t>
             </a:fld>
             <a:endParaRPr lang="zh-CN" altLang="en-US">
               <a:solidFill>
@@ -10883,7 +10884,7 @@
                 <a:ea typeface="宋体"/>
               </a:rPr>
               <a:pPr/>
-              <a:t>14-9-6</a:t>
+              <a:t>14-9-8</a:t>
             </a:fld>
             <a:endParaRPr lang="zh-CN" altLang="en-US">
               <a:solidFill>
@@ -11213,7 +11214,7 @@
                 <a:ea typeface="宋体"/>
               </a:rPr>
               <a:pPr/>
-              <a:t>14-9-6</a:t>
+              <a:t>14-9-8</a:t>
             </a:fld>
             <a:endParaRPr lang="zh-CN" altLang="en-US">
               <a:solidFill>
@@ -11677,7 +11678,7 @@
                 <a:ea typeface="宋体"/>
               </a:rPr>
               <a:pPr/>
-              <a:t>14-9-6</a:t>
+              <a:t>14-9-8</a:t>
             </a:fld>
             <a:endParaRPr lang="zh-CN" altLang="en-US">
               <a:solidFill>
@@ -12132,7 +12133,7 @@
           <a:p>
             <a:fld id="{530820CF-B880-4189-942D-D702A7CBA730}" type="datetimeFigureOut">
               <a:rPr lang="zh-CN" altLang="en-US" smtClean="0"/>
-              <a:t>14-9-6</a:t>
+              <a:t>14-9-8</a:t>
             </a:fld>
             <a:endParaRPr lang="zh-CN" altLang="en-US"/>
           </a:p>
@@ -12254,7 +12255,7 @@
                 <a:ea typeface="宋体"/>
               </a:rPr>
               <a:pPr/>
-              <a:t>14-9-6</a:t>
+              <a:t>14-9-8</a:t>
             </a:fld>
             <a:endParaRPr lang="zh-CN" altLang="en-US">
               <a:solidFill>
@@ -12391,7 +12392,7 @@
                 <a:ea typeface="宋体"/>
               </a:rPr>
               <a:pPr/>
-              <a:t>14-9-6</a:t>
+              <a:t>14-9-8</a:t>
             </a:fld>
             <a:endParaRPr lang="zh-CN" altLang="en-US">
               <a:solidFill>
@@ -12710,7 +12711,7 @@
                 <a:ea typeface="宋体"/>
               </a:rPr>
               <a:pPr/>
-              <a:t>14-9-6</a:t>
+              <a:t>14-9-8</a:t>
             </a:fld>
             <a:endParaRPr lang="zh-CN" altLang="en-US">
               <a:solidFill>
@@ -13005,7 +13006,7 @@
                 <a:ea typeface="宋体"/>
               </a:rPr>
               <a:pPr/>
-              <a:t>14-9-6</a:t>
+              <a:t>14-9-8</a:t>
             </a:fld>
             <a:endParaRPr lang="zh-CN" altLang="en-US">
               <a:solidFill>
@@ -13217,7 +13218,7 @@
                 <a:ea typeface="宋体"/>
               </a:rPr>
               <a:pPr/>
-              <a:t>14-9-6</a:t>
+              <a:t>14-9-8</a:t>
             </a:fld>
             <a:endParaRPr lang="zh-CN" altLang="en-US">
               <a:solidFill>
@@ -13439,7 +13440,7 @@
                 <a:ea typeface="宋体"/>
               </a:rPr>
               <a:pPr/>
-              <a:t>14-9-6</a:t>
+              <a:t>14-9-8</a:t>
             </a:fld>
             <a:endParaRPr lang="zh-CN" altLang="en-US">
               <a:solidFill>
@@ -13723,7 +13724,7 @@
                 <a:ea typeface="宋体"/>
               </a:rPr>
               <a:pPr/>
-              <a:t>14-9-6</a:t>
+              <a:t>14-9-8</a:t>
             </a:fld>
             <a:endParaRPr lang="zh-CN" altLang="en-US">
               <a:solidFill>
@@ -13935,7 +13936,7 @@
                 <a:ea typeface="宋体"/>
               </a:rPr>
               <a:pPr/>
-              <a:t>14-9-6</a:t>
+              <a:t>14-9-8</a:t>
             </a:fld>
             <a:endParaRPr lang="zh-CN" altLang="en-US">
               <a:solidFill>
@@ -14223,7 +14224,7 @@
                 <a:ea typeface="宋体"/>
               </a:rPr>
               <a:pPr/>
-              <a:t>14-9-6</a:t>
+              <a:t>14-9-8</a:t>
             </a:fld>
             <a:endParaRPr lang="zh-CN" altLang="en-US">
               <a:solidFill>
@@ -14553,7 +14554,7 @@
                 <a:ea typeface="宋体"/>
               </a:rPr>
               <a:pPr/>
-              <a:t>14-9-6</a:t>
+              <a:t>14-9-8</a:t>
             </a:fld>
             <a:endParaRPr lang="zh-CN" altLang="en-US">
               <a:solidFill>
@@ -14704,7 +14705,7 @@
           <a:p>
             <a:fld id="{530820CF-B880-4189-942D-D702A7CBA730}" type="datetimeFigureOut">
               <a:rPr lang="zh-CN" altLang="en-US" smtClean="0"/>
-              <a:t>14-9-6</a:t>
+              <a:t>14-9-8</a:t>
             </a:fld>
             <a:endParaRPr lang="zh-CN" altLang="en-US"/>
           </a:p>
@@ -15130,7 +15131,7 @@
                 <a:ea typeface="宋体"/>
               </a:rPr>
               <a:pPr/>
-              <a:t>14-9-6</a:t>
+              <a:t>14-9-8</a:t>
             </a:fld>
             <a:endParaRPr lang="zh-CN" altLang="en-US">
               <a:solidFill>
@@ -15290,7 +15291,7 @@
                 <a:ea typeface="宋体"/>
               </a:rPr>
               <a:pPr/>
-              <a:t>14-9-6</a:t>
+              <a:t>14-9-8</a:t>
             </a:fld>
             <a:endParaRPr lang="zh-CN" altLang="en-US">
               <a:solidFill>
@@ -15427,7 +15428,7 @@
                 <a:ea typeface="宋体"/>
               </a:rPr>
               <a:pPr/>
-              <a:t>14-9-6</a:t>
+              <a:t>14-9-8</a:t>
             </a:fld>
             <a:endParaRPr lang="zh-CN" altLang="en-US">
               <a:solidFill>
@@ -15746,7 +15747,7 @@
                 <a:ea typeface="宋体"/>
               </a:rPr>
               <a:pPr/>
-              <a:t>14-9-6</a:t>
+              <a:t>14-9-8</a:t>
             </a:fld>
             <a:endParaRPr lang="zh-CN" altLang="en-US">
               <a:solidFill>
@@ -16041,7 +16042,7 @@
                 <a:ea typeface="宋体"/>
               </a:rPr>
               <a:pPr/>
-              <a:t>14-9-6</a:t>
+              <a:t>14-9-8</a:t>
             </a:fld>
             <a:endParaRPr lang="zh-CN" altLang="en-US">
               <a:solidFill>
@@ -16253,7 +16254,7 @@
                 <a:ea typeface="宋体"/>
               </a:rPr>
               <a:pPr/>
-              <a:t>14-9-6</a:t>
+              <a:t>14-9-8</a:t>
             </a:fld>
             <a:endParaRPr lang="zh-CN" altLang="en-US">
               <a:solidFill>
@@ -16475,7 +16476,7 @@
                 <a:ea typeface="宋体"/>
               </a:rPr>
               <a:pPr/>
-              <a:t>14-9-6</a:t>
+              <a:t>14-9-8</a:t>
             </a:fld>
             <a:endParaRPr lang="zh-CN" altLang="en-US">
               <a:solidFill>
@@ -16759,7 +16760,7 @@
                 <a:ea typeface="宋体"/>
               </a:rPr>
               <a:pPr/>
-              <a:t>14-9-6</a:t>
+              <a:t>14-9-8</a:t>
             </a:fld>
             <a:endParaRPr lang="zh-CN" altLang="en-US">
               <a:solidFill>
@@ -16971,7 +16972,7 @@
                 <a:ea typeface="宋体"/>
               </a:rPr>
               <a:pPr/>
-              <a:t>14-9-6</a:t>
+              <a:t>14-9-8</a:t>
             </a:fld>
             <a:endParaRPr lang="zh-CN" altLang="en-US">
               <a:solidFill>
@@ -17259,7 +17260,7 @@
                 <a:ea typeface="宋体"/>
               </a:rPr>
               <a:pPr/>
-              <a:t>14-9-6</a:t>
+              <a:t>14-9-8</a:t>
             </a:fld>
             <a:endParaRPr lang="zh-CN" altLang="en-US">
               <a:solidFill>
@@ -17387,7 +17388,7 @@
           <a:p>
             <a:fld id="{530820CF-B880-4189-942D-D702A7CBA730}" type="datetimeFigureOut">
               <a:rPr lang="zh-CN" altLang="en-US" smtClean="0"/>
-              <a:t>14-9-6</a:t>
+              <a:t>14-9-8</a:t>
             </a:fld>
             <a:endParaRPr lang="zh-CN" altLang="en-US"/>
           </a:p>
@@ -17679,7 +17680,7 @@
                 <a:ea typeface="宋体"/>
               </a:rPr>
               <a:pPr/>
-              <a:t>14-9-6</a:t>
+              <a:t>14-9-8</a:t>
             </a:fld>
             <a:endParaRPr lang="zh-CN" altLang="en-US">
               <a:solidFill>
@@ -18143,7 +18144,7 @@
                 <a:ea typeface="宋体"/>
               </a:rPr>
               <a:pPr/>
-              <a:t>14-9-6</a:t>
+              <a:t>14-9-8</a:t>
             </a:fld>
             <a:endParaRPr lang="zh-CN" altLang="en-US">
               <a:solidFill>
@@ -18303,7 +18304,7 @@
                 <a:ea typeface="宋体"/>
               </a:rPr>
               <a:pPr/>
-              <a:t>14-9-6</a:t>
+              <a:t>14-9-8</a:t>
             </a:fld>
             <a:endParaRPr lang="zh-CN" altLang="en-US">
               <a:solidFill>
@@ -18440,7 +18441,7 @@
                 <a:ea typeface="宋体"/>
               </a:rPr>
               <a:pPr/>
-              <a:t>14-9-6</a:t>
+              <a:t>14-9-8</a:t>
             </a:fld>
             <a:endParaRPr lang="zh-CN" altLang="en-US">
               <a:solidFill>
@@ -18759,7 +18760,7 @@
                 <a:ea typeface="宋体"/>
               </a:rPr>
               <a:pPr/>
-              <a:t>14-9-6</a:t>
+              <a:t>14-9-8</a:t>
             </a:fld>
             <a:endParaRPr lang="zh-CN" altLang="en-US">
               <a:solidFill>
@@ -19054,7 +19055,7 @@
                 <a:ea typeface="宋体"/>
               </a:rPr>
               <a:pPr/>
-              <a:t>14-9-6</a:t>
+              <a:t>14-9-8</a:t>
             </a:fld>
             <a:endParaRPr lang="zh-CN" altLang="en-US">
               <a:solidFill>
@@ -19266,7 +19267,7 @@
                 <a:ea typeface="宋体"/>
               </a:rPr>
               <a:pPr/>
-              <a:t>14-9-6</a:t>
+              <a:t>14-9-8</a:t>
             </a:fld>
             <a:endParaRPr lang="zh-CN" altLang="en-US">
               <a:solidFill>
@@ -19488,7 +19489,7 @@
                 <a:ea typeface="宋体"/>
               </a:rPr>
               <a:pPr/>
-              <a:t>14-9-6</a:t>
+              <a:t>14-9-8</a:t>
             </a:fld>
             <a:endParaRPr lang="zh-CN" altLang="en-US">
               <a:solidFill>
@@ -19772,7 +19773,7 @@
                 <a:ea typeface="宋体"/>
               </a:rPr>
               <a:pPr/>
-              <a:t>14-9-6</a:t>
+              <a:t>14-9-8</a:t>
             </a:fld>
             <a:endParaRPr lang="zh-CN" altLang="en-US">
               <a:solidFill>
@@ -19984,7 +19985,7 @@
                 <a:ea typeface="宋体"/>
               </a:rPr>
               <a:pPr/>
-              <a:t>14-9-6</a:t>
+              <a:t>14-9-8</a:t>
             </a:fld>
             <a:endParaRPr lang="zh-CN" altLang="en-US">
               <a:solidFill>
@@ -20294,7 +20295,7 @@
           <a:p>
             <a:fld id="{530820CF-B880-4189-942D-D702A7CBA730}" type="datetimeFigureOut">
               <a:rPr lang="zh-CN" altLang="en-US" smtClean="0"/>
-              <a:t>14-9-6</a:t>
+              <a:t>14-9-8</a:t>
             </a:fld>
             <a:endParaRPr lang="zh-CN" altLang="en-US"/>
           </a:p>
@@ -20544,7 +20545,7 @@
                 <a:ea typeface="宋体"/>
               </a:rPr>
               <a:pPr/>
-              <a:t>14-9-6</a:t>
+              <a:t>14-9-8</a:t>
             </a:fld>
             <a:endParaRPr lang="zh-CN" altLang="en-US">
               <a:solidFill>
@@ -20874,7 +20875,7 @@
                 <a:ea typeface="宋体"/>
               </a:rPr>
               <a:pPr/>
-              <a:t>14-9-6</a:t>
+              <a:t>14-9-8</a:t>
             </a:fld>
             <a:endParaRPr lang="zh-CN" altLang="en-US">
               <a:solidFill>
@@ -21338,7 +21339,7 @@
                 <a:ea typeface="宋体"/>
               </a:rPr>
               <a:pPr/>
-              <a:t>14-9-6</a:t>
+              <a:t>14-9-8</a:t>
             </a:fld>
             <a:endParaRPr lang="zh-CN" altLang="en-US">
               <a:solidFill>
@@ -21498,7 +21499,7 @@
                 <a:ea typeface="宋体"/>
               </a:rPr>
               <a:pPr/>
-              <a:t>14-9-6</a:t>
+              <a:t>14-9-8</a:t>
             </a:fld>
             <a:endParaRPr lang="zh-CN" altLang="en-US">
               <a:solidFill>
@@ -21635,7 +21636,7 @@
                 <a:ea typeface="宋体"/>
               </a:rPr>
               <a:pPr/>
-              <a:t>14-9-6</a:t>
+              <a:t>14-9-8</a:t>
             </a:fld>
             <a:endParaRPr lang="zh-CN" altLang="en-US">
               <a:solidFill>
@@ -21954,7 +21955,7 @@
                 <a:ea typeface="宋体"/>
               </a:rPr>
               <a:pPr/>
-              <a:t>14-9-6</a:t>
+              <a:t>14-9-8</a:t>
             </a:fld>
             <a:endParaRPr lang="zh-CN" altLang="en-US">
               <a:solidFill>
@@ -22249,7 +22250,7 @@
                 <a:ea typeface="宋体"/>
               </a:rPr>
               <a:pPr/>
-              <a:t>14-9-6</a:t>
+              <a:t>14-9-8</a:t>
             </a:fld>
             <a:endParaRPr lang="zh-CN" altLang="en-US">
               <a:solidFill>
@@ -22461,7 +22462,7 @@
                 <a:ea typeface="宋体"/>
               </a:rPr>
               <a:pPr/>
-              <a:t>14-9-6</a:t>
+              <a:t>14-9-8</a:t>
             </a:fld>
             <a:endParaRPr lang="zh-CN" altLang="en-US">
               <a:solidFill>
@@ -22683,7 +22684,7 @@
                 <a:ea typeface="宋体"/>
               </a:rPr>
               <a:pPr/>
-              <a:t>14-9-6</a:t>
+              <a:t>14-9-8</a:t>
             </a:fld>
             <a:endParaRPr lang="zh-CN" altLang="en-US">
               <a:solidFill>
@@ -22967,7 +22968,7 @@
                 <a:ea typeface="宋体"/>
               </a:rPr>
               <a:pPr/>
-              <a:t>14-9-6</a:t>
+              <a:t>14-9-8</a:t>
             </a:fld>
             <a:endParaRPr lang="zh-CN" altLang="en-US">
               <a:solidFill>
@@ -23253,7 +23254,7 @@
           <a:p>
             <a:fld id="{530820CF-B880-4189-942D-D702A7CBA730}" type="datetimeFigureOut">
               <a:rPr lang="zh-CN" altLang="en-US" smtClean="0"/>
-              <a:t>14-9-6</a:t>
+              <a:t>14-9-8</a:t>
             </a:fld>
             <a:endParaRPr lang="zh-CN" altLang="en-US"/>
           </a:p>
@@ -23427,7 +23428,7 @@
                 <a:ea typeface="宋体"/>
               </a:rPr>
               <a:pPr/>
-              <a:t>14-9-6</a:t>
+              <a:t>14-9-8</a:t>
             </a:fld>
             <a:endParaRPr lang="zh-CN" altLang="en-US">
               <a:solidFill>
@@ -23715,7 +23716,7 @@
                 <a:ea typeface="宋体"/>
               </a:rPr>
               <a:pPr/>
-              <a:t>14-9-6</a:t>
+              <a:t>14-9-8</a:t>
             </a:fld>
             <a:endParaRPr lang="zh-CN" altLang="en-US">
               <a:solidFill>
@@ -24045,7 +24046,7 @@
                 <a:ea typeface="宋体"/>
               </a:rPr>
               <a:pPr/>
-              <a:t>14-9-6</a:t>
+              <a:t>14-9-8</a:t>
             </a:fld>
             <a:endParaRPr lang="zh-CN" altLang="en-US">
               <a:solidFill>
@@ -24509,7 +24510,7 @@
                 <a:ea typeface="宋体"/>
               </a:rPr>
               <a:pPr/>
-              <a:t>14-9-6</a:t>
+              <a:t>14-9-8</a:t>
             </a:fld>
             <a:endParaRPr lang="zh-CN" altLang="en-US">
               <a:solidFill>
@@ -24669,7 +24670,7 @@
                 <a:ea typeface="宋体"/>
               </a:rPr>
               <a:pPr/>
-              <a:t>14-9-6</a:t>
+              <a:t>14-9-8</a:t>
             </a:fld>
             <a:endParaRPr lang="zh-CN" altLang="en-US">
               <a:solidFill>
@@ -24806,7 +24807,7 @@
                 <a:ea typeface="宋体"/>
               </a:rPr>
               <a:pPr/>
-              <a:t>14-9-6</a:t>
+              <a:t>14-9-8</a:t>
             </a:fld>
             <a:endParaRPr lang="zh-CN" altLang="en-US">
               <a:solidFill>
@@ -25125,7 +25126,7 @@
                 <a:ea typeface="宋体"/>
               </a:rPr>
               <a:pPr/>
-              <a:t>14-9-6</a:t>
+              <a:t>14-9-8</a:t>
             </a:fld>
             <a:endParaRPr lang="zh-CN" altLang="en-US">
               <a:solidFill>
@@ -25420,7 +25421,7 @@
                 <a:ea typeface="宋体"/>
               </a:rPr>
               <a:pPr/>
-              <a:t>14-9-6</a:t>
+              <a:t>14-9-8</a:t>
             </a:fld>
             <a:endParaRPr lang="zh-CN" altLang="en-US">
               <a:solidFill>
@@ -25632,7 +25633,7 @@
                 <a:ea typeface="宋体"/>
               </a:rPr>
               <a:pPr/>
-              <a:t>14-9-6</a:t>
+              <a:t>14-9-8</a:t>
             </a:fld>
             <a:endParaRPr lang="zh-CN" altLang="en-US">
               <a:solidFill>
@@ -25854,7 +25855,7 @@
                 <a:ea typeface="宋体"/>
               </a:rPr>
               <a:pPr/>
-              <a:t>14-9-6</a:t>
+              <a:t>14-9-8</a:t>
             </a:fld>
             <a:endParaRPr lang="zh-CN" altLang="en-US">
               <a:solidFill>
@@ -26100,7 +26101,7 @@
           <a:p>
             <a:fld id="{530820CF-B880-4189-942D-D702A7CBA730}" type="datetimeFigureOut">
               <a:rPr lang="zh-CN" altLang="en-US" smtClean="0"/>
-              <a:t>14-9-6</a:t>
+              <a:t>14-9-8</a:t>
             </a:fld>
             <a:endParaRPr lang="zh-CN" altLang="en-US"/>
           </a:p>
@@ -26614,7 +26615,7 @@
                 <a:ea typeface="宋体"/>
               </a:rPr>
               <a:pPr/>
-              <a:t>14-9-6</a:t>
+              <a:t>14-9-8</a:t>
             </a:fld>
             <a:endParaRPr lang="zh-CN" altLang="en-US">
               <a:solidFill>
@@ -27166,7 +27167,7 @@
                 <a:ea typeface="宋体"/>
               </a:rPr>
               <a:pPr/>
-              <a:t>14-9-6</a:t>
+              <a:t>14-9-8</a:t>
             </a:fld>
             <a:endParaRPr lang="zh-CN" altLang="en-US">
               <a:solidFill>
@@ -27718,7 +27719,7 @@
                 <a:ea typeface="宋体"/>
               </a:rPr>
               <a:pPr/>
-              <a:t>14-9-6</a:t>
+              <a:t>14-9-8</a:t>
             </a:fld>
             <a:endParaRPr lang="zh-CN" altLang="en-US">
               <a:solidFill>
@@ -28270,7 +28271,7 @@
                 <a:ea typeface="宋体"/>
               </a:rPr>
               <a:pPr/>
-              <a:t>14-9-6</a:t>
+              <a:t>14-9-8</a:t>
             </a:fld>
             <a:endParaRPr lang="zh-CN" altLang="en-US">
               <a:solidFill>
@@ -28822,7 +28823,7 @@
                 <a:ea typeface="宋体"/>
               </a:rPr>
               <a:pPr/>
-              <a:t>14-9-6</a:t>
+              <a:t>14-9-8</a:t>
             </a:fld>
             <a:endParaRPr lang="zh-CN" altLang="en-US">
               <a:solidFill>
@@ -29374,7 +29375,7 @@
                 <a:ea typeface="宋体"/>
               </a:rPr>
               <a:pPr/>
-              <a:t>14-9-6</a:t>
+              <a:t>14-9-8</a:t>
             </a:fld>
             <a:endParaRPr lang="zh-CN" altLang="en-US">
               <a:solidFill>
@@ -29926,7 +29927,7 @@
                 <a:ea typeface="宋体"/>
               </a:rPr>
               <a:pPr/>
-              <a:t>14-9-6</a:t>
+              <a:t>14-9-8</a:t>
             </a:fld>
             <a:endParaRPr lang="zh-CN" altLang="en-US">
               <a:solidFill>
@@ -30478,7 +30479,7 @@
                 <a:ea typeface="宋体"/>
               </a:rPr>
               <a:pPr/>
-              <a:t>14-9-6</a:t>
+              <a:t>14-9-8</a:t>
             </a:fld>
             <a:endParaRPr lang="zh-CN" altLang="en-US">
               <a:solidFill>
@@ -31069,7 +31070,7 @@
         </p:nvSpPr>
         <p:spPr>
           <a:xfrm>
-            <a:off x="395536" y="404664"/>
+            <a:off x="323528" y="908720"/>
             <a:ext cx="8229600" cy="1143000"/>
           </a:xfrm>
         </p:spPr>
@@ -31079,34 +31080,63 @@
           <a:p>
             <a:r>
               <a:rPr lang="en-US" altLang="zh-CN" dirty="0"/>
-              <a:t>Cluster Overview</a:t>
+              <a:t>Key Concept-</a:t>
+            </a:r>
+            <a:r>
+              <a:rPr lang="en-US" altLang="zh-CN" dirty="0" err="1"/>
+              <a:t>ClusterManager</a:t>
             </a:r>
             <a:endParaRPr lang="zh-CN" altLang="en-US" dirty="0"/>
           </a:p>
         </p:txBody>
       </p:sp>
-      <p:pic>
-        <p:nvPicPr>
-          <p:cNvPr id="4" name="内容占位符 3"/>
-          <p:cNvPicPr>
-            <a:picLocks noGrp="1" noChangeAspect="1"/>
-          </p:cNvPicPr>
+      <p:sp>
+        <p:nvSpPr>
+          <p:cNvPr id="3" name="内容占位符 2"/>
+          <p:cNvSpPr>
+            <a:spLocks noGrp="1"/>
+          </p:cNvSpPr>
           <p:nvPr>
             <p:ph idx="1"/>
           </p:nvPr>
-        </p:nvPicPr>
-        <p:blipFill rotWithShape="1">
-          <a:blip r:embed="rId3"/>
-          <a:srcRect l="-6273" t="-871" r="-11424" b="-9295"/>
-          <a:stretch/>
-        </p:blipFill>
-        <p:spPr>
-          <a:xfrm>
-            <a:off x="-179388" y="1600200"/>
-            <a:ext cx="9499601" cy="4546600"/>
-          </a:xfrm>
-        </p:spPr>
-      </p:pic>
+        </p:nvSpPr>
+        <p:spPr/>
+        <p:txBody>
+          <a:bodyPr>
+            <a:normAutofit/>
+          </a:bodyPr>
+          <a:lstStyle/>
+          <a:p>
+            <a:endParaRPr lang="en-US" altLang="zh-CN" dirty="0" smtClean="0"/>
+          </a:p>
+          <a:p>
+            <a:r>
+              <a:rPr lang="en-US" altLang="zh-CN" dirty="0" smtClean="0"/>
+              <a:t>Local</a:t>
+            </a:r>
+            <a:endParaRPr lang="en-US" altLang="zh-CN" dirty="0"/>
+          </a:p>
+          <a:p>
+            <a:r>
+              <a:rPr lang="en-US" altLang="zh-CN" dirty="0"/>
+              <a:t>Standalone</a:t>
+            </a:r>
+          </a:p>
+          <a:p>
+            <a:r>
+              <a:rPr lang="en-US" altLang="zh-CN" dirty="0"/>
+              <a:t>Yarn</a:t>
+            </a:r>
+          </a:p>
+          <a:p>
+            <a:r>
+              <a:rPr lang="en-US" altLang="zh-CN" dirty="0" err="1"/>
+              <a:t>Mesos</a:t>
+            </a:r>
+            <a:endParaRPr lang="zh-CN" altLang="en-US" dirty="0"/>
+          </a:p>
+        </p:txBody>
+      </p:sp>
       <p:sp>
         <p:nvSpPr>
           <p:cNvPr id="5" name="文本框 4"/>
@@ -31270,7 +31300,7 @@
     </p:spTree>
     <p:extLst>
       <p:ext uri="{BB962C8B-B14F-4D97-AF65-F5344CB8AC3E}">
-        <p14:creationId xmlns:p14="http://schemas.microsoft.com/office/powerpoint/2010/main" val="2802218647"/>
+        <p14:creationId xmlns:p14="http://schemas.microsoft.com/office/powerpoint/2010/main" val="3033085433"/>
       </p:ext>
     </p:extLst>
   </p:cSld>
@@ -31339,8 +31369,8 @@
           <a:lstStyle/>
           <a:p>
             <a:r>
-              <a:rPr lang="en-US" altLang="zh-CN" dirty="0" smtClean="0"/>
-              <a:t>schedule</a:t>
+              <a:rPr lang="en-US" altLang="zh-CN" dirty="0"/>
+              <a:t>Cluster Overview</a:t>
             </a:r>
             <a:endParaRPr lang="zh-CN" altLang="en-US" dirty="0"/>
           </a:p>
@@ -31356,17 +31386,15 @@
             <p:ph idx="1"/>
           </p:nvPr>
         </p:nvPicPr>
-        <p:blipFill>
+        <p:blipFill rotWithShape="1">
           <a:blip r:embed="rId3"/>
-          <a:srcRect t="223" b="223"/>
-          <a:stretch>
-            <a:fillRect/>
-          </a:stretch>
+          <a:srcRect l="-6273" t="-871" r="-11424" b="-9295"/>
+          <a:stretch/>
         </p:blipFill>
         <p:spPr>
           <a:xfrm>
-            <a:off x="467544" y="1412776"/>
-            <a:ext cx="8229600" cy="4525963"/>
+            <a:off x="-179388" y="1600200"/>
+            <a:ext cx="9499601" cy="4546600"/>
           </a:xfrm>
         </p:spPr>
       </p:pic>
@@ -31533,7 +31561,7 @@
     </p:spTree>
     <p:extLst>
       <p:ext uri="{BB962C8B-B14F-4D97-AF65-F5344CB8AC3E}">
-        <p14:creationId xmlns:p14="http://schemas.microsoft.com/office/powerpoint/2010/main" val="709018194"/>
+        <p14:creationId xmlns:p14="http://schemas.microsoft.com/office/powerpoint/2010/main" val="2802218647"/>
       </p:ext>
     </p:extLst>
   </p:cSld>
@@ -31593,7 +31621,7 @@
         </p:nvSpPr>
         <p:spPr>
           <a:xfrm>
-            <a:off x="395536" y="188640"/>
+            <a:off x="395536" y="404664"/>
             <a:ext cx="8229600" cy="1143000"/>
           </a:xfrm>
         </p:spPr>
@@ -31603,7 +31631,7 @@
           <a:p>
             <a:r>
               <a:rPr lang="en-US" altLang="zh-CN" dirty="0" smtClean="0"/>
-              <a:t>Executor</a:t>
+              <a:t>schedule</a:t>
             </a:r>
             <a:endParaRPr lang="zh-CN" altLang="en-US" dirty="0"/>
           </a:p>
@@ -31619,15 +31647,17 @@
             <p:ph idx="1"/>
           </p:nvPr>
         </p:nvPicPr>
-        <p:blipFill rotWithShape="1">
+        <p:blipFill>
           <a:blip r:embed="rId3"/>
-          <a:srcRect t="1331" b="1331"/>
-          <a:stretch/>
+          <a:srcRect t="223" b="223"/>
+          <a:stretch>
+            <a:fillRect/>
+          </a:stretch>
         </p:blipFill>
         <p:spPr>
           <a:xfrm>
-            <a:off x="1043608" y="1268760"/>
-            <a:ext cx="7344816" cy="5079932"/>
+            <a:off x="467544" y="1412776"/>
+            <a:ext cx="8229600" cy="4525963"/>
           </a:xfrm>
         </p:spPr>
       </p:pic>
@@ -31794,7 +31824,7 @@
     </p:spTree>
     <p:extLst>
       <p:ext uri="{BB962C8B-B14F-4D97-AF65-F5344CB8AC3E}">
-        <p14:creationId xmlns:p14="http://schemas.microsoft.com/office/powerpoint/2010/main" val="2007467071"/>
+        <p14:creationId xmlns:p14="http://schemas.microsoft.com/office/powerpoint/2010/main" val="709018194"/>
       </p:ext>
     </p:extLst>
   </p:cSld>
@@ -31854,7 +31884,7 @@
         </p:nvSpPr>
         <p:spPr>
           <a:xfrm>
-            <a:off x="395536" y="404664"/>
+            <a:off x="395536" y="188640"/>
             <a:ext cx="8229600" cy="1143000"/>
           </a:xfrm>
         </p:spPr>
@@ -31864,7 +31894,7 @@
           <a:p>
             <a:r>
               <a:rPr lang="en-US" altLang="zh-CN" dirty="0" smtClean="0"/>
-              <a:t>Shuffle</a:t>
+              <a:t>Executor</a:t>
             </a:r>
             <a:endParaRPr lang="zh-CN" altLang="en-US" dirty="0"/>
           </a:p>
@@ -31882,13 +31912,13 @@
         </p:nvPicPr>
         <p:blipFill rotWithShape="1">
           <a:blip r:embed="rId3"/>
-          <a:srcRect l="-12344" t="-2504" r="-19372" b="-10585"/>
+          <a:srcRect t="1331" b="1331"/>
           <a:stretch/>
         </p:blipFill>
         <p:spPr>
           <a:xfrm>
-            <a:off x="107504" y="1484784"/>
-            <a:ext cx="9144000" cy="4213475"/>
+            <a:off x="1043608" y="1268760"/>
+            <a:ext cx="7344816" cy="5079932"/>
           </a:xfrm>
         </p:spPr>
       </p:pic>
@@ -32055,7 +32085,7 @@
     </p:spTree>
     <p:extLst>
       <p:ext uri="{BB962C8B-B14F-4D97-AF65-F5344CB8AC3E}">
-        <p14:creationId xmlns:p14="http://schemas.microsoft.com/office/powerpoint/2010/main" val="552814068"/>
+        <p14:creationId xmlns:p14="http://schemas.microsoft.com/office/powerpoint/2010/main" val="2007467071"/>
       </p:ext>
     </p:extLst>
   </p:cSld>
@@ -32115,6 +32145,267 @@
         </p:nvSpPr>
         <p:spPr>
           <a:xfrm>
+            <a:off x="395536" y="404664"/>
+            <a:ext cx="8229600" cy="1143000"/>
+          </a:xfrm>
+        </p:spPr>
+        <p:txBody>
+          <a:bodyPr/>
+          <a:lstStyle/>
+          <a:p>
+            <a:r>
+              <a:rPr lang="en-US" altLang="zh-CN" dirty="0" smtClean="0"/>
+              <a:t>Shuffle</a:t>
+            </a:r>
+            <a:endParaRPr lang="zh-CN" altLang="en-US" dirty="0"/>
+          </a:p>
+        </p:txBody>
+      </p:sp>
+      <p:pic>
+        <p:nvPicPr>
+          <p:cNvPr id="4" name="内容占位符 3"/>
+          <p:cNvPicPr>
+            <a:picLocks noGrp="1" noChangeAspect="1"/>
+          </p:cNvPicPr>
+          <p:nvPr>
+            <p:ph idx="1"/>
+          </p:nvPr>
+        </p:nvPicPr>
+        <p:blipFill rotWithShape="1">
+          <a:blip r:embed="rId3"/>
+          <a:srcRect l="-12344" t="-2504" r="-19372" b="-10585"/>
+          <a:stretch/>
+        </p:blipFill>
+        <p:spPr>
+          <a:xfrm>
+            <a:off x="107504" y="1484784"/>
+            <a:ext cx="9144000" cy="4213475"/>
+          </a:xfrm>
+        </p:spPr>
+      </p:pic>
+      <p:sp>
+        <p:nvSpPr>
+          <p:cNvPr id="5" name="文本框 4"/>
+          <p:cNvSpPr txBox="1"/>
+          <p:nvPr/>
+        </p:nvSpPr>
+        <p:spPr>
+          <a:xfrm>
+            <a:off x="9042400" y="6034505"/>
+            <a:ext cx="184666" cy="369332"/>
+          </a:xfrm>
+          <a:prstGeom prst="rect">
+            <a:avLst/>
+          </a:prstGeom>
+          <a:noFill/>
+        </p:spPr>
+        <p:txBody>
+          <a:bodyPr wrap="none" rtlCol="0">
+            <a:spAutoFit/>
+          </a:bodyPr>
+          <a:lstStyle/>
+          <a:p>
+            <a:endParaRPr kumimoji="1" lang="zh-CN" altLang="en-US" dirty="0">
+              <a:solidFill>
+                <a:prstClr val="black"/>
+              </a:solidFill>
+              <a:latin typeface="Calibri"/>
+              <a:ea typeface="宋体"/>
+            </a:endParaRPr>
+          </a:p>
+        </p:txBody>
+      </p:sp>
+      <p:sp>
+        <p:nvSpPr>
+          <p:cNvPr id="6" name="文本框 5"/>
+          <p:cNvSpPr txBox="1"/>
+          <p:nvPr/>
+        </p:nvSpPr>
+        <p:spPr>
+          <a:xfrm>
+            <a:off x="9194800" y="6186905"/>
+            <a:ext cx="184666" cy="369332"/>
+          </a:xfrm>
+          <a:prstGeom prst="rect">
+            <a:avLst/>
+          </a:prstGeom>
+          <a:noFill/>
+        </p:spPr>
+        <p:txBody>
+          <a:bodyPr wrap="none" rtlCol="0">
+            <a:spAutoFit/>
+          </a:bodyPr>
+          <a:lstStyle/>
+          <a:p>
+            <a:endParaRPr kumimoji="1" lang="zh-CN" altLang="en-US" dirty="0">
+              <a:solidFill>
+                <a:prstClr val="black"/>
+              </a:solidFill>
+              <a:latin typeface="Calibri"/>
+              <a:ea typeface="宋体"/>
+            </a:endParaRPr>
+          </a:p>
+        </p:txBody>
+      </p:sp>
+      <p:sp>
+        <p:nvSpPr>
+          <p:cNvPr id="7" name="文本框 6"/>
+          <p:cNvSpPr txBox="1"/>
+          <p:nvPr/>
+        </p:nvSpPr>
+        <p:spPr>
+          <a:xfrm>
+            <a:off x="8890000" y="5882105"/>
+            <a:ext cx="184666" cy="369332"/>
+          </a:xfrm>
+          <a:prstGeom prst="rect">
+            <a:avLst/>
+          </a:prstGeom>
+          <a:noFill/>
+        </p:spPr>
+        <p:txBody>
+          <a:bodyPr wrap="none" rtlCol="0">
+            <a:spAutoFit/>
+          </a:bodyPr>
+          <a:lstStyle/>
+          <a:p>
+            <a:endParaRPr kumimoji="1" lang="zh-CN" altLang="en-US" dirty="0">
+              <a:solidFill>
+                <a:prstClr val="black"/>
+              </a:solidFill>
+              <a:latin typeface="Calibri"/>
+              <a:ea typeface="宋体"/>
+            </a:endParaRPr>
+          </a:p>
+        </p:txBody>
+      </p:sp>
+      <p:sp>
+        <p:nvSpPr>
+          <p:cNvPr id="8" name="文本框 7"/>
+          <p:cNvSpPr txBox="1"/>
+          <p:nvPr/>
+        </p:nvSpPr>
+        <p:spPr>
+          <a:xfrm>
+            <a:off x="9042400" y="6034505"/>
+            <a:ext cx="184666" cy="369332"/>
+          </a:xfrm>
+          <a:prstGeom prst="rect">
+            <a:avLst/>
+          </a:prstGeom>
+          <a:noFill/>
+        </p:spPr>
+        <p:txBody>
+          <a:bodyPr wrap="none" rtlCol="0">
+            <a:spAutoFit/>
+          </a:bodyPr>
+          <a:lstStyle/>
+          <a:p>
+            <a:endParaRPr kumimoji="1" lang="zh-CN" altLang="en-US" dirty="0">
+              <a:solidFill>
+                <a:prstClr val="black"/>
+              </a:solidFill>
+              <a:latin typeface="Calibri"/>
+              <a:ea typeface="宋体"/>
+            </a:endParaRPr>
+          </a:p>
+        </p:txBody>
+      </p:sp>
+      <p:sp>
+        <p:nvSpPr>
+          <p:cNvPr id="9" name="文本框 8"/>
+          <p:cNvSpPr txBox="1"/>
+          <p:nvPr/>
+        </p:nvSpPr>
+        <p:spPr>
+          <a:xfrm>
+            <a:off x="9347200" y="6339305"/>
+            <a:ext cx="184666" cy="369332"/>
+          </a:xfrm>
+          <a:prstGeom prst="rect">
+            <a:avLst/>
+          </a:prstGeom>
+          <a:noFill/>
+        </p:spPr>
+        <p:txBody>
+          <a:bodyPr wrap="none" rtlCol="0">
+            <a:spAutoFit/>
+          </a:bodyPr>
+          <a:lstStyle/>
+          <a:p>
+            <a:endParaRPr kumimoji="1" lang="zh-CN" altLang="en-US" dirty="0">
+              <a:solidFill>
+                <a:prstClr val="black"/>
+              </a:solidFill>
+              <a:latin typeface="Calibri"/>
+              <a:ea typeface="宋体"/>
+            </a:endParaRPr>
+          </a:p>
+        </p:txBody>
+      </p:sp>
+    </p:spTree>
+    <p:extLst>
+      <p:ext uri="{BB962C8B-B14F-4D97-AF65-F5344CB8AC3E}">
+        <p14:creationId xmlns:p14="http://schemas.microsoft.com/office/powerpoint/2010/main" val="552814068"/>
+      </p:ext>
+    </p:extLst>
+  </p:cSld>
+  <p:clrMapOvr>
+    <a:masterClrMapping/>
+  </p:clrMapOvr>
+  <p:timing>
+    <p:tnLst>
+      <p:par>
+        <p:cTn xmlns:p14="http://schemas.microsoft.com/office/powerpoint/2010/main" id="1" dur="indefinite" restart="never" nodeType="tmRoot"/>
+      </p:par>
+    </p:tnLst>
+  </p:timing>
+</p:sld>
+</file>
+
+<file path=ppt/slides/slide15.xml><?xml version="1.0" encoding="utf-8"?>
+<p:sld xmlns:a="http://schemas.openxmlformats.org/drawingml/2006/main" xmlns:r="http://schemas.openxmlformats.org/officeDocument/2006/relationships" xmlns:p="http://schemas.openxmlformats.org/presentationml/2006/main">
+  <p:cSld>
+    <p:bg>
+      <p:bgPr>
+        <a:blipFill dpi="0" rotWithShape="1">
+          <a:blip r:embed="rId2">
+            <a:lum/>
+          </a:blip>
+          <a:srcRect/>
+          <a:stretch>
+            <a:fillRect/>
+          </a:stretch>
+        </a:blipFill>
+        <a:effectLst/>
+      </p:bgPr>
+    </p:bg>
+    <p:spTree>
+      <p:nvGrpSpPr>
+        <p:cNvPr id="1" name=""/>
+        <p:cNvGrpSpPr/>
+        <p:nvPr/>
+      </p:nvGrpSpPr>
+      <p:grpSpPr>
+        <a:xfrm>
+          <a:off x="0" y="0"/>
+          <a:ext cx="0" cy="0"/>
+          <a:chOff x="0" y="0"/>
+          <a:chExt cx="0" cy="0"/>
+        </a:xfrm>
+      </p:grpSpPr>
+      <p:sp>
+        <p:nvSpPr>
+          <p:cNvPr id="2" name="标题 1"/>
+          <p:cNvSpPr>
+            <a:spLocks noGrp="1"/>
+          </p:cNvSpPr>
+          <p:nvPr>
+            <p:ph type="title"/>
+          </p:nvPr>
+        </p:nvSpPr>
+        <p:spPr>
+          <a:xfrm>
             <a:off x="395536" y="836712"/>
             <a:ext cx="8229600" cy="1143000"/>
           </a:xfrm>
@@ -32125,11 +32416,7 @@
           <a:p>
             <a:r>
               <a:rPr lang="en-US" altLang="zh-CN" dirty="0" smtClean="0"/>
-              <a:t>S</a:t>
-            </a:r>
-            <a:r>
-              <a:rPr lang="en-US" altLang="zh-CN" dirty="0" smtClean="0"/>
-              <a:t>huffle</a:t>
+              <a:t>Shuffle</a:t>
             </a:r>
             <a:endParaRPr lang="zh-CN" altLang="en-US" dirty="0"/>
           </a:p>
@@ -32375,7 +32662,7 @@
 </p:sld>
 </file>
 
-<file path=ppt/slides/slide15.xml><?xml version="1.0" encoding="utf-8"?>
+<file path=ppt/slides/slide16.xml><?xml version="1.0" encoding="utf-8"?>
 <p:sld xmlns:a="http://schemas.openxmlformats.org/drawingml/2006/main" xmlns:r="http://schemas.openxmlformats.org/officeDocument/2006/relationships" xmlns:p="http://schemas.openxmlformats.org/presentationml/2006/main">
   <p:cSld>
     <p:spTree>
@@ -32443,11 +32730,7 @@
           <a:p>
             <a:r>
               <a:rPr lang="en-US" altLang="zh-CN" dirty="0"/>
-              <a:t>b</a:t>
-            </a:r>
-            <a:r>
-              <a:rPr lang="en-US" altLang="zh-CN" dirty="0"/>
-              <a:t>asis &amp; internals</a:t>
+              <a:t>basis &amp; internals</a:t>
             </a:r>
           </a:p>
           <a:p>
@@ -32650,7 +32933,7 @@
 </p:sld>
 </file>
 
-<file path=ppt/slides/slide16.xml><?xml version="1.0" encoding="utf-8"?>
+<file path=ppt/slides/slide17.xml><?xml version="1.0" encoding="utf-8"?>
 <p:sld xmlns:a="http://schemas.openxmlformats.org/drawingml/2006/main" xmlns:r="http://schemas.openxmlformats.org/officeDocument/2006/relationships" xmlns:p="http://schemas.openxmlformats.org/presentationml/2006/main">
   <p:cSld>
     <p:bg>
@@ -32938,7 +33221,7 @@
 </p:sld>
 </file>
 
-<file path=ppt/slides/slide17.xml><?xml version="1.0" encoding="utf-8"?>
+<file path=ppt/slides/slide18.xml><?xml version="1.0" encoding="utf-8"?>
 <p:sld xmlns:a="http://schemas.openxmlformats.org/drawingml/2006/main" xmlns:r="http://schemas.openxmlformats.org/officeDocument/2006/relationships" xmlns:p="http://schemas.openxmlformats.org/presentationml/2006/main">
   <p:cSld>
     <p:bg>
@@ -33282,291 +33565,6 @@
 </p:sld>
 </file>
 
-<file path=ppt/slides/slide18.xml><?xml version="1.0" encoding="utf-8"?>
-<p:sld xmlns:a="http://schemas.openxmlformats.org/drawingml/2006/main" xmlns:r="http://schemas.openxmlformats.org/officeDocument/2006/relationships" xmlns:p="http://schemas.openxmlformats.org/presentationml/2006/main">
-  <p:cSld>
-    <p:bg>
-      <p:bgPr>
-        <a:blipFill dpi="0" rotWithShape="1">
-          <a:blip r:embed="rId2">
-            <a:lum/>
-          </a:blip>
-          <a:srcRect/>
-          <a:stretch>
-            <a:fillRect/>
-          </a:stretch>
-        </a:blipFill>
-        <a:effectLst/>
-      </p:bgPr>
-    </p:bg>
-    <p:spTree>
-      <p:nvGrpSpPr>
-        <p:cNvPr id="1" name=""/>
-        <p:cNvGrpSpPr/>
-        <p:nvPr/>
-      </p:nvGrpSpPr>
-      <p:grpSpPr>
-        <a:xfrm>
-          <a:off x="0" y="0"/>
-          <a:ext cx="0" cy="0"/>
-          <a:chOff x="0" y="0"/>
-          <a:chExt cx="0" cy="0"/>
-        </a:xfrm>
-      </p:grpSpPr>
-      <p:sp>
-        <p:nvSpPr>
-          <p:cNvPr id="2" name="标题 1"/>
-          <p:cNvSpPr>
-            <a:spLocks noGrp="1"/>
-          </p:cNvSpPr>
-          <p:nvPr>
-            <p:ph type="title"/>
-          </p:nvPr>
-        </p:nvSpPr>
-        <p:spPr>
-          <a:xfrm>
-            <a:off x="395536" y="404664"/>
-            <a:ext cx="8229600" cy="1143000"/>
-          </a:xfrm>
-        </p:spPr>
-        <p:txBody>
-          <a:bodyPr/>
-          <a:lstStyle/>
-          <a:p>
-            <a:r>
-              <a:rPr lang="en-US" altLang="zh-CN" dirty="0" err="1"/>
-              <a:t>GraphX</a:t>
-            </a:r>
-            <a:endParaRPr lang="zh-CN" altLang="en-US" dirty="0"/>
-          </a:p>
-        </p:txBody>
-      </p:sp>
-      <p:pic>
-        <p:nvPicPr>
-          <p:cNvPr id="4" name="内容占位符 3"/>
-          <p:cNvPicPr>
-            <a:picLocks noGrp="1" noChangeAspect="1"/>
-          </p:cNvPicPr>
-          <p:nvPr>
-            <p:ph idx="1"/>
-          </p:nvPr>
-        </p:nvPicPr>
-        <p:blipFill rotWithShape="1">
-          <a:blip r:embed="rId3"/>
-          <a:srcRect l="-78688" t="-1104" r="-92697" b="-187114"/>
-          <a:stretch/>
-        </p:blipFill>
-        <p:spPr>
-          <a:xfrm>
-            <a:off x="-3835400" y="1624013"/>
-            <a:ext cx="16805275" cy="4664649"/>
-          </a:xfrm>
-        </p:spPr>
-      </p:pic>
-      <p:sp>
-        <p:nvSpPr>
-          <p:cNvPr id="5" name="文本框 4"/>
-          <p:cNvSpPr txBox="1"/>
-          <p:nvPr/>
-        </p:nvSpPr>
-        <p:spPr>
-          <a:xfrm>
-            <a:off x="9042400" y="6034505"/>
-            <a:ext cx="184666" cy="369332"/>
-          </a:xfrm>
-          <a:prstGeom prst="rect">
-            <a:avLst/>
-          </a:prstGeom>
-          <a:noFill/>
-        </p:spPr>
-        <p:txBody>
-          <a:bodyPr wrap="none" rtlCol="0">
-            <a:spAutoFit/>
-          </a:bodyPr>
-          <a:lstStyle/>
-          <a:p>
-            <a:endParaRPr kumimoji="1" lang="zh-CN" altLang="en-US" dirty="0">
-              <a:solidFill>
-                <a:prstClr val="black"/>
-              </a:solidFill>
-              <a:latin typeface="Calibri"/>
-              <a:ea typeface="宋体"/>
-            </a:endParaRPr>
-          </a:p>
-        </p:txBody>
-      </p:sp>
-      <p:sp>
-        <p:nvSpPr>
-          <p:cNvPr id="6" name="文本框 5"/>
-          <p:cNvSpPr txBox="1"/>
-          <p:nvPr/>
-        </p:nvSpPr>
-        <p:spPr>
-          <a:xfrm>
-            <a:off x="9194800" y="6186905"/>
-            <a:ext cx="184666" cy="369332"/>
-          </a:xfrm>
-          <a:prstGeom prst="rect">
-            <a:avLst/>
-          </a:prstGeom>
-          <a:noFill/>
-        </p:spPr>
-        <p:txBody>
-          <a:bodyPr wrap="none" rtlCol="0">
-            <a:spAutoFit/>
-          </a:bodyPr>
-          <a:lstStyle/>
-          <a:p>
-            <a:endParaRPr kumimoji="1" lang="zh-CN" altLang="en-US" dirty="0">
-              <a:solidFill>
-                <a:prstClr val="black"/>
-              </a:solidFill>
-              <a:latin typeface="Calibri"/>
-              <a:ea typeface="宋体"/>
-            </a:endParaRPr>
-          </a:p>
-        </p:txBody>
-      </p:sp>
-      <p:sp>
-        <p:nvSpPr>
-          <p:cNvPr id="7" name="文本框 6"/>
-          <p:cNvSpPr txBox="1"/>
-          <p:nvPr/>
-        </p:nvSpPr>
-        <p:spPr>
-          <a:xfrm>
-            <a:off x="8890000" y="5882105"/>
-            <a:ext cx="184666" cy="369332"/>
-          </a:xfrm>
-          <a:prstGeom prst="rect">
-            <a:avLst/>
-          </a:prstGeom>
-          <a:noFill/>
-        </p:spPr>
-        <p:txBody>
-          <a:bodyPr wrap="none" rtlCol="0">
-            <a:spAutoFit/>
-          </a:bodyPr>
-          <a:lstStyle/>
-          <a:p>
-            <a:endParaRPr kumimoji="1" lang="zh-CN" altLang="en-US" dirty="0">
-              <a:solidFill>
-                <a:prstClr val="black"/>
-              </a:solidFill>
-              <a:latin typeface="Calibri"/>
-              <a:ea typeface="宋体"/>
-            </a:endParaRPr>
-          </a:p>
-        </p:txBody>
-      </p:sp>
-      <p:sp>
-        <p:nvSpPr>
-          <p:cNvPr id="8" name="文本框 7"/>
-          <p:cNvSpPr txBox="1"/>
-          <p:nvPr/>
-        </p:nvSpPr>
-        <p:spPr>
-          <a:xfrm>
-            <a:off x="9042400" y="6034505"/>
-            <a:ext cx="184666" cy="369332"/>
-          </a:xfrm>
-          <a:prstGeom prst="rect">
-            <a:avLst/>
-          </a:prstGeom>
-          <a:noFill/>
-        </p:spPr>
-        <p:txBody>
-          <a:bodyPr wrap="none" rtlCol="0">
-            <a:spAutoFit/>
-          </a:bodyPr>
-          <a:lstStyle/>
-          <a:p>
-            <a:endParaRPr kumimoji="1" lang="zh-CN" altLang="en-US" dirty="0">
-              <a:solidFill>
-                <a:prstClr val="black"/>
-              </a:solidFill>
-              <a:latin typeface="Calibri"/>
-              <a:ea typeface="宋体"/>
-            </a:endParaRPr>
-          </a:p>
-        </p:txBody>
-      </p:sp>
-      <p:sp>
-        <p:nvSpPr>
-          <p:cNvPr id="9" name="文本框 8"/>
-          <p:cNvSpPr txBox="1"/>
-          <p:nvPr/>
-        </p:nvSpPr>
-        <p:spPr>
-          <a:xfrm>
-            <a:off x="9347200" y="6339305"/>
-            <a:ext cx="184666" cy="369332"/>
-          </a:xfrm>
-          <a:prstGeom prst="rect">
-            <a:avLst/>
-          </a:prstGeom>
-          <a:noFill/>
-        </p:spPr>
-        <p:txBody>
-          <a:bodyPr wrap="none" rtlCol="0">
-            <a:spAutoFit/>
-          </a:bodyPr>
-          <a:lstStyle/>
-          <a:p>
-            <a:endParaRPr kumimoji="1" lang="zh-CN" altLang="en-US" dirty="0">
-              <a:solidFill>
-                <a:prstClr val="black"/>
-              </a:solidFill>
-              <a:latin typeface="Calibri"/>
-              <a:ea typeface="宋体"/>
-            </a:endParaRPr>
-          </a:p>
-        </p:txBody>
-      </p:sp>
-      <p:pic>
-        <p:nvPicPr>
-          <p:cNvPr id="11" name="图片 10"/>
-          <p:cNvPicPr>
-            <a:picLocks noChangeAspect="1"/>
-          </p:cNvPicPr>
-          <p:nvPr/>
-        </p:nvPicPr>
-        <p:blipFill>
-          <a:blip r:embed="rId4"/>
-          <a:stretch>
-            <a:fillRect/>
-          </a:stretch>
-        </p:blipFill>
-        <p:spPr>
-          <a:xfrm>
-            <a:off x="971599" y="3429000"/>
-            <a:ext cx="6949307" cy="2664296"/>
-          </a:xfrm>
-          <a:prstGeom prst="rect">
-            <a:avLst/>
-          </a:prstGeom>
-        </p:spPr>
-      </p:pic>
-    </p:spTree>
-    <p:extLst>
-      <p:ext uri="{BB962C8B-B14F-4D97-AF65-F5344CB8AC3E}">
-        <p14:creationId xmlns:p14="http://schemas.microsoft.com/office/powerpoint/2010/main" val="2359114229"/>
-      </p:ext>
-    </p:extLst>
-  </p:cSld>
-  <p:clrMapOvr>
-    <a:masterClrMapping/>
-  </p:clrMapOvr>
-  <p:timing>
-    <p:tnLst>
-      <p:par>
-        <p:cTn xmlns:p14="http://schemas.microsoft.com/office/powerpoint/2010/main" id="1" dur="indefinite" restart="never" nodeType="tmRoot"/>
-      </p:par>
-    </p:tnLst>
-  </p:timing>
-</p:sld>
-</file>
-
 <file path=ppt/slides/slide19.xml><?xml version="1.0" encoding="utf-8"?>
 <p:sld xmlns:a="http://schemas.openxmlformats.org/drawingml/2006/main" xmlns:r="http://schemas.openxmlformats.org/officeDocument/2006/relationships" xmlns:p="http://schemas.openxmlformats.org/presentationml/2006/main">
   <p:cSld>
@@ -33628,7 +33626,7 @@
       </p:sp>
       <p:pic>
         <p:nvPicPr>
-          <p:cNvPr id="10" name="内容占位符 9"/>
+          <p:cNvPr id="4" name="内容占位符 3"/>
           <p:cNvPicPr>
             <a:picLocks noGrp="1" noChangeAspect="1"/>
           </p:cNvPicPr>
@@ -33636,17 +33634,15 @@
             <p:ph idx="1"/>
           </p:nvPr>
         </p:nvPicPr>
-        <p:blipFill>
+        <p:blipFill rotWithShape="1">
           <a:blip r:embed="rId3"/>
-          <a:srcRect t="1801" b="1801"/>
-          <a:stretch>
-            <a:fillRect/>
-          </a:stretch>
+          <a:srcRect l="-78688" t="-1104" r="-92697" b="-187114"/>
+          <a:stretch/>
         </p:blipFill>
         <p:spPr>
           <a:xfrm>
-            <a:off x="1043608" y="1772816"/>
-            <a:ext cx="7355160" cy="4045055"/>
+            <a:off x="-3835400" y="1624013"/>
+            <a:ext cx="16805275" cy="4664649"/>
           </a:xfrm>
         </p:spPr>
       </p:pic>
@@ -33810,10 +33806,34 @@
           </a:p>
         </p:txBody>
       </p:sp>
+      <p:pic>
+        <p:nvPicPr>
+          <p:cNvPr id="11" name="图片 10"/>
+          <p:cNvPicPr>
+            <a:picLocks noChangeAspect="1"/>
+          </p:cNvPicPr>
+          <p:nvPr/>
+        </p:nvPicPr>
+        <p:blipFill>
+          <a:blip r:embed="rId4"/>
+          <a:stretch>
+            <a:fillRect/>
+          </a:stretch>
+        </p:blipFill>
+        <p:spPr>
+          <a:xfrm>
+            <a:off x="971599" y="3429000"/>
+            <a:ext cx="6949307" cy="2664296"/>
+          </a:xfrm>
+          <a:prstGeom prst="rect">
+            <a:avLst/>
+          </a:prstGeom>
+        </p:spPr>
+      </p:pic>
     </p:spTree>
     <p:extLst>
       <p:ext uri="{BB962C8B-B14F-4D97-AF65-F5344CB8AC3E}">
-        <p14:creationId xmlns:p14="http://schemas.microsoft.com/office/powerpoint/2010/main" val="3541963494"/>
+        <p14:creationId xmlns:p14="http://schemas.microsoft.com/office/powerpoint/2010/main" val="2359114229"/>
       </p:ext>
     </p:extLst>
   </p:cSld>
@@ -34171,8 +34191,8 @@
           <a:lstStyle/>
           <a:p>
             <a:r>
-              <a:rPr lang="en-US" altLang="zh-CN" dirty="0"/>
-              <a:t>Spark SQL</a:t>
+              <a:rPr lang="en-US" altLang="zh-CN" dirty="0" err="1"/>
+              <a:t>GraphX</a:t>
             </a:r>
             <a:endParaRPr lang="zh-CN" altLang="en-US" dirty="0"/>
           </a:p>
@@ -34180,7 +34200,7 @@
       </p:sp>
       <p:pic>
         <p:nvPicPr>
-          <p:cNvPr id="4" name="内容占位符 3"/>
+          <p:cNvPr id="10" name="内容占位符 9"/>
           <p:cNvPicPr>
             <a:picLocks noGrp="1" noChangeAspect="1"/>
           </p:cNvPicPr>
@@ -34188,15 +34208,17 @@
             <p:ph idx="1"/>
           </p:nvPr>
         </p:nvPicPr>
-        <p:blipFill rotWithShape="1">
+        <p:blipFill>
           <a:blip r:embed="rId3"/>
-          <a:srcRect l="-135" r="-135"/>
-          <a:stretch/>
+          <a:srcRect t="1801" b="1801"/>
+          <a:stretch>
+            <a:fillRect/>
+          </a:stretch>
         </p:blipFill>
         <p:spPr>
           <a:xfrm>
-            <a:off x="395536" y="1772816"/>
-            <a:ext cx="8172400" cy="4045055"/>
+            <a:off x="1043608" y="1772816"/>
+            <a:ext cx="7355160" cy="4045055"/>
           </a:xfrm>
         </p:spPr>
       </p:pic>
@@ -34363,7 +34385,7 @@
     </p:spTree>
     <p:extLst>
       <p:ext uri="{BB962C8B-B14F-4D97-AF65-F5344CB8AC3E}">
-        <p14:creationId xmlns:p14="http://schemas.microsoft.com/office/powerpoint/2010/main" val="34869093"/>
+        <p14:creationId xmlns:p14="http://schemas.microsoft.com/office/powerpoint/2010/main" val="3541963494"/>
       </p:ext>
     </p:extLst>
   </p:cSld>
@@ -34439,56 +34461,28 @@
           </a:p>
         </p:txBody>
       </p:sp>
-      <p:sp>
-        <p:nvSpPr>
-          <p:cNvPr id="3" name="内容占位符 2"/>
-          <p:cNvSpPr>
-            <a:spLocks noGrp="1"/>
-          </p:cNvSpPr>
+      <p:pic>
+        <p:nvPicPr>
+          <p:cNvPr id="4" name="内容占位符 3"/>
+          <p:cNvPicPr>
+            <a:picLocks noGrp="1" noChangeAspect="1"/>
+          </p:cNvPicPr>
           <p:nvPr>
             <p:ph idx="1"/>
           </p:nvPr>
-        </p:nvSpPr>
-        <p:spPr/>
-        <p:txBody>
-          <a:bodyPr>
-            <a:normAutofit/>
-          </a:bodyPr>
-          <a:lstStyle/>
-          <a:p>
-            <a:endParaRPr lang="en-US" altLang="zh-CN" dirty="0" smtClean="0"/>
-          </a:p>
-          <a:p>
-            <a:r>
-              <a:rPr lang="en-US" altLang="zh-CN" dirty="0" smtClean="0"/>
-              <a:t>Data </a:t>
-            </a:r>
-            <a:r>
-              <a:rPr lang="en-US" altLang="zh-CN" dirty="0"/>
-              <a:t>Sources</a:t>
-            </a:r>
-          </a:p>
-          <a:p>
-            <a:r>
-              <a:rPr lang="en-US" altLang="zh-CN" dirty="0"/>
-              <a:t>RDDs/Parquet Files/JSON Datasets/Hive Table</a:t>
-            </a:r>
-          </a:p>
-          <a:p>
-            <a:r>
-              <a:rPr lang="en-US" altLang="zh-CN" dirty="0"/>
-              <a:t>DSL</a:t>
-            </a:r>
-          </a:p>
-          <a:p>
-            <a:r>
-              <a:rPr lang="en-US" altLang="zh-CN" dirty="0"/>
-              <a:t>JDBC Server</a:t>
-            </a:r>
-            <a:endParaRPr lang="zh-CN" altLang="en-US" dirty="0"/>
-          </a:p>
-        </p:txBody>
-      </p:sp>
+        </p:nvPicPr>
+        <p:blipFill rotWithShape="1">
+          <a:blip r:embed="rId3"/>
+          <a:srcRect l="-135" r="-135"/>
+          <a:stretch/>
+        </p:blipFill>
+        <p:spPr>
+          <a:xfrm>
+            <a:off x="395536" y="1772816"/>
+            <a:ext cx="8172400" cy="4045055"/>
+          </a:xfrm>
+        </p:spPr>
+      </p:pic>
       <p:sp>
         <p:nvSpPr>
           <p:cNvPr id="5" name="文本框 4"/>
@@ -34652,7 +34646,7 @@
     </p:spTree>
     <p:extLst>
       <p:ext uri="{BB962C8B-B14F-4D97-AF65-F5344CB8AC3E}">
-        <p14:creationId xmlns:p14="http://schemas.microsoft.com/office/powerpoint/2010/main" val="3618966661"/>
+        <p14:creationId xmlns:p14="http://schemas.microsoft.com/office/powerpoint/2010/main" val="34869093"/>
       </p:ext>
     </p:extLst>
   </p:cSld>
@@ -34721,43 +34715,58 @@
           <a:lstStyle/>
           <a:p>
             <a:r>
+              <a:rPr lang="en-US" altLang="zh-CN" dirty="0"/>
+              <a:t>Spark SQL</a:t>
+            </a:r>
+            <a:endParaRPr lang="zh-CN" altLang="en-US" dirty="0"/>
+          </a:p>
+        </p:txBody>
+      </p:sp>
+      <p:sp>
+        <p:nvSpPr>
+          <p:cNvPr id="3" name="内容占位符 2"/>
+          <p:cNvSpPr>
+            <a:spLocks noGrp="1"/>
+          </p:cNvSpPr>
+          <p:nvPr>
+            <p:ph idx="1"/>
+          </p:nvPr>
+        </p:nvSpPr>
+        <p:spPr/>
+        <p:txBody>
+          <a:bodyPr>
+            <a:normAutofit/>
+          </a:bodyPr>
+          <a:lstStyle/>
+          <a:p>
+            <a:endParaRPr lang="en-US" altLang="zh-CN" dirty="0" smtClean="0"/>
+          </a:p>
+          <a:p>
+            <a:r>
               <a:rPr lang="en-US" altLang="zh-CN" dirty="0" smtClean="0"/>
-              <a:t>Shark</a:t>
-            </a:r>
-            <a:endParaRPr lang="zh-CN" altLang="en-US" dirty="0"/>
-          </a:p>
-        </p:txBody>
-      </p:sp>
-      <p:sp>
-        <p:nvSpPr>
-          <p:cNvPr id="3" name="内容占位符 2"/>
-          <p:cNvSpPr>
-            <a:spLocks noGrp="1"/>
-          </p:cNvSpPr>
-          <p:nvPr>
-            <p:ph idx="1"/>
-          </p:nvPr>
-        </p:nvSpPr>
-        <p:spPr/>
-        <p:txBody>
-          <a:bodyPr/>
-          <a:lstStyle/>
-          <a:p>
-            <a:endParaRPr lang="en-US" altLang="zh-CN" dirty="0" smtClean="0"/>
-          </a:p>
-          <a:p>
-            <a:r>
-              <a:rPr lang="en-US" altLang="zh-CN" dirty="0" smtClean="0"/>
-              <a:t>Development in Shark has been ended and subsumed by Spark SQL</a:t>
-            </a:r>
-          </a:p>
-          <a:p>
-            <a:endParaRPr lang="en-US" altLang="zh-CN" dirty="0"/>
-          </a:p>
-          <a:p>
-            <a:r>
-              <a:rPr lang="en-US" altLang="zh-CN" dirty="0" smtClean="0"/>
-              <a:t>Mission completed !!!</a:t>
+              <a:t>Data </a:t>
+            </a:r>
+            <a:r>
+              <a:rPr lang="en-US" altLang="zh-CN" dirty="0"/>
+              <a:t>Sources</a:t>
+            </a:r>
+          </a:p>
+          <a:p>
+            <a:r>
+              <a:rPr lang="en-US" altLang="zh-CN" dirty="0"/>
+              <a:t>RDDs/Parquet Files/JSON Datasets/Hive Table</a:t>
+            </a:r>
+          </a:p>
+          <a:p>
+            <a:r>
+              <a:rPr lang="en-US" altLang="zh-CN" dirty="0"/>
+              <a:t>DSL</a:t>
+            </a:r>
+          </a:p>
+          <a:p>
+            <a:r>
+              <a:rPr lang="en-US" altLang="zh-CN" dirty="0"/>
+              <a:t>JDBC Server</a:t>
             </a:r>
             <a:endParaRPr lang="zh-CN" altLang="en-US" dirty="0"/>
           </a:p>
@@ -34926,7 +34935,7 @@
     </p:spTree>
     <p:extLst>
       <p:ext uri="{BB962C8B-B14F-4D97-AF65-F5344CB8AC3E}">
-        <p14:creationId xmlns:p14="http://schemas.microsoft.com/office/powerpoint/2010/main" val="2136418070"/>
+        <p14:creationId xmlns:p14="http://schemas.microsoft.com/office/powerpoint/2010/main" val="3618966661"/>
       </p:ext>
     </p:extLst>
   </p:cSld>
@@ -34986,7 +34995,7 @@
         </p:nvSpPr>
         <p:spPr>
           <a:xfrm>
-            <a:off x="467544" y="188640"/>
+            <a:off x="395536" y="404664"/>
             <a:ext cx="8229600" cy="1143000"/>
           </a:xfrm>
         </p:spPr>
@@ -34995,35 +35004,48 @@
           <a:lstStyle/>
           <a:p>
             <a:r>
-              <a:rPr lang="en-US" altLang="zh-CN" dirty="0"/>
-              <a:t>Tachyon</a:t>
+              <a:rPr lang="en-US" altLang="zh-CN" dirty="0" smtClean="0"/>
+              <a:t>Shark</a:t>
             </a:r>
             <a:endParaRPr lang="zh-CN" altLang="en-US" dirty="0"/>
           </a:p>
         </p:txBody>
       </p:sp>
-      <p:pic>
-        <p:nvPicPr>
-          <p:cNvPr id="4" name="内容占位符 3"/>
-          <p:cNvPicPr>
-            <a:picLocks noGrp="1" noChangeAspect="1"/>
-          </p:cNvPicPr>
+      <p:sp>
+        <p:nvSpPr>
+          <p:cNvPr id="3" name="内容占位符 2"/>
+          <p:cNvSpPr>
+            <a:spLocks noGrp="1"/>
+          </p:cNvSpPr>
           <p:nvPr>
             <p:ph idx="1"/>
           </p:nvPr>
-        </p:nvPicPr>
-        <p:blipFill rotWithShape="1">
-          <a:blip r:embed="rId3"/>
-          <a:srcRect t="14022" b="-6806"/>
-          <a:stretch/>
-        </p:blipFill>
-        <p:spPr>
-          <a:xfrm>
-            <a:off x="467544" y="980728"/>
-            <a:ext cx="8229600" cy="5717017"/>
-          </a:xfrm>
-        </p:spPr>
-      </p:pic>
+        </p:nvSpPr>
+        <p:spPr/>
+        <p:txBody>
+          <a:bodyPr/>
+          <a:lstStyle/>
+          <a:p>
+            <a:endParaRPr lang="en-US" altLang="zh-CN" dirty="0" smtClean="0"/>
+          </a:p>
+          <a:p>
+            <a:r>
+              <a:rPr lang="en-US" altLang="zh-CN" dirty="0" smtClean="0"/>
+              <a:t>Development in Shark has been ended and subsumed by Spark SQL</a:t>
+            </a:r>
+          </a:p>
+          <a:p>
+            <a:endParaRPr lang="en-US" altLang="zh-CN" dirty="0"/>
+          </a:p>
+          <a:p>
+            <a:r>
+              <a:rPr lang="en-US" altLang="zh-CN" dirty="0" smtClean="0"/>
+              <a:t>Mission completed !!!</a:t>
+            </a:r>
+            <a:endParaRPr lang="zh-CN" altLang="en-US" dirty="0"/>
+          </a:p>
+        </p:txBody>
+      </p:sp>
       <p:sp>
         <p:nvSpPr>
           <p:cNvPr id="5" name="文本框 4"/>
@@ -35187,7 +35209,7 @@
     </p:spTree>
     <p:extLst>
       <p:ext uri="{BB962C8B-B14F-4D97-AF65-F5344CB8AC3E}">
-        <p14:creationId xmlns:p14="http://schemas.microsoft.com/office/powerpoint/2010/main" val="974719742"/>
+        <p14:creationId xmlns:p14="http://schemas.microsoft.com/office/powerpoint/2010/main" val="2136418070"/>
       </p:ext>
     </p:extLst>
   </p:cSld>
@@ -35247,7 +35269,7 @@
         </p:nvSpPr>
         <p:spPr>
           <a:xfrm>
-            <a:off x="395536" y="404664"/>
+            <a:off x="467544" y="188640"/>
             <a:ext cx="8229600" cy="1143000"/>
           </a:xfrm>
         </p:spPr>
@@ -35275,13 +35297,13 @@
         </p:nvPicPr>
         <p:blipFill rotWithShape="1">
           <a:blip r:embed="rId3"/>
-          <a:srcRect l="-26862" t="-4373" r="-28899" b="-23035"/>
+          <a:srcRect t="14022" b="-6806"/>
           <a:stretch/>
         </p:blipFill>
         <p:spPr>
           <a:xfrm>
-            <a:off x="-1692696" y="1628800"/>
-            <a:ext cx="12745416" cy="4525963"/>
+            <a:off x="467544" y="980728"/>
+            <a:ext cx="8229600" cy="5717017"/>
           </a:xfrm>
         </p:spPr>
       </p:pic>
@@ -35448,7 +35470,7 @@
     </p:spTree>
     <p:extLst>
       <p:ext uri="{BB962C8B-B14F-4D97-AF65-F5344CB8AC3E}">
-        <p14:creationId xmlns:p14="http://schemas.microsoft.com/office/powerpoint/2010/main" val="4232010978"/>
+        <p14:creationId xmlns:p14="http://schemas.microsoft.com/office/powerpoint/2010/main" val="974719742"/>
       </p:ext>
     </p:extLst>
   </p:cSld>
@@ -35508,7 +35530,7 @@
         </p:nvSpPr>
         <p:spPr>
           <a:xfrm>
-            <a:off x="395536" y="188640"/>
+            <a:off x="395536" y="404664"/>
             <a:ext cx="8229600" cy="1143000"/>
           </a:xfrm>
         </p:spPr>
@@ -35517,8 +35539,8 @@
           <a:lstStyle/>
           <a:p>
             <a:r>
-              <a:rPr lang="en-US" altLang="zh-CN" dirty="0" err="1"/>
-              <a:t>SparkR</a:t>
+              <a:rPr lang="en-US" altLang="zh-CN" dirty="0"/>
+              <a:t>Tachyon</a:t>
             </a:r>
             <a:endParaRPr lang="zh-CN" altLang="en-US" dirty="0"/>
           </a:p>
@@ -35534,14 +35556,17 @@
             <p:ph idx="1"/>
           </p:nvPr>
         </p:nvPicPr>
-        <p:blipFill>
+        <p:blipFill rotWithShape="1">
           <a:blip r:embed="rId3"/>
-          <a:srcRect t="4884" b="4884"/>
-          <a:stretch>
-            <a:fillRect/>
-          </a:stretch>
+          <a:srcRect l="-26862" t="-4373" r="-28899" b="-23035"/>
+          <a:stretch/>
         </p:blipFill>
-        <p:spPr/>
+        <p:spPr>
+          <a:xfrm>
+            <a:off x="-1692696" y="1628800"/>
+            <a:ext cx="12745416" cy="4525963"/>
+          </a:xfrm>
+        </p:spPr>
       </p:pic>
       <p:sp>
         <p:nvSpPr>
@@ -35706,7 +35731,7 @@
     </p:spTree>
     <p:extLst>
       <p:ext uri="{BB962C8B-B14F-4D97-AF65-F5344CB8AC3E}">
-        <p14:creationId xmlns:p14="http://schemas.microsoft.com/office/powerpoint/2010/main" val="3650346757"/>
+        <p14:creationId xmlns:p14="http://schemas.microsoft.com/office/powerpoint/2010/main" val="4232010978"/>
       </p:ext>
     </p:extLst>
   </p:cSld>
@@ -35766,7 +35791,7 @@
         </p:nvSpPr>
         <p:spPr>
           <a:xfrm>
-            <a:off x="395536" y="404664"/>
+            <a:off x="395536" y="188640"/>
             <a:ext cx="8229600" cy="1143000"/>
           </a:xfrm>
         </p:spPr>
@@ -35775,45 +35800,32 @@
           <a:lstStyle/>
           <a:p>
             <a:r>
-              <a:rPr lang="en-US" altLang="zh-CN" dirty="0" err="1" smtClean="0"/>
-              <a:t>BlinkDB</a:t>
+              <a:rPr lang="en-US" altLang="zh-CN" dirty="0" err="1"/>
+              <a:t>SparkR</a:t>
             </a:r>
             <a:endParaRPr lang="zh-CN" altLang="en-US" dirty="0"/>
           </a:p>
         </p:txBody>
       </p:sp>
-      <p:sp>
-        <p:nvSpPr>
-          <p:cNvPr id="3" name="内容占位符 2"/>
-          <p:cNvSpPr>
-            <a:spLocks noGrp="1"/>
-          </p:cNvSpPr>
+      <p:pic>
+        <p:nvPicPr>
+          <p:cNvPr id="4" name="内容占位符 3"/>
+          <p:cNvPicPr>
+            <a:picLocks noGrp="1" noChangeAspect="1"/>
+          </p:cNvPicPr>
           <p:nvPr>
             <p:ph idx="1"/>
           </p:nvPr>
-        </p:nvSpPr>
+        </p:nvPicPr>
+        <p:blipFill>
+          <a:blip r:embed="rId3"/>
+          <a:srcRect t="4884" b="4884"/>
+          <a:stretch>
+            <a:fillRect/>
+          </a:stretch>
+        </p:blipFill>
         <p:spPr/>
-        <p:txBody>
-          <a:bodyPr/>
-          <a:lstStyle/>
-          <a:p>
-            <a:r>
-              <a:rPr lang="en-US" altLang="zh-CN" dirty="0"/>
-              <a:t>Queries with Bounded Errors and Bounded Response Times on Very Large </a:t>
-            </a:r>
-            <a:r>
-              <a:rPr lang="en-US" altLang="zh-CN" dirty="0" smtClean="0"/>
-              <a:t>Data</a:t>
-            </a:r>
-          </a:p>
-          <a:p>
-            <a:endParaRPr lang="en-US" altLang="zh-CN" dirty="0"/>
-          </a:p>
-          <a:p>
-            <a:endParaRPr lang="zh-CN" altLang="en-US" dirty="0"/>
-          </a:p>
-        </p:txBody>
-      </p:sp>
+      </p:pic>
       <p:sp>
         <p:nvSpPr>
           <p:cNvPr id="5" name="文本框 4"/>
@@ -35974,34 +35986,10 @@
           </a:p>
         </p:txBody>
       </p:sp>
-      <p:pic>
-        <p:nvPicPr>
-          <p:cNvPr id="4" name="图片 3"/>
-          <p:cNvPicPr>
-            <a:picLocks noChangeAspect="1"/>
-          </p:cNvPicPr>
-          <p:nvPr/>
-        </p:nvPicPr>
-        <p:blipFill>
-          <a:blip r:embed="rId3"/>
-          <a:stretch>
-            <a:fillRect/>
-          </a:stretch>
-        </p:blipFill>
-        <p:spPr>
-          <a:xfrm>
-            <a:off x="468824" y="2708920"/>
-            <a:ext cx="8195706" cy="2592288"/>
-          </a:xfrm>
-          <a:prstGeom prst="rect">
-            <a:avLst/>
-          </a:prstGeom>
-        </p:spPr>
-      </p:pic>
     </p:spTree>
     <p:extLst>
       <p:ext uri="{BB962C8B-B14F-4D97-AF65-F5344CB8AC3E}">
-        <p14:creationId xmlns:p14="http://schemas.microsoft.com/office/powerpoint/2010/main" val="2302750302"/>
+        <p14:creationId xmlns:p14="http://schemas.microsoft.com/office/powerpoint/2010/main" val="3650346757"/>
       </p:ext>
     </p:extLst>
   </p:cSld>
@@ -36069,6 +36057,10 @@
           <a:bodyPr/>
           <a:lstStyle/>
           <a:p>
+            <a:r>
+              <a:rPr lang="en-US" altLang="zh-CN" dirty="0" err="1" smtClean="0"/>
+              <a:t>BlinkDB</a:t>
+            </a:r>
             <a:endParaRPr lang="zh-CN" altLang="en-US" dirty="0"/>
           </a:p>
         </p:txBody>
@@ -36088,62 +36080,20 @@
           <a:bodyPr/>
           <a:lstStyle/>
           <a:p>
-            <a:endParaRPr lang="en-US" altLang="zh-CN" dirty="0" smtClean="0"/>
+            <a:r>
+              <a:rPr lang="en-US" altLang="zh-CN" dirty="0"/>
+              <a:t>Queries with Bounded Errors and Bounded Response Times on Very Large </a:t>
+            </a:r>
+            <a:r>
+              <a:rPr lang="en-US" altLang="zh-CN" dirty="0" smtClean="0"/>
+              <a:t>Data</a:t>
+            </a:r>
           </a:p>
           <a:p>
             <a:endParaRPr lang="en-US" altLang="zh-CN" dirty="0"/>
           </a:p>
           <a:p>
-            <a:pPr marL="0" indent="0" algn="ctr">
-              <a:buNone/>
-            </a:pPr>
-            <a:r>
-              <a:rPr lang="en-US" altLang="zh-CN" dirty="0" smtClean="0"/>
-              <a:t>contact me</a:t>
-            </a:r>
-            <a:endParaRPr lang="en-US" altLang="zh-CN" dirty="0"/>
-          </a:p>
-          <a:p>
-            <a:pPr marL="0" indent="0" algn="ctr">
-              <a:buNone/>
-            </a:pPr>
-            <a:endParaRPr lang="en-US" altLang="zh-CN" baseline="30000" dirty="0" smtClean="0"/>
-          </a:p>
-          <a:p>
-            <a:pPr marL="0" indent="0" algn="ctr">
-              <a:buNone/>
-            </a:pPr>
-            <a:r>
-              <a:rPr lang="en-US" altLang="zh-CN" i="1" baseline="30000" dirty="0" err="1" smtClean="0"/>
-              <a:t>weibo</a:t>
-            </a:r>
-            <a:r>
-              <a:rPr lang="en-US" altLang="zh-CN" i="1" baseline="30000" dirty="0"/>
-              <a:t>:@</a:t>
-            </a:r>
-            <a:r>
-              <a:rPr lang="en-US" altLang="zh-CN" i="1" baseline="30000" dirty="0" err="1"/>
-              <a:t>CrazyJvm</a:t>
-            </a:r>
-            <a:endParaRPr lang="en-US" altLang="zh-CN" i="1" baseline="30000" dirty="0"/>
-          </a:p>
-          <a:p>
-            <a:pPr marL="0" indent="0" algn="ctr">
-              <a:buNone/>
-            </a:pPr>
-            <a:r>
-              <a:rPr lang="en-US" altLang="zh-CN" i="1" baseline="30000" dirty="0" err="1"/>
-              <a:t>wechat</a:t>
-            </a:r>
-            <a:r>
-              <a:rPr lang="en-US" altLang="zh-CN" i="1" baseline="30000" dirty="0"/>
-              <a:t> public account : </a:t>
-            </a:r>
-            <a:r>
-              <a:rPr lang="en-US" altLang="zh-CN" i="1" baseline="30000" dirty="0" err="1"/>
-              <a:t>ChinaScala</a:t>
-            </a:r>
-            <a:endParaRPr lang="zh-CN" altLang="en-US" i="1" dirty="0"/>
+            <a:endParaRPr lang="zh-CN" altLang="en-US" dirty="0"/>
           </a:p>
         </p:txBody>
       </p:sp>
@@ -36307,10 +36257,34 @@
           </a:p>
         </p:txBody>
       </p:sp>
+      <p:pic>
+        <p:nvPicPr>
+          <p:cNvPr id="4" name="图片 3"/>
+          <p:cNvPicPr>
+            <a:picLocks noChangeAspect="1"/>
+          </p:cNvPicPr>
+          <p:nvPr/>
+        </p:nvPicPr>
+        <p:blipFill>
+          <a:blip r:embed="rId3"/>
+          <a:stretch>
+            <a:fillRect/>
+          </a:stretch>
+        </p:blipFill>
+        <p:spPr>
+          <a:xfrm>
+            <a:off x="468824" y="2708920"/>
+            <a:ext cx="8195706" cy="2592288"/>
+          </a:xfrm>
+          <a:prstGeom prst="rect">
+            <a:avLst/>
+          </a:prstGeom>
+        </p:spPr>
+      </p:pic>
     </p:spTree>
     <p:extLst>
       <p:ext uri="{BB962C8B-B14F-4D97-AF65-F5344CB8AC3E}">
-        <p14:creationId xmlns:p14="http://schemas.microsoft.com/office/powerpoint/2010/main" val="694784170"/>
+        <p14:creationId xmlns:p14="http://schemas.microsoft.com/office/powerpoint/2010/main" val="2302750302"/>
       </p:ext>
     </p:extLst>
   </p:cSld>
@@ -36370,7 +36344,7 @@
         </p:nvSpPr>
         <p:spPr>
           <a:xfrm>
-            <a:off x="395536" y="1700808"/>
+            <a:off x="395536" y="404664"/>
             <a:ext cx="8229600" cy="1143000"/>
           </a:xfrm>
         </p:spPr>
@@ -36378,22 +36352,240 @@
           <a:bodyPr/>
           <a:lstStyle/>
           <a:p>
-            <a:r>
-              <a:rPr lang="en-US" altLang="zh-CN" b="1" dirty="0" smtClean="0">
-                <a:solidFill>
-                  <a:schemeClr val="bg1"/>
-                </a:solidFill>
-                <a:latin typeface="微软雅黑" pitchFamily="34" charset="-122"/>
-                <a:ea typeface="微软雅黑" pitchFamily="34" charset="-122"/>
-              </a:rPr>
-              <a:t>Q&amp;A</a:t>
-            </a:r>
-            <a:endParaRPr lang="zh-CN" altLang="en-US" b="1" dirty="0">
-              <a:solidFill>
-                <a:schemeClr val="bg1"/>
-              </a:solidFill>
-              <a:latin typeface="微软雅黑" pitchFamily="34" charset="-122"/>
-              <a:ea typeface="微软雅黑" pitchFamily="34" charset="-122"/>
+            <a:endParaRPr lang="zh-CN" altLang="en-US" dirty="0"/>
+          </a:p>
+        </p:txBody>
+      </p:sp>
+      <p:sp>
+        <p:nvSpPr>
+          <p:cNvPr id="3" name="内容占位符 2"/>
+          <p:cNvSpPr>
+            <a:spLocks noGrp="1"/>
+          </p:cNvSpPr>
+          <p:nvPr>
+            <p:ph idx="1"/>
+          </p:nvPr>
+        </p:nvSpPr>
+        <p:spPr/>
+        <p:txBody>
+          <a:bodyPr/>
+          <a:lstStyle/>
+          <a:p>
+            <a:endParaRPr lang="en-US" altLang="zh-CN" dirty="0" smtClean="0"/>
+          </a:p>
+          <a:p>
+            <a:endParaRPr lang="en-US" altLang="zh-CN" dirty="0"/>
+          </a:p>
+          <a:p>
+            <a:pPr marL="0" indent="0" algn="ctr">
+              <a:buNone/>
+            </a:pPr>
+            <a:r>
+              <a:rPr lang="en-US" altLang="zh-CN" dirty="0" smtClean="0"/>
+              <a:t>contact me</a:t>
+            </a:r>
+            <a:endParaRPr lang="en-US" altLang="zh-CN" dirty="0"/>
+          </a:p>
+          <a:p>
+            <a:pPr marL="0" indent="0" algn="ctr">
+              <a:buNone/>
+            </a:pPr>
+            <a:endParaRPr lang="en-US" altLang="zh-CN" baseline="30000" dirty="0" smtClean="0"/>
+          </a:p>
+          <a:p>
+            <a:pPr marL="0" indent="0" algn="ctr">
+              <a:buNone/>
+            </a:pPr>
+            <a:r>
+              <a:rPr lang="en-US" altLang="zh-CN" i="1" baseline="30000" dirty="0" err="1" smtClean="0"/>
+              <a:t>weibo</a:t>
+            </a:r>
+            <a:r>
+              <a:rPr lang="en-US" altLang="zh-CN" i="1" baseline="30000" dirty="0"/>
+              <a:t>:@</a:t>
+            </a:r>
+            <a:r>
+              <a:rPr lang="en-US" altLang="zh-CN" i="1" baseline="30000" dirty="0" err="1"/>
+              <a:t>CrazyJvm</a:t>
+            </a:r>
+            <a:endParaRPr lang="en-US" altLang="zh-CN" i="1" baseline="30000" dirty="0"/>
+          </a:p>
+          <a:p>
+            <a:pPr marL="0" indent="0" algn="ctr">
+              <a:buNone/>
+            </a:pPr>
+            <a:r>
+              <a:rPr lang="en-US" altLang="zh-CN" i="1" baseline="30000" dirty="0" err="1"/>
+              <a:t>wechat</a:t>
+            </a:r>
+            <a:r>
+              <a:rPr lang="en-US" altLang="zh-CN" i="1" baseline="30000" dirty="0"/>
+              <a:t> public account : </a:t>
+            </a:r>
+            <a:r>
+              <a:rPr lang="en-US" altLang="zh-CN" i="1" baseline="30000" dirty="0" err="1"/>
+              <a:t>ChinaScala</a:t>
+            </a:r>
+            <a:endParaRPr lang="zh-CN" altLang="en-US" i="1" dirty="0"/>
+          </a:p>
+        </p:txBody>
+      </p:sp>
+      <p:sp>
+        <p:nvSpPr>
+          <p:cNvPr id="5" name="文本框 4"/>
+          <p:cNvSpPr txBox="1"/>
+          <p:nvPr/>
+        </p:nvSpPr>
+        <p:spPr>
+          <a:xfrm>
+            <a:off x="9042400" y="6034505"/>
+            <a:ext cx="184666" cy="369332"/>
+          </a:xfrm>
+          <a:prstGeom prst="rect">
+            <a:avLst/>
+          </a:prstGeom>
+          <a:noFill/>
+        </p:spPr>
+        <p:txBody>
+          <a:bodyPr wrap="none" rtlCol="0">
+            <a:spAutoFit/>
+          </a:bodyPr>
+          <a:lstStyle/>
+          <a:p>
+            <a:endParaRPr kumimoji="1" lang="zh-CN" altLang="en-US" dirty="0">
+              <a:solidFill>
+                <a:prstClr val="black"/>
+              </a:solidFill>
+              <a:latin typeface="Calibri"/>
+              <a:ea typeface="宋体"/>
+            </a:endParaRPr>
+          </a:p>
+        </p:txBody>
+      </p:sp>
+      <p:sp>
+        <p:nvSpPr>
+          <p:cNvPr id="6" name="文本框 5"/>
+          <p:cNvSpPr txBox="1"/>
+          <p:nvPr/>
+        </p:nvSpPr>
+        <p:spPr>
+          <a:xfrm>
+            <a:off x="9194800" y="6186905"/>
+            <a:ext cx="184666" cy="369332"/>
+          </a:xfrm>
+          <a:prstGeom prst="rect">
+            <a:avLst/>
+          </a:prstGeom>
+          <a:noFill/>
+        </p:spPr>
+        <p:txBody>
+          <a:bodyPr wrap="none" rtlCol="0">
+            <a:spAutoFit/>
+          </a:bodyPr>
+          <a:lstStyle/>
+          <a:p>
+            <a:endParaRPr kumimoji="1" lang="zh-CN" altLang="en-US" dirty="0">
+              <a:solidFill>
+                <a:prstClr val="black"/>
+              </a:solidFill>
+              <a:latin typeface="Calibri"/>
+              <a:ea typeface="宋体"/>
+            </a:endParaRPr>
+          </a:p>
+        </p:txBody>
+      </p:sp>
+      <p:sp>
+        <p:nvSpPr>
+          <p:cNvPr id="7" name="文本框 6"/>
+          <p:cNvSpPr txBox="1"/>
+          <p:nvPr/>
+        </p:nvSpPr>
+        <p:spPr>
+          <a:xfrm>
+            <a:off x="8890000" y="5882105"/>
+            <a:ext cx="184666" cy="369332"/>
+          </a:xfrm>
+          <a:prstGeom prst="rect">
+            <a:avLst/>
+          </a:prstGeom>
+          <a:noFill/>
+        </p:spPr>
+        <p:txBody>
+          <a:bodyPr wrap="none" rtlCol="0">
+            <a:spAutoFit/>
+          </a:bodyPr>
+          <a:lstStyle/>
+          <a:p>
+            <a:endParaRPr kumimoji="1" lang="zh-CN" altLang="en-US" dirty="0">
+              <a:solidFill>
+                <a:prstClr val="black"/>
+              </a:solidFill>
+              <a:latin typeface="Calibri"/>
+              <a:ea typeface="宋体"/>
+            </a:endParaRPr>
+          </a:p>
+        </p:txBody>
+      </p:sp>
+      <p:sp>
+        <p:nvSpPr>
+          <p:cNvPr id="8" name="文本框 7"/>
+          <p:cNvSpPr txBox="1"/>
+          <p:nvPr/>
+        </p:nvSpPr>
+        <p:spPr>
+          <a:xfrm>
+            <a:off x="9042400" y="6034505"/>
+            <a:ext cx="184666" cy="369332"/>
+          </a:xfrm>
+          <a:prstGeom prst="rect">
+            <a:avLst/>
+          </a:prstGeom>
+          <a:noFill/>
+        </p:spPr>
+        <p:txBody>
+          <a:bodyPr wrap="none" rtlCol="0">
+            <a:spAutoFit/>
+          </a:bodyPr>
+          <a:lstStyle/>
+          <a:p>
+            <a:endParaRPr kumimoji="1" lang="zh-CN" altLang="en-US" dirty="0">
+              <a:solidFill>
+                <a:prstClr val="black"/>
+              </a:solidFill>
+              <a:latin typeface="Calibri"/>
+              <a:ea typeface="宋体"/>
+            </a:endParaRPr>
+          </a:p>
+        </p:txBody>
+      </p:sp>
+      <p:sp>
+        <p:nvSpPr>
+          <p:cNvPr id="9" name="文本框 8"/>
+          <p:cNvSpPr txBox="1"/>
+          <p:nvPr/>
+        </p:nvSpPr>
+        <p:spPr>
+          <a:xfrm>
+            <a:off x="9347200" y="6339305"/>
+            <a:ext cx="184666" cy="369332"/>
+          </a:xfrm>
+          <a:prstGeom prst="rect">
+            <a:avLst/>
+          </a:prstGeom>
+          <a:noFill/>
+        </p:spPr>
+        <p:txBody>
+          <a:bodyPr wrap="none" rtlCol="0">
+            <a:spAutoFit/>
+          </a:bodyPr>
+          <a:lstStyle/>
+          <a:p>
+            <a:endParaRPr kumimoji="1" lang="zh-CN" altLang="en-US" dirty="0">
+              <a:solidFill>
+                <a:prstClr val="black"/>
+              </a:solidFill>
+              <a:latin typeface="Calibri"/>
+              <a:ea typeface="宋体"/>
             </a:endParaRPr>
           </a:p>
         </p:txBody>
@@ -36401,7 +36593,7 @@
     </p:spTree>
     <p:extLst>
       <p:ext uri="{BB962C8B-B14F-4D97-AF65-F5344CB8AC3E}">
-        <p14:creationId xmlns:p14="http://schemas.microsoft.com/office/powerpoint/2010/main" val="894370446"/>
+        <p14:creationId xmlns:p14="http://schemas.microsoft.com/office/powerpoint/2010/main" val="694784170"/>
       </p:ext>
     </p:extLst>
   </p:cSld>
@@ -36418,7 +36610,7 @@
 </p:sld>
 </file>
 
-<file path=ppt/slides/slide3.xml><?xml version="1.0" encoding="utf-8"?>
+<file path=ppt/slides/slide29.xml><?xml version="1.0" encoding="utf-8"?>
 <p:sld xmlns:a="http://schemas.openxmlformats.org/drawingml/2006/main" xmlns:r="http://schemas.openxmlformats.org/officeDocument/2006/relationships" xmlns:p="http://schemas.openxmlformats.org/presentationml/2006/main">
   <p:cSld>
     <p:bg>
@@ -36461,7 +36653,7 @@
         </p:nvSpPr>
         <p:spPr>
           <a:xfrm>
-            <a:off x="395536" y="404664"/>
+            <a:off x="395536" y="1700808"/>
             <a:ext cx="8229600" cy="1143000"/>
           </a:xfrm>
         </p:spPr>
@@ -36470,89 +36662,119 @@
           <a:lstStyle/>
           <a:p>
             <a:r>
-              <a:rPr lang="en-US" altLang="zh-CN" dirty="0" smtClean="0"/>
-              <a:t>Spark : What</a:t>
-            </a:r>
-            <a:r>
-              <a:rPr lang="zh-CN" altLang="en-US" dirty="0" smtClean="0"/>
-              <a:t> </a:t>
-            </a:r>
-            <a:r>
-              <a:rPr lang="en-US" altLang="zh-CN" dirty="0" smtClean="0"/>
-              <a:t>&amp;</a:t>
-            </a:r>
-            <a:r>
-              <a:rPr lang="zh-CN" altLang="en-US" dirty="0" smtClean="0"/>
-              <a:t> </a:t>
-            </a:r>
-            <a:r>
-              <a:rPr lang="en-US" altLang="zh-CN" dirty="0" smtClean="0"/>
-              <a:t>Why</a:t>
-            </a:r>
-            <a:endParaRPr lang="zh-CN" altLang="en-US" dirty="0"/>
-          </a:p>
-        </p:txBody>
-      </p:sp>
-      <p:sp>
-        <p:nvSpPr>
-          <p:cNvPr id="3" name="内容占位符 2"/>
-          <p:cNvSpPr>
-            <a:spLocks noGrp="1"/>
-          </p:cNvSpPr>
-          <p:nvPr>
-            <p:ph idx="1"/>
+              <a:rPr lang="en-US" altLang="zh-CN" b="1" dirty="0" smtClean="0">
+                <a:solidFill>
+                  <a:schemeClr val="bg1"/>
+                </a:solidFill>
+                <a:latin typeface="微软雅黑" pitchFamily="34" charset="-122"/>
+                <a:ea typeface="微软雅黑" pitchFamily="34" charset="-122"/>
+              </a:rPr>
+              <a:t>Q&amp;A</a:t>
+            </a:r>
+            <a:endParaRPr lang="zh-CN" altLang="en-US" b="1" dirty="0">
+              <a:solidFill>
+                <a:schemeClr val="bg1"/>
+              </a:solidFill>
+              <a:latin typeface="微软雅黑" pitchFamily="34" charset="-122"/>
+              <a:ea typeface="微软雅黑" pitchFamily="34" charset="-122"/>
+            </a:endParaRPr>
+          </a:p>
+        </p:txBody>
+      </p:sp>
+    </p:spTree>
+    <p:extLst>
+      <p:ext uri="{BB962C8B-B14F-4D97-AF65-F5344CB8AC3E}">
+        <p14:creationId xmlns:p14="http://schemas.microsoft.com/office/powerpoint/2010/main" val="894370446"/>
+      </p:ext>
+    </p:extLst>
+  </p:cSld>
+  <p:clrMapOvr>
+    <a:masterClrMapping/>
+  </p:clrMapOvr>
+  <p:timing>
+    <p:tnLst>
+      <p:par>
+        <p:cTn xmlns:p14="http://schemas.microsoft.com/office/powerpoint/2010/main" id="1" dur="indefinite" restart="never" nodeType="tmRoot"/>
+      </p:par>
+    </p:tnLst>
+  </p:timing>
+</p:sld>
+</file>
+
+<file path=ppt/slides/slide3.xml><?xml version="1.0" encoding="utf-8"?>
+<p:sld xmlns:a="http://schemas.openxmlformats.org/drawingml/2006/main" xmlns:r="http://schemas.openxmlformats.org/officeDocument/2006/relationships" xmlns:p="http://schemas.openxmlformats.org/presentationml/2006/main">
+  <p:cSld>
+    <p:spTree>
+      <p:nvGrpSpPr>
+        <p:cNvPr id="1" name=""/>
+        <p:cNvGrpSpPr/>
+        <p:nvPr/>
+      </p:nvGrpSpPr>
+      <p:grpSpPr>
+        <a:xfrm>
+          <a:off x="0" y="0"/>
+          <a:ext cx="0" cy="0"/>
+          <a:chOff x="0" y="0"/>
+          <a:chExt cx="0" cy="0"/>
+        </a:xfrm>
+      </p:grpSpPr>
+      <p:sp>
+        <p:nvSpPr>
+          <p:cNvPr id="2" name="标题 1"/>
+          <p:cNvSpPr>
+            <a:spLocks noGrp="1"/>
+          </p:cNvSpPr>
+          <p:nvPr>
+            <p:ph type="title"/>
           </p:nvPr>
         </p:nvSpPr>
         <p:spPr>
           <a:xfrm>
-            <a:off x="395536" y="1340768"/>
-            <a:ext cx="8229600" cy="4525963"/>
+            <a:off x="395536" y="1052736"/>
+            <a:ext cx="8229600" cy="1143000"/>
           </a:xfrm>
         </p:spPr>
         <p:txBody>
           <a:bodyPr/>
           <a:lstStyle/>
           <a:p>
+            <a:r>
+              <a:rPr lang="en-US" altLang="zh-CN" dirty="0" smtClean="0"/>
+              <a:t>Major Release</a:t>
+            </a:r>
+            <a:endParaRPr lang="zh-CN" altLang="en-US" dirty="0"/>
+          </a:p>
+        </p:txBody>
+      </p:sp>
+      <p:sp>
+        <p:nvSpPr>
+          <p:cNvPr id="3" name="内容占位符 2"/>
+          <p:cNvSpPr>
+            <a:spLocks noGrp="1"/>
+          </p:cNvSpPr>
+          <p:nvPr>
+            <p:ph idx="1"/>
+          </p:nvPr>
+        </p:nvSpPr>
+        <p:spPr/>
+        <p:txBody>
+          <a:bodyPr/>
+          <a:lstStyle/>
+          <a:p>
             <a:endParaRPr lang="en-US" altLang="zh-CN" dirty="0" smtClean="0"/>
           </a:p>
           <a:p>
-            <a:r>
-              <a:rPr lang="en-US" altLang="zh-CN" dirty="0" smtClean="0"/>
-              <a:t>Apache </a:t>
-            </a:r>
-            <a:r>
-              <a:rPr lang="en-US" altLang="zh-CN" dirty="0"/>
-              <a:t>Spark is a fast and general engine for large-scale data processing.</a:t>
-            </a:r>
-          </a:p>
-          <a:p>
-            <a:r>
-              <a:rPr lang="en-US" altLang="zh-CN" dirty="0"/>
-              <a:t>Speed</a:t>
-            </a:r>
-          </a:p>
-          <a:p>
-            <a:r>
-              <a:rPr lang="en-US" altLang="zh-CN" dirty="0"/>
-              <a:t>Ease of Use</a:t>
-            </a:r>
-          </a:p>
-          <a:p>
-            <a:r>
-              <a:rPr lang="en-US" altLang="zh-CN" dirty="0"/>
-              <a:t>Generality</a:t>
-            </a:r>
-          </a:p>
-          <a:p>
-            <a:r>
-              <a:rPr lang="en-US" altLang="zh-CN" dirty="0"/>
-              <a:t>Integrated with </a:t>
-            </a:r>
-            <a:r>
-              <a:rPr lang="en-US" altLang="zh-CN" dirty="0" err="1"/>
-              <a:t>Hadoop</a:t>
-            </a:r>
-            <a:endParaRPr lang="zh-CN" altLang="en-US" dirty="0"/>
+            <a:endParaRPr lang="en-US" altLang="zh-CN" dirty="0" smtClean="0"/>
+          </a:p>
+          <a:p>
+            <a:endParaRPr lang="en-US" altLang="zh-CN" dirty="0" smtClean="0"/>
+          </a:p>
+          <a:p>
+            <a:r>
+              <a:rPr lang="en-US" altLang="zh-CN" sz="4800" b="1" dirty="0" smtClean="0"/>
+              <a:t>Just released Spark 1.1</a:t>
+            </a:r>
+            <a:endParaRPr lang="en-US" altLang="zh-CN" sz="4800" b="1" dirty="0"/>
           </a:p>
         </p:txBody>
       </p:sp>
@@ -36578,7 +36800,13 @@
           </a:bodyPr>
           <a:lstStyle/>
           <a:p>
-            <a:endParaRPr kumimoji="1" lang="zh-CN" altLang="en-US" dirty="0"/>
+            <a:endParaRPr kumimoji="1" lang="zh-CN" altLang="en-US" dirty="0">
+              <a:solidFill>
+                <a:prstClr val="black"/>
+              </a:solidFill>
+              <a:latin typeface="Calibri"/>
+              <a:ea typeface="宋体"/>
+            </a:endParaRPr>
           </a:p>
         </p:txBody>
       </p:sp>
@@ -36604,7 +36832,13 @@
           </a:bodyPr>
           <a:lstStyle/>
           <a:p>
-            <a:endParaRPr kumimoji="1" lang="zh-CN" altLang="en-US" dirty="0"/>
+            <a:endParaRPr kumimoji="1" lang="zh-CN" altLang="en-US" dirty="0">
+              <a:solidFill>
+                <a:prstClr val="black"/>
+              </a:solidFill>
+              <a:latin typeface="Calibri"/>
+              <a:ea typeface="宋体"/>
+            </a:endParaRPr>
           </a:p>
         </p:txBody>
       </p:sp>
@@ -36630,7 +36864,13 @@
           </a:bodyPr>
           <a:lstStyle/>
           <a:p>
-            <a:endParaRPr kumimoji="1" lang="zh-CN" altLang="en-US" dirty="0"/>
+            <a:endParaRPr kumimoji="1" lang="zh-CN" altLang="en-US" dirty="0">
+              <a:solidFill>
+                <a:prstClr val="black"/>
+              </a:solidFill>
+              <a:latin typeface="Calibri"/>
+              <a:ea typeface="宋体"/>
+            </a:endParaRPr>
           </a:p>
         </p:txBody>
       </p:sp>
@@ -36656,7 +36896,13 @@
           </a:bodyPr>
           <a:lstStyle/>
           <a:p>
-            <a:endParaRPr kumimoji="1" lang="zh-CN" altLang="en-US" dirty="0"/>
+            <a:endParaRPr kumimoji="1" lang="zh-CN" altLang="en-US" dirty="0">
+              <a:solidFill>
+                <a:prstClr val="black"/>
+              </a:solidFill>
+              <a:latin typeface="Calibri"/>
+              <a:ea typeface="宋体"/>
+            </a:endParaRPr>
           </a:p>
         </p:txBody>
       </p:sp>
@@ -36682,14 +36928,20 @@
           </a:bodyPr>
           <a:lstStyle/>
           <a:p>
-            <a:endParaRPr kumimoji="1" lang="zh-CN" altLang="en-US" dirty="0"/>
+            <a:endParaRPr kumimoji="1" lang="zh-CN" altLang="en-US" dirty="0">
+              <a:solidFill>
+                <a:prstClr val="black"/>
+              </a:solidFill>
+              <a:latin typeface="Calibri"/>
+              <a:ea typeface="宋体"/>
+            </a:endParaRPr>
           </a:p>
         </p:txBody>
       </p:sp>
     </p:spTree>
     <p:extLst>
       <p:ext uri="{BB962C8B-B14F-4D97-AF65-F5344CB8AC3E}">
-        <p14:creationId xmlns:p14="http://schemas.microsoft.com/office/powerpoint/2010/main" val="763933515"/>
+        <p14:creationId xmlns:p14="http://schemas.microsoft.com/office/powerpoint/2010/main" val="967110715"/>
       </p:ext>
     </p:extLst>
   </p:cSld>
@@ -36759,31 +37011,91 @@
           <a:p>
             <a:r>
               <a:rPr lang="en-US" altLang="zh-CN" dirty="0" smtClean="0"/>
-              <a:t>BDAS</a:t>
+              <a:t>Spark : What</a:t>
+            </a:r>
+            <a:r>
+              <a:rPr lang="zh-CN" altLang="en-US" dirty="0" smtClean="0"/>
+              <a:t> </a:t>
+            </a:r>
+            <a:r>
+              <a:rPr lang="en-US" altLang="zh-CN" dirty="0" smtClean="0"/>
+              <a:t>&amp;</a:t>
+            </a:r>
+            <a:r>
+              <a:rPr lang="zh-CN" altLang="en-US" dirty="0" smtClean="0"/>
+              <a:t> </a:t>
+            </a:r>
+            <a:r>
+              <a:rPr lang="en-US" altLang="zh-CN" dirty="0" smtClean="0"/>
+              <a:t>Why</a:t>
             </a:r>
             <a:endParaRPr lang="zh-CN" altLang="en-US" dirty="0"/>
           </a:p>
         </p:txBody>
       </p:sp>
-      <p:pic>
-        <p:nvPicPr>
-          <p:cNvPr id="4" name="内容占位符 3"/>
-          <p:cNvPicPr>
-            <a:picLocks noGrp="1" noChangeAspect="1"/>
-          </p:cNvPicPr>
+      <p:sp>
+        <p:nvSpPr>
+          <p:cNvPr id="3" name="内容占位符 2"/>
+          <p:cNvSpPr>
+            <a:spLocks noGrp="1"/>
+          </p:cNvSpPr>
           <p:nvPr>
             <p:ph idx="1"/>
           </p:nvPr>
-        </p:nvPicPr>
-        <p:blipFill>
-          <a:blip r:embed="rId3"/>
-          <a:srcRect t="4645" b="4645"/>
-          <a:stretch>
-            <a:fillRect/>
-          </a:stretch>
-        </p:blipFill>
-        <p:spPr/>
-      </p:pic>
+        </p:nvSpPr>
+        <p:spPr>
+          <a:xfrm>
+            <a:off x="395536" y="1340768"/>
+            <a:ext cx="8229600" cy="4525963"/>
+          </a:xfrm>
+        </p:spPr>
+        <p:txBody>
+          <a:bodyPr/>
+          <a:lstStyle/>
+          <a:p>
+            <a:endParaRPr lang="en-US" altLang="zh-CN" dirty="0" smtClean="0"/>
+          </a:p>
+          <a:p>
+            <a:r>
+              <a:rPr lang="en-US" altLang="zh-CN" dirty="0" smtClean="0"/>
+              <a:t>Apache </a:t>
+            </a:r>
+            <a:r>
+              <a:rPr lang="en-US" altLang="zh-CN" dirty="0"/>
+              <a:t>Spark is a fast and general engine for large-scale data processing.</a:t>
+            </a:r>
+          </a:p>
+          <a:p>
+            <a:r>
+              <a:rPr lang="en-US" altLang="zh-CN" dirty="0"/>
+              <a:t>Speed</a:t>
+            </a:r>
+          </a:p>
+          <a:p>
+            <a:r>
+              <a:rPr lang="en-US" altLang="zh-CN" dirty="0"/>
+              <a:t>Ease of Use</a:t>
+            </a:r>
+          </a:p>
+          <a:p>
+            <a:r>
+              <a:rPr lang="en-US" altLang="zh-CN" dirty="0"/>
+              <a:t>Generality</a:t>
+            </a:r>
+          </a:p>
+          <a:p>
+            <a:r>
+              <a:rPr lang="en-US" altLang="zh-CN" dirty="0"/>
+              <a:t>Integrated with </a:t>
+            </a:r>
+            <a:r>
+              <a:rPr lang="en-US" altLang="zh-CN" dirty="0" err="1"/>
+              <a:t>Hadoop</a:t>
+            </a:r>
+            <a:endParaRPr lang="zh-CN" altLang="en-US" dirty="0"/>
+          </a:p>
+        </p:txBody>
+      </p:sp>
       <p:sp>
         <p:nvSpPr>
           <p:cNvPr id="5" name="文本框 4"/>
@@ -36806,13 +37118,7 @@
           </a:bodyPr>
           <a:lstStyle/>
           <a:p>
-            <a:endParaRPr kumimoji="1" lang="zh-CN" altLang="en-US" dirty="0">
-              <a:solidFill>
-                <a:prstClr val="black"/>
-              </a:solidFill>
-              <a:latin typeface="Calibri"/>
-              <a:ea typeface="宋体"/>
-            </a:endParaRPr>
+            <a:endParaRPr kumimoji="1" lang="zh-CN" altLang="en-US" dirty="0"/>
           </a:p>
         </p:txBody>
       </p:sp>
@@ -36838,13 +37144,7 @@
           </a:bodyPr>
           <a:lstStyle/>
           <a:p>
-            <a:endParaRPr kumimoji="1" lang="zh-CN" altLang="en-US" dirty="0">
-              <a:solidFill>
-                <a:prstClr val="black"/>
-              </a:solidFill>
-              <a:latin typeface="Calibri"/>
-              <a:ea typeface="宋体"/>
-            </a:endParaRPr>
+            <a:endParaRPr kumimoji="1" lang="zh-CN" altLang="en-US" dirty="0"/>
           </a:p>
         </p:txBody>
       </p:sp>
@@ -36870,13 +37170,7 @@
           </a:bodyPr>
           <a:lstStyle/>
           <a:p>
-            <a:endParaRPr kumimoji="1" lang="zh-CN" altLang="en-US" dirty="0">
-              <a:solidFill>
-                <a:prstClr val="black"/>
-              </a:solidFill>
-              <a:latin typeface="Calibri"/>
-              <a:ea typeface="宋体"/>
-            </a:endParaRPr>
+            <a:endParaRPr kumimoji="1" lang="zh-CN" altLang="en-US" dirty="0"/>
           </a:p>
         </p:txBody>
       </p:sp>
@@ -36902,13 +37196,7 @@
           </a:bodyPr>
           <a:lstStyle/>
           <a:p>
-            <a:endParaRPr kumimoji="1" lang="zh-CN" altLang="en-US" dirty="0">
-              <a:solidFill>
-                <a:prstClr val="black"/>
-              </a:solidFill>
-              <a:latin typeface="Calibri"/>
-              <a:ea typeface="宋体"/>
-            </a:endParaRPr>
+            <a:endParaRPr kumimoji="1" lang="zh-CN" altLang="en-US" dirty="0"/>
           </a:p>
         </p:txBody>
       </p:sp>
@@ -36934,20 +37222,14 @@
           </a:bodyPr>
           <a:lstStyle/>
           <a:p>
-            <a:endParaRPr kumimoji="1" lang="zh-CN" altLang="en-US" dirty="0">
-              <a:solidFill>
-                <a:prstClr val="black"/>
-              </a:solidFill>
-              <a:latin typeface="Calibri"/>
-              <a:ea typeface="宋体"/>
-            </a:endParaRPr>
+            <a:endParaRPr kumimoji="1" lang="zh-CN" altLang="en-US" dirty="0"/>
           </a:p>
         </p:txBody>
       </p:sp>
     </p:spTree>
     <p:extLst>
       <p:ext uri="{BB962C8B-B14F-4D97-AF65-F5344CB8AC3E}">
-        <p14:creationId xmlns:p14="http://schemas.microsoft.com/office/powerpoint/2010/main" val="250215931"/>
+        <p14:creationId xmlns:p14="http://schemas.microsoft.com/office/powerpoint/2010/main" val="763933515"/>
       </p:ext>
     </p:extLst>
   </p:cSld>
@@ -37016,13 +37298,32 @@
           <a:lstStyle/>
           <a:p>
             <a:r>
-              <a:rPr lang="en-US" altLang="zh-CN" dirty="0"/>
-              <a:t>one stack to rule them all</a:t>
+              <a:rPr lang="en-US" altLang="zh-CN" dirty="0" smtClean="0"/>
+              <a:t>BDAS</a:t>
             </a:r>
             <a:endParaRPr lang="zh-CN" altLang="en-US" dirty="0"/>
           </a:p>
         </p:txBody>
       </p:sp>
+      <p:pic>
+        <p:nvPicPr>
+          <p:cNvPr id="4" name="内容占位符 3"/>
+          <p:cNvPicPr>
+            <a:picLocks noGrp="1" noChangeAspect="1"/>
+          </p:cNvPicPr>
+          <p:nvPr>
+            <p:ph idx="1"/>
+          </p:nvPr>
+        </p:nvPicPr>
+        <p:blipFill>
+          <a:blip r:embed="rId3"/>
+          <a:srcRect t="4645" b="4645"/>
+          <a:stretch>
+            <a:fillRect/>
+          </a:stretch>
+        </p:blipFill>
+        <p:spPr/>
+      </p:pic>
       <p:sp>
         <p:nvSpPr>
           <p:cNvPr id="5" name="文本框 4"/>
@@ -37183,32 +37484,10 @@
           </a:p>
         </p:txBody>
       </p:sp>
-      <p:pic>
-        <p:nvPicPr>
-          <p:cNvPr id="17" name="内容占位符 16"/>
-          <p:cNvPicPr>
-            <a:picLocks noGrp="1" noChangeAspect="1"/>
-          </p:cNvPicPr>
-          <p:nvPr>
-            <p:ph idx="1"/>
-          </p:nvPr>
-        </p:nvPicPr>
-        <p:blipFill rotWithShape="1">
-          <a:blip r:embed="rId3"/>
-          <a:srcRect l="-26921" t="-15006" r="-32115" b="-34502"/>
-          <a:stretch/>
-        </p:blipFill>
-        <p:spPr>
-          <a:xfrm>
-            <a:off x="-1476375" y="1628775"/>
-            <a:ext cx="12103100" cy="4518025"/>
-          </a:xfrm>
-        </p:spPr>
-      </p:pic>
     </p:spTree>
     <p:extLst>
       <p:ext uri="{BB962C8B-B14F-4D97-AF65-F5344CB8AC3E}">
-        <p14:creationId xmlns:p14="http://schemas.microsoft.com/office/powerpoint/2010/main" val="1355106635"/>
+        <p14:creationId xmlns:p14="http://schemas.microsoft.com/office/powerpoint/2010/main" val="250215931"/>
       </p:ext>
     </p:extLst>
   </p:cSld>
@@ -37278,67 +37557,7 @@
           <a:p>
             <a:r>
               <a:rPr lang="en-US" altLang="zh-CN" dirty="0"/>
-              <a:t>Key Concept-RDD</a:t>
-            </a:r>
-            <a:endParaRPr lang="zh-CN" altLang="en-US" dirty="0"/>
-          </a:p>
-        </p:txBody>
-      </p:sp>
-      <p:sp>
-        <p:nvSpPr>
-          <p:cNvPr id="3" name="内容占位符 2"/>
-          <p:cNvSpPr>
-            <a:spLocks noGrp="1"/>
-          </p:cNvSpPr>
-          <p:nvPr>
-            <p:ph idx="1"/>
-          </p:nvPr>
-        </p:nvSpPr>
-        <p:spPr>
-          <a:xfrm>
-            <a:off x="539552" y="1844824"/>
-            <a:ext cx="8229600" cy="4525963"/>
-          </a:xfrm>
-        </p:spPr>
-        <p:txBody>
-          <a:bodyPr/>
-          <a:lstStyle/>
-          <a:p>
-            <a:r>
-              <a:rPr lang="en-US" altLang="zh-CN" dirty="0"/>
-              <a:t>A list of partitions</a:t>
-            </a:r>
-          </a:p>
-          <a:p>
-            <a:r>
-              <a:rPr lang="en-US" altLang="zh-CN" dirty="0"/>
-              <a:t>A function for computing each split</a:t>
-            </a:r>
-          </a:p>
-          <a:p>
-            <a:r>
-              <a:rPr lang="en-US" altLang="zh-CN" dirty="0"/>
-              <a:t>A list of dependencies on other RDDs</a:t>
-            </a:r>
-          </a:p>
-          <a:p>
-            <a:r>
-              <a:rPr lang="en-US" altLang="zh-CN" dirty="0"/>
-              <a:t>Optionally, a </a:t>
-            </a:r>
-            <a:r>
-              <a:rPr lang="en-US" altLang="zh-CN" dirty="0" err="1"/>
-              <a:t>Partitioner</a:t>
-            </a:r>
-            <a:r>
-              <a:rPr lang="en-US" altLang="zh-CN" dirty="0"/>
-              <a:t> for key-value RDDs</a:t>
-            </a:r>
-          </a:p>
-          <a:p>
-            <a:r>
-              <a:rPr lang="en-US" altLang="zh-CN" dirty="0"/>
-              <a:t>Optionally, a list of preferred locations to compute each split on</a:t>
+              <a:t>one stack to rule them all</a:t>
             </a:r>
             <a:endParaRPr lang="zh-CN" altLang="en-US" dirty="0"/>
           </a:p>
@@ -37504,10 +37723,32 @@
           </a:p>
         </p:txBody>
       </p:sp>
+      <p:pic>
+        <p:nvPicPr>
+          <p:cNvPr id="17" name="内容占位符 16"/>
+          <p:cNvPicPr>
+            <a:picLocks noGrp="1" noChangeAspect="1"/>
+          </p:cNvPicPr>
+          <p:nvPr>
+            <p:ph idx="1"/>
+          </p:nvPr>
+        </p:nvPicPr>
+        <p:blipFill rotWithShape="1">
+          <a:blip r:embed="rId3"/>
+          <a:srcRect l="-26921" t="-15006" r="-32115" b="-34502"/>
+          <a:stretch/>
+        </p:blipFill>
+        <p:spPr>
+          <a:xfrm>
+            <a:off x="-1476375" y="1628775"/>
+            <a:ext cx="12103100" cy="4518025"/>
+          </a:xfrm>
+        </p:spPr>
+      </p:pic>
     </p:spTree>
     <p:extLst>
       <p:ext uri="{BB962C8B-B14F-4D97-AF65-F5344CB8AC3E}">
-        <p14:creationId xmlns:p14="http://schemas.microsoft.com/office/powerpoint/2010/main" val="150644974"/>
+        <p14:creationId xmlns:p14="http://schemas.microsoft.com/office/powerpoint/2010/main" val="1355106635"/>
       </p:ext>
     </p:extLst>
   </p:cSld>
@@ -37577,34 +37818,72 @@
           <a:p>
             <a:r>
               <a:rPr lang="en-US" altLang="zh-CN" dirty="0"/>
-              <a:t>Key Concept-Lineage</a:t>
+              <a:t>Key Concept-RDD</a:t>
             </a:r>
             <a:endParaRPr lang="zh-CN" altLang="en-US" dirty="0"/>
           </a:p>
         </p:txBody>
       </p:sp>
-      <p:pic>
-        <p:nvPicPr>
-          <p:cNvPr id="4" name="内容占位符 3"/>
-          <p:cNvPicPr>
-            <a:picLocks noGrp="1" noChangeAspect="1"/>
-          </p:cNvPicPr>
+      <p:sp>
+        <p:nvSpPr>
+          <p:cNvPr id="3" name="内容占位符 2"/>
+          <p:cNvSpPr>
+            <a:spLocks noGrp="1"/>
+          </p:cNvSpPr>
           <p:nvPr>
             <p:ph idx="1"/>
           </p:nvPr>
-        </p:nvPicPr>
-        <p:blipFill rotWithShape="1">
-          <a:blip r:embed="rId3"/>
-          <a:srcRect l="-23419" t="-16482" r="-22752" b="-29860"/>
-          <a:stretch/>
-        </p:blipFill>
+        </p:nvSpPr>
         <p:spPr>
           <a:xfrm>
-            <a:off x="-1928813" y="1600200"/>
-            <a:ext cx="13011151" cy="4462463"/>
+            <a:off x="539552" y="1844824"/>
+            <a:ext cx="8229600" cy="4525963"/>
           </a:xfrm>
         </p:spPr>
-      </p:pic>
+        <p:txBody>
+          <a:bodyPr/>
+          <a:lstStyle/>
+          <a:p>
+            <a:r>
+              <a:rPr lang="en-US" altLang="zh-CN" dirty="0"/>
+              <a:t>A list of partitions</a:t>
+            </a:r>
+          </a:p>
+          <a:p>
+            <a:r>
+              <a:rPr lang="en-US" altLang="zh-CN" dirty="0"/>
+              <a:t>A function for computing each split</a:t>
+            </a:r>
+          </a:p>
+          <a:p>
+            <a:r>
+              <a:rPr lang="en-US" altLang="zh-CN" dirty="0"/>
+              <a:t>A list of dependencies on other RDDs</a:t>
+            </a:r>
+          </a:p>
+          <a:p>
+            <a:r>
+              <a:rPr lang="en-US" altLang="zh-CN" dirty="0"/>
+              <a:t>Optionally, a </a:t>
+            </a:r>
+            <a:r>
+              <a:rPr lang="en-US" altLang="zh-CN" dirty="0" err="1"/>
+              <a:t>Partitioner</a:t>
+            </a:r>
+            <a:r>
+              <a:rPr lang="en-US" altLang="zh-CN" dirty="0"/>
+              <a:t> for key-value RDDs</a:t>
+            </a:r>
+          </a:p>
+          <a:p>
+            <a:r>
+              <a:rPr lang="en-US" altLang="zh-CN" dirty="0"/>
+              <a:t>Optionally, a list of preferred locations to compute each split on</a:t>
+            </a:r>
+            <a:endParaRPr lang="zh-CN" altLang="en-US" dirty="0"/>
+          </a:p>
+        </p:txBody>
+      </p:sp>
       <p:sp>
         <p:nvSpPr>
           <p:cNvPr id="5" name="文本框 4"/>
@@ -37768,7 +38047,7 @@
     </p:spTree>
     <p:extLst>
       <p:ext uri="{BB962C8B-B14F-4D97-AF65-F5344CB8AC3E}">
-        <p14:creationId xmlns:p14="http://schemas.microsoft.com/office/powerpoint/2010/main" val="220267254"/>
+        <p14:creationId xmlns:p14="http://schemas.microsoft.com/office/powerpoint/2010/main" val="150644974"/>
       </p:ext>
     </p:extLst>
   </p:cSld>
@@ -37838,7 +38117,7 @@
           <a:p>
             <a:r>
               <a:rPr lang="en-US" altLang="zh-CN" dirty="0"/>
-              <a:t>Key Concept-Dependency</a:t>
+              <a:t>Key Concept-Lineage</a:t>
             </a:r>
             <a:endParaRPr lang="zh-CN" altLang="en-US" dirty="0"/>
           </a:p>
@@ -37854,17 +38133,15 @@
             <p:ph idx="1"/>
           </p:nvPr>
         </p:nvPicPr>
-        <p:blipFill>
+        <p:blipFill rotWithShape="1">
           <a:blip r:embed="rId3"/>
-          <a:srcRect t="1541" b="1541"/>
-          <a:stretch>
-            <a:fillRect/>
-          </a:stretch>
+          <a:srcRect l="-23419" t="-16482" r="-22752" b="-29860"/>
+          <a:stretch/>
         </p:blipFill>
         <p:spPr>
           <a:xfrm>
-            <a:off x="1043608" y="1988840"/>
-            <a:ext cx="7056784" cy="3880960"/>
+            <a:off x="-1928813" y="1600200"/>
+            <a:ext cx="13011151" cy="4462463"/>
           </a:xfrm>
         </p:spPr>
       </p:pic>
@@ -38031,7 +38308,7 @@
     </p:spTree>
     <p:extLst>
       <p:ext uri="{BB962C8B-B14F-4D97-AF65-F5344CB8AC3E}">
-        <p14:creationId xmlns:p14="http://schemas.microsoft.com/office/powerpoint/2010/main" val="3498872563"/>
+        <p14:creationId xmlns:p14="http://schemas.microsoft.com/office/powerpoint/2010/main" val="220267254"/>
       </p:ext>
     </p:extLst>
   </p:cSld>
@@ -38091,7 +38368,7 @@
         </p:nvSpPr>
         <p:spPr>
           <a:xfrm>
-            <a:off x="323528" y="908720"/>
+            <a:off x="395536" y="404664"/>
             <a:ext cx="8229600" cy="1143000"/>
           </a:xfrm>
         </p:spPr>
@@ -38101,63 +38378,36 @@
           <a:p>
             <a:r>
               <a:rPr lang="en-US" altLang="zh-CN" dirty="0"/>
-              <a:t>Key Concept-</a:t>
-            </a:r>
-            <a:r>
-              <a:rPr lang="en-US" altLang="zh-CN" dirty="0" err="1"/>
-              <a:t>ClusterManager</a:t>
+              <a:t>Key Concept-Dependency</a:t>
             </a:r>
             <a:endParaRPr lang="zh-CN" altLang="en-US" dirty="0"/>
           </a:p>
         </p:txBody>
       </p:sp>
-      <p:sp>
-        <p:nvSpPr>
-          <p:cNvPr id="3" name="内容占位符 2"/>
-          <p:cNvSpPr>
-            <a:spLocks noGrp="1"/>
-          </p:cNvSpPr>
+      <p:pic>
+        <p:nvPicPr>
+          <p:cNvPr id="4" name="内容占位符 3"/>
+          <p:cNvPicPr>
+            <a:picLocks noGrp="1" noChangeAspect="1"/>
+          </p:cNvPicPr>
           <p:nvPr>
             <p:ph idx="1"/>
           </p:nvPr>
-        </p:nvSpPr>
-        <p:spPr/>
-        <p:txBody>
-          <a:bodyPr>
-            <a:normAutofit/>
-          </a:bodyPr>
-          <a:lstStyle/>
-          <a:p>
-            <a:endParaRPr lang="en-US" altLang="zh-CN" dirty="0" smtClean="0"/>
-          </a:p>
-          <a:p>
-            <a:r>
-              <a:rPr lang="en-US" altLang="zh-CN" dirty="0" smtClean="0"/>
-              <a:t>Local</a:t>
-            </a:r>
-            <a:endParaRPr lang="en-US" altLang="zh-CN" dirty="0"/>
-          </a:p>
-          <a:p>
-            <a:r>
-              <a:rPr lang="en-US" altLang="zh-CN" dirty="0"/>
-              <a:t>Standalone</a:t>
-            </a:r>
-          </a:p>
-          <a:p>
-            <a:r>
-              <a:rPr lang="en-US" altLang="zh-CN" dirty="0"/>
-              <a:t>Yarn</a:t>
-            </a:r>
-          </a:p>
-          <a:p>
-            <a:r>
-              <a:rPr lang="en-US" altLang="zh-CN" dirty="0" err="1"/>
-              <a:t>Mesos</a:t>
-            </a:r>
-            <a:endParaRPr lang="zh-CN" altLang="en-US" dirty="0"/>
-          </a:p>
-        </p:txBody>
-      </p:sp>
+        </p:nvPicPr>
+        <p:blipFill>
+          <a:blip r:embed="rId3"/>
+          <a:srcRect t="1541" b="1541"/>
+          <a:stretch>
+            <a:fillRect/>
+          </a:stretch>
+        </p:blipFill>
+        <p:spPr>
+          <a:xfrm>
+            <a:off x="1043608" y="1988840"/>
+            <a:ext cx="7056784" cy="3880960"/>
+          </a:xfrm>
+        </p:spPr>
+      </p:pic>
       <p:sp>
         <p:nvSpPr>
           <p:cNvPr id="5" name="文本框 4"/>
@@ -38321,7 +38571,7 @@
     </p:spTree>
     <p:extLst>
       <p:ext uri="{BB962C8B-B14F-4D97-AF65-F5344CB8AC3E}">
-        <p14:creationId xmlns:p14="http://schemas.microsoft.com/office/powerpoint/2010/main" val="3033085433"/>
+        <p14:creationId xmlns:p14="http://schemas.microsoft.com/office/powerpoint/2010/main" val="3498872563"/>
       </p:ext>
     </p:extLst>
   </p:cSld>

</xml_diff>

<commit_message>
specify current major version
</commit_message>
<xml_diff>
--- a/SACC2014/SACC2014.pptx
+++ b/SACC2014/SACC2014.pptx
@@ -142,7 +142,7 @@
   </p:defaultTextStyle>
   <p:extLst>
     <p:ext uri="{EFAFB233-063F-42B5-8137-9DF3F51BA10A}">
-      <p15:sldGuideLst xmlns:p15="http://schemas.microsoft.com/office/powerpoint/2012/main" xmlns="">
+      <p15:sldGuideLst xmlns="" xmlns:p15="http://schemas.microsoft.com/office/powerpoint/2012/main">
         <p15:guide id="1" orient="horz" pos="2160">
           <p15:clr>
             <a:srgbClr val="A4A3A4"/>
@@ -340,7 +340,7 @@
           <a:p>
             <a:fld id="{530820CF-B880-4189-942D-D702A7CBA730}" type="datetimeFigureOut">
               <a:rPr lang="zh-CN" altLang="en-US" smtClean="0"/>
-              <a:t>14-9-8</a:t>
+              <a:t>14-9-9</a:t>
             </a:fld>
             <a:endParaRPr lang="zh-CN" altLang="en-US"/>
           </a:p>
@@ -505,7 +505,7 @@
           <a:p>
             <a:fld id="{530820CF-B880-4189-942D-D702A7CBA730}" type="datetimeFigureOut">
               <a:rPr lang="zh-CN" altLang="en-US" smtClean="0"/>
-              <a:t>14-9-8</a:t>
+              <a:t>14-9-9</a:t>
             </a:fld>
             <a:endParaRPr lang="zh-CN" altLang="en-US"/>
           </a:p>
@@ -680,7 +680,7 @@
           <a:p>
             <a:fld id="{530820CF-B880-4189-942D-D702A7CBA730}" type="datetimeFigureOut">
               <a:rPr lang="zh-CN" altLang="en-US" smtClean="0"/>
-              <a:t>14-9-8</a:t>
+              <a:t>14-9-9</a:t>
             </a:fld>
             <a:endParaRPr lang="zh-CN" altLang="en-US"/>
           </a:p>
@@ -926,7 +926,7 @@
                 <a:ea typeface="宋体"/>
               </a:rPr>
               <a:pPr/>
-              <a:t>14-9-8</a:t>
+              <a:t>14-9-9</a:t>
             </a:fld>
             <a:endParaRPr lang="zh-CN" altLang="en-US">
               <a:solidFill>
@@ -1138,7 +1138,7 @@
                 <a:ea typeface="宋体"/>
               </a:rPr>
               <a:pPr/>
-              <a:t>14-9-8</a:t>
+              <a:t>14-9-9</a:t>
             </a:fld>
             <a:endParaRPr lang="zh-CN" altLang="en-US">
               <a:solidFill>
@@ -1426,7 +1426,7 @@
                 <a:ea typeface="宋体"/>
               </a:rPr>
               <a:pPr/>
-              <a:t>14-9-8</a:t>
+              <a:t>14-9-9</a:t>
             </a:fld>
             <a:endParaRPr lang="zh-CN" altLang="en-US">
               <a:solidFill>
@@ -1756,7 +1756,7 @@
                 <a:ea typeface="宋体"/>
               </a:rPr>
               <a:pPr/>
-              <a:t>14-9-8</a:t>
+              <a:t>14-9-9</a:t>
             </a:fld>
             <a:endParaRPr lang="zh-CN" altLang="en-US">
               <a:solidFill>
@@ -2220,7 +2220,7 @@
                 <a:ea typeface="宋体"/>
               </a:rPr>
               <a:pPr/>
-              <a:t>14-9-8</a:t>
+              <a:t>14-9-9</a:t>
             </a:fld>
             <a:endParaRPr lang="zh-CN" altLang="en-US">
               <a:solidFill>
@@ -2380,7 +2380,7 @@
                 <a:ea typeface="宋体"/>
               </a:rPr>
               <a:pPr/>
-              <a:t>14-9-8</a:t>
+              <a:t>14-9-9</a:t>
             </a:fld>
             <a:endParaRPr lang="zh-CN" altLang="en-US">
               <a:solidFill>
@@ -2517,7 +2517,7 @@
                 <a:ea typeface="宋体"/>
               </a:rPr>
               <a:pPr/>
-              <a:t>14-9-8</a:t>
+              <a:t>14-9-9</a:t>
             </a:fld>
             <a:endParaRPr lang="zh-CN" altLang="en-US">
               <a:solidFill>
@@ -2836,7 +2836,7 @@
                 <a:ea typeface="宋体"/>
               </a:rPr>
               <a:pPr/>
-              <a:t>14-9-8</a:t>
+              <a:t>14-9-9</a:t>
             </a:fld>
             <a:endParaRPr lang="zh-CN" altLang="en-US">
               <a:solidFill>
@@ -3039,7 +3039,7 @@
           <a:p>
             <a:fld id="{530820CF-B880-4189-942D-D702A7CBA730}" type="datetimeFigureOut">
               <a:rPr lang="zh-CN" altLang="en-US" smtClean="0"/>
-              <a:t>14-9-8</a:t>
+              <a:t>14-9-9</a:t>
             </a:fld>
             <a:endParaRPr lang="zh-CN" altLang="en-US"/>
           </a:p>
@@ -3296,7 +3296,7 @@
                 <a:ea typeface="宋体"/>
               </a:rPr>
               <a:pPr/>
-              <a:t>14-9-8</a:t>
+              <a:t>14-9-9</a:t>
             </a:fld>
             <a:endParaRPr lang="zh-CN" altLang="en-US">
               <a:solidFill>
@@ -3508,7 +3508,7 @@
                 <a:ea typeface="宋体"/>
               </a:rPr>
               <a:pPr/>
-              <a:t>14-9-8</a:t>
+              <a:t>14-9-9</a:t>
             </a:fld>
             <a:endParaRPr lang="zh-CN" altLang="en-US">
               <a:solidFill>
@@ -3730,7 +3730,7 @@
                 <a:ea typeface="宋体"/>
               </a:rPr>
               <a:pPr/>
-              <a:t>14-9-8</a:t>
+              <a:t>14-9-9</a:t>
             </a:fld>
             <a:endParaRPr lang="zh-CN" altLang="en-US">
               <a:solidFill>
@@ -4014,7 +4014,7 @@
                 <a:ea typeface="宋体"/>
               </a:rPr>
               <a:pPr/>
-              <a:t>14-9-8</a:t>
+              <a:t>14-9-9</a:t>
             </a:fld>
             <a:endParaRPr lang="zh-CN" altLang="en-US">
               <a:solidFill>
@@ -4226,7 +4226,7 @@
                 <a:ea typeface="宋体"/>
               </a:rPr>
               <a:pPr/>
-              <a:t>14-9-8</a:t>
+              <a:t>14-9-9</a:t>
             </a:fld>
             <a:endParaRPr lang="zh-CN" altLang="en-US">
               <a:solidFill>
@@ -4514,7 +4514,7 @@
                 <a:ea typeface="宋体"/>
               </a:rPr>
               <a:pPr/>
-              <a:t>14-9-8</a:t>
+              <a:t>14-9-9</a:t>
             </a:fld>
             <a:endParaRPr lang="zh-CN" altLang="en-US">
               <a:solidFill>
@@ -4844,7 +4844,7 @@
                 <a:ea typeface="宋体"/>
               </a:rPr>
               <a:pPr/>
-              <a:t>14-9-8</a:t>
+              <a:t>14-9-9</a:t>
             </a:fld>
             <a:endParaRPr lang="zh-CN" altLang="en-US">
               <a:solidFill>
@@ -5308,7 +5308,7 @@
                 <a:ea typeface="宋体"/>
               </a:rPr>
               <a:pPr/>
-              <a:t>14-9-8</a:t>
+              <a:t>14-9-9</a:t>
             </a:fld>
             <a:endParaRPr lang="zh-CN" altLang="en-US">
               <a:solidFill>
@@ -5468,7 +5468,7 @@
                 <a:ea typeface="宋体"/>
               </a:rPr>
               <a:pPr/>
-              <a:t>14-9-8</a:t>
+              <a:t>14-9-9</a:t>
             </a:fld>
             <a:endParaRPr lang="zh-CN" altLang="en-US">
               <a:solidFill>
@@ -5605,7 +5605,7 @@
                 <a:ea typeface="宋体"/>
               </a:rPr>
               <a:pPr/>
-              <a:t>14-9-8</a:t>
+              <a:t>14-9-9</a:t>
             </a:fld>
             <a:endParaRPr lang="zh-CN" altLang="en-US">
               <a:solidFill>
@@ -5884,7 +5884,7 @@
           <a:p>
             <a:fld id="{530820CF-B880-4189-942D-D702A7CBA730}" type="datetimeFigureOut">
               <a:rPr lang="zh-CN" altLang="en-US" smtClean="0"/>
-              <a:t>14-9-8</a:t>
+              <a:t>14-9-9</a:t>
             </a:fld>
             <a:endParaRPr lang="zh-CN" altLang="en-US"/>
           </a:p>
@@ -6165,7 +6165,7 @@
                 <a:ea typeface="宋体"/>
               </a:rPr>
               <a:pPr/>
-              <a:t>14-9-8</a:t>
+              <a:t>14-9-9</a:t>
             </a:fld>
             <a:endParaRPr lang="zh-CN" altLang="en-US">
               <a:solidFill>
@@ -6460,7 +6460,7 @@
                 <a:ea typeface="宋体"/>
               </a:rPr>
               <a:pPr/>
-              <a:t>14-9-8</a:t>
+              <a:t>14-9-9</a:t>
             </a:fld>
             <a:endParaRPr lang="zh-CN" altLang="en-US">
               <a:solidFill>
@@ -6672,7 +6672,7 @@
                 <a:ea typeface="宋体"/>
               </a:rPr>
               <a:pPr/>
-              <a:t>14-9-8</a:t>
+              <a:t>14-9-9</a:t>
             </a:fld>
             <a:endParaRPr lang="zh-CN" altLang="en-US">
               <a:solidFill>
@@ -6894,7 +6894,7 @@
                 <a:ea typeface="宋体"/>
               </a:rPr>
               <a:pPr/>
-              <a:t>14-9-8</a:t>
+              <a:t>14-9-9</a:t>
             </a:fld>
             <a:endParaRPr lang="zh-CN" altLang="en-US">
               <a:solidFill>
@@ -7178,7 +7178,7 @@
                 <a:ea typeface="宋体"/>
               </a:rPr>
               <a:pPr/>
-              <a:t>14-9-8</a:t>
+              <a:t>14-9-9</a:t>
             </a:fld>
             <a:endParaRPr lang="zh-CN" altLang="en-US">
               <a:solidFill>
@@ -7390,7 +7390,7 @@
                 <a:ea typeface="宋体"/>
               </a:rPr>
               <a:pPr/>
-              <a:t>14-9-8</a:t>
+              <a:t>14-9-9</a:t>
             </a:fld>
             <a:endParaRPr lang="zh-CN" altLang="en-US">
               <a:solidFill>
@@ -7678,7 +7678,7 @@
                 <a:ea typeface="宋体"/>
               </a:rPr>
               <a:pPr/>
-              <a:t>14-9-8</a:t>
+              <a:t>14-9-9</a:t>
             </a:fld>
             <a:endParaRPr lang="zh-CN" altLang="en-US">
               <a:solidFill>
@@ -8008,7 +8008,7 @@
                 <a:ea typeface="宋体"/>
               </a:rPr>
               <a:pPr/>
-              <a:t>14-9-8</a:t>
+              <a:t>14-9-9</a:t>
             </a:fld>
             <a:endParaRPr lang="zh-CN" altLang="en-US">
               <a:solidFill>
@@ -8472,7 +8472,7 @@
                 <a:ea typeface="宋体"/>
               </a:rPr>
               <a:pPr/>
-              <a:t>14-9-8</a:t>
+              <a:t>14-9-9</a:t>
             </a:fld>
             <a:endParaRPr lang="zh-CN" altLang="en-US">
               <a:solidFill>
@@ -8632,7 +8632,7 @@
                 <a:ea typeface="宋体"/>
               </a:rPr>
               <a:pPr/>
-              <a:t>14-9-8</a:t>
+              <a:t>14-9-9</a:t>
             </a:fld>
             <a:endParaRPr lang="zh-CN" altLang="en-US">
               <a:solidFill>
@@ -8953,7 +8953,7 @@
           <a:p>
             <a:fld id="{530820CF-B880-4189-942D-D702A7CBA730}" type="datetimeFigureOut">
               <a:rPr lang="zh-CN" altLang="en-US" smtClean="0"/>
-              <a:t>14-9-8</a:t>
+              <a:t>14-9-9</a:t>
             </a:fld>
             <a:endParaRPr lang="zh-CN" altLang="en-US"/>
           </a:p>
@@ -9052,7 +9052,7 @@
                 <a:ea typeface="宋体"/>
               </a:rPr>
               <a:pPr/>
-              <a:t>14-9-8</a:t>
+              <a:t>14-9-9</a:t>
             </a:fld>
             <a:endParaRPr lang="zh-CN" altLang="en-US">
               <a:solidFill>
@@ -9371,7 +9371,7 @@
                 <a:ea typeface="宋体"/>
               </a:rPr>
               <a:pPr/>
-              <a:t>14-9-8</a:t>
+              <a:t>14-9-9</a:t>
             </a:fld>
             <a:endParaRPr lang="zh-CN" altLang="en-US">
               <a:solidFill>
@@ -9666,7 +9666,7 @@
                 <a:ea typeface="宋体"/>
               </a:rPr>
               <a:pPr/>
-              <a:t>14-9-8</a:t>
+              <a:t>14-9-9</a:t>
             </a:fld>
             <a:endParaRPr lang="zh-CN" altLang="en-US">
               <a:solidFill>
@@ -9878,7 +9878,7 @@
                 <a:ea typeface="宋体"/>
               </a:rPr>
               <a:pPr/>
-              <a:t>14-9-8</a:t>
+              <a:t>14-9-9</a:t>
             </a:fld>
             <a:endParaRPr lang="zh-CN" altLang="en-US">
               <a:solidFill>
@@ -10100,7 +10100,7 @@
                 <a:ea typeface="宋体"/>
               </a:rPr>
               <a:pPr/>
-              <a:t>14-9-8</a:t>
+              <a:t>14-9-9</a:t>
             </a:fld>
             <a:endParaRPr lang="zh-CN" altLang="en-US">
               <a:solidFill>
@@ -10384,7 +10384,7 @@
                 <a:ea typeface="宋体"/>
               </a:rPr>
               <a:pPr/>
-              <a:t>14-9-8</a:t>
+              <a:t>14-9-9</a:t>
             </a:fld>
             <a:endParaRPr lang="zh-CN" altLang="en-US">
               <a:solidFill>
@@ -10596,7 +10596,7 @@
                 <a:ea typeface="宋体"/>
               </a:rPr>
               <a:pPr/>
-              <a:t>14-9-8</a:t>
+              <a:t>14-9-9</a:t>
             </a:fld>
             <a:endParaRPr lang="zh-CN" altLang="en-US">
               <a:solidFill>
@@ -10884,7 +10884,7 @@
                 <a:ea typeface="宋体"/>
               </a:rPr>
               <a:pPr/>
-              <a:t>14-9-8</a:t>
+              <a:t>14-9-9</a:t>
             </a:fld>
             <a:endParaRPr lang="zh-CN" altLang="en-US">
               <a:solidFill>
@@ -11214,7 +11214,7 @@
                 <a:ea typeface="宋体"/>
               </a:rPr>
               <a:pPr/>
-              <a:t>14-9-8</a:t>
+              <a:t>14-9-9</a:t>
             </a:fld>
             <a:endParaRPr lang="zh-CN" altLang="en-US">
               <a:solidFill>
@@ -11678,7 +11678,7 @@
                 <a:ea typeface="宋体"/>
               </a:rPr>
               <a:pPr/>
-              <a:t>14-9-8</a:t>
+              <a:t>14-9-9</a:t>
             </a:fld>
             <a:endParaRPr lang="zh-CN" altLang="en-US">
               <a:solidFill>
@@ -12133,7 +12133,7 @@
           <a:p>
             <a:fld id="{530820CF-B880-4189-942D-D702A7CBA730}" type="datetimeFigureOut">
               <a:rPr lang="zh-CN" altLang="en-US" smtClean="0"/>
-              <a:t>14-9-8</a:t>
+              <a:t>14-9-9</a:t>
             </a:fld>
             <a:endParaRPr lang="zh-CN" altLang="en-US"/>
           </a:p>
@@ -12255,7 +12255,7 @@
                 <a:ea typeface="宋体"/>
               </a:rPr>
               <a:pPr/>
-              <a:t>14-9-8</a:t>
+              <a:t>14-9-9</a:t>
             </a:fld>
             <a:endParaRPr lang="zh-CN" altLang="en-US">
               <a:solidFill>
@@ -12392,7 +12392,7 @@
                 <a:ea typeface="宋体"/>
               </a:rPr>
               <a:pPr/>
-              <a:t>14-9-8</a:t>
+              <a:t>14-9-9</a:t>
             </a:fld>
             <a:endParaRPr lang="zh-CN" altLang="en-US">
               <a:solidFill>
@@ -12711,7 +12711,7 @@
                 <a:ea typeface="宋体"/>
               </a:rPr>
               <a:pPr/>
-              <a:t>14-9-8</a:t>
+              <a:t>14-9-9</a:t>
             </a:fld>
             <a:endParaRPr lang="zh-CN" altLang="en-US">
               <a:solidFill>
@@ -13006,7 +13006,7 @@
                 <a:ea typeface="宋体"/>
               </a:rPr>
               <a:pPr/>
-              <a:t>14-9-8</a:t>
+              <a:t>14-9-9</a:t>
             </a:fld>
             <a:endParaRPr lang="zh-CN" altLang="en-US">
               <a:solidFill>
@@ -13218,7 +13218,7 @@
                 <a:ea typeface="宋体"/>
               </a:rPr>
               <a:pPr/>
-              <a:t>14-9-8</a:t>
+              <a:t>14-9-9</a:t>
             </a:fld>
             <a:endParaRPr lang="zh-CN" altLang="en-US">
               <a:solidFill>
@@ -13440,7 +13440,7 @@
                 <a:ea typeface="宋体"/>
               </a:rPr>
               <a:pPr/>
-              <a:t>14-9-8</a:t>
+              <a:t>14-9-9</a:t>
             </a:fld>
             <a:endParaRPr lang="zh-CN" altLang="en-US">
               <a:solidFill>
@@ -13724,7 +13724,7 @@
                 <a:ea typeface="宋体"/>
               </a:rPr>
               <a:pPr/>
-              <a:t>14-9-8</a:t>
+              <a:t>14-9-9</a:t>
             </a:fld>
             <a:endParaRPr lang="zh-CN" altLang="en-US">
               <a:solidFill>
@@ -13936,7 +13936,7 @@
                 <a:ea typeface="宋体"/>
               </a:rPr>
               <a:pPr/>
-              <a:t>14-9-8</a:t>
+              <a:t>14-9-9</a:t>
             </a:fld>
             <a:endParaRPr lang="zh-CN" altLang="en-US">
               <a:solidFill>
@@ -14224,7 +14224,7 @@
                 <a:ea typeface="宋体"/>
               </a:rPr>
               <a:pPr/>
-              <a:t>14-9-8</a:t>
+              <a:t>14-9-9</a:t>
             </a:fld>
             <a:endParaRPr lang="zh-CN" altLang="en-US">
               <a:solidFill>
@@ -14554,7 +14554,7 @@
                 <a:ea typeface="宋体"/>
               </a:rPr>
               <a:pPr/>
-              <a:t>14-9-8</a:t>
+              <a:t>14-9-9</a:t>
             </a:fld>
             <a:endParaRPr lang="zh-CN" altLang="en-US">
               <a:solidFill>
@@ -14705,7 +14705,7 @@
           <a:p>
             <a:fld id="{530820CF-B880-4189-942D-D702A7CBA730}" type="datetimeFigureOut">
               <a:rPr lang="zh-CN" altLang="en-US" smtClean="0"/>
-              <a:t>14-9-8</a:t>
+              <a:t>14-9-9</a:t>
             </a:fld>
             <a:endParaRPr lang="zh-CN" altLang="en-US"/>
           </a:p>
@@ -15131,7 +15131,7 @@
                 <a:ea typeface="宋体"/>
               </a:rPr>
               <a:pPr/>
-              <a:t>14-9-8</a:t>
+              <a:t>14-9-9</a:t>
             </a:fld>
             <a:endParaRPr lang="zh-CN" altLang="en-US">
               <a:solidFill>
@@ -15291,7 +15291,7 @@
                 <a:ea typeface="宋体"/>
               </a:rPr>
               <a:pPr/>
-              <a:t>14-9-8</a:t>
+              <a:t>14-9-9</a:t>
             </a:fld>
             <a:endParaRPr lang="zh-CN" altLang="en-US">
               <a:solidFill>
@@ -15428,7 +15428,7 @@
                 <a:ea typeface="宋体"/>
               </a:rPr>
               <a:pPr/>
-              <a:t>14-9-8</a:t>
+              <a:t>14-9-9</a:t>
             </a:fld>
             <a:endParaRPr lang="zh-CN" altLang="en-US">
               <a:solidFill>
@@ -15747,7 +15747,7 @@
                 <a:ea typeface="宋体"/>
               </a:rPr>
               <a:pPr/>
-              <a:t>14-9-8</a:t>
+              <a:t>14-9-9</a:t>
             </a:fld>
             <a:endParaRPr lang="zh-CN" altLang="en-US">
               <a:solidFill>
@@ -16042,7 +16042,7 @@
                 <a:ea typeface="宋体"/>
               </a:rPr>
               <a:pPr/>
-              <a:t>14-9-8</a:t>
+              <a:t>14-9-9</a:t>
             </a:fld>
             <a:endParaRPr lang="zh-CN" altLang="en-US">
               <a:solidFill>
@@ -16254,7 +16254,7 @@
                 <a:ea typeface="宋体"/>
               </a:rPr>
               <a:pPr/>
-              <a:t>14-9-8</a:t>
+              <a:t>14-9-9</a:t>
             </a:fld>
             <a:endParaRPr lang="zh-CN" altLang="en-US">
               <a:solidFill>
@@ -16476,7 +16476,7 @@
                 <a:ea typeface="宋体"/>
               </a:rPr>
               <a:pPr/>
-              <a:t>14-9-8</a:t>
+              <a:t>14-9-9</a:t>
             </a:fld>
             <a:endParaRPr lang="zh-CN" altLang="en-US">
               <a:solidFill>
@@ -16760,7 +16760,7 @@
                 <a:ea typeface="宋体"/>
               </a:rPr>
               <a:pPr/>
-              <a:t>14-9-8</a:t>
+              <a:t>14-9-9</a:t>
             </a:fld>
             <a:endParaRPr lang="zh-CN" altLang="en-US">
               <a:solidFill>
@@ -16972,7 +16972,7 @@
                 <a:ea typeface="宋体"/>
               </a:rPr>
               <a:pPr/>
-              <a:t>14-9-8</a:t>
+              <a:t>14-9-9</a:t>
             </a:fld>
             <a:endParaRPr lang="zh-CN" altLang="en-US">
               <a:solidFill>
@@ -17260,7 +17260,7 @@
                 <a:ea typeface="宋体"/>
               </a:rPr>
               <a:pPr/>
-              <a:t>14-9-8</a:t>
+              <a:t>14-9-9</a:t>
             </a:fld>
             <a:endParaRPr lang="zh-CN" altLang="en-US">
               <a:solidFill>
@@ -17388,7 +17388,7 @@
           <a:p>
             <a:fld id="{530820CF-B880-4189-942D-D702A7CBA730}" type="datetimeFigureOut">
               <a:rPr lang="zh-CN" altLang="en-US" smtClean="0"/>
-              <a:t>14-9-8</a:t>
+              <a:t>14-9-9</a:t>
             </a:fld>
             <a:endParaRPr lang="zh-CN" altLang="en-US"/>
           </a:p>
@@ -17680,7 +17680,7 @@
                 <a:ea typeface="宋体"/>
               </a:rPr>
               <a:pPr/>
-              <a:t>14-9-8</a:t>
+              <a:t>14-9-9</a:t>
             </a:fld>
             <a:endParaRPr lang="zh-CN" altLang="en-US">
               <a:solidFill>
@@ -18144,7 +18144,7 @@
                 <a:ea typeface="宋体"/>
               </a:rPr>
               <a:pPr/>
-              <a:t>14-9-8</a:t>
+              <a:t>14-9-9</a:t>
             </a:fld>
             <a:endParaRPr lang="zh-CN" altLang="en-US">
               <a:solidFill>
@@ -18304,7 +18304,7 @@
                 <a:ea typeface="宋体"/>
               </a:rPr>
               <a:pPr/>
-              <a:t>14-9-8</a:t>
+              <a:t>14-9-9</a:t>
             </a:fld>
             <a:endParaRPr lang="zh-CN" altLang="en-US">
               <a:solidFill>
@@ -18441,7 +18441,7 @@
                 <a:ea typeface="宋体"/>
               </a:rPr>
               <a:pPr/>
-              <a:t>14-9-8</a:t>
+              <a:t>14-9-9</a:t>
             </a:fld>
             <a:endParaRPr lang="zh-CN" altLang="en-US">
               <a:solidFill>
@@ -18760,7 +18760,7 @@
                 <a:ea typeface="宋体"/>
               </a:rPr>
               <a:pPr/>
-              <a:t>14-9-8</a:t>
+              <a:t>14-9-9</a:t>
             </a:fld>
             <a:endParaRPr lang="zh-CN" altLang="en-US">
               <a:solidFill>
@@ -19055,7 +19055,7 @@
                 <a:ea typeface="宋体"/>
               </a:rPr>
               <a:pPr/>
-              <a:t>14-9-8</a:t>
+              <a:t>14-9-9</a:t>
             </a:fld>
             <a:endParaRPr lang="zh-CN" altLang="en-US">
               <a:solidFill>
@@ -19267,7 +19267,7 @@
                 <a:ea typeface="宋体"/>
               </a:rPr>
               <a:pPr/>
-              <a:t>14-9-8</a:t>
+              <a:t>14-9-9</a:t>
             </a:fld>
             <a:endParaRPr lang="zh-CN" altLang="en-US">
               <a:solidFill>
@@ -19489,7 +19489,7 @@
                 <a:ea typeface="宋体"/>
               </a:rPr>
               <a:pPr/>
-              <a:t>14-9-8</a:t>
+              <a:t>14-9-9</a:t>
             </a:fld>
             <a:endParaRPr lang="zh-CN" altLang="en-US">
               <a:solidFill>
@@ -19773,7 +19773,7 @@
                 <a:ea typeface="宋体"/>
               </a:rPr>
               <a:pPr/>
-              <a:t>14-9-8</a:t>
+              <a:t>14-9-9</a:t>
             </a:fld>
             <a:endParaRPr lang="zh-CN" altLang="en-US">
               <a:solidFill>
@@ -19985,7 +19985,7 @@
                 <a:ea typeface="宋体"/>
               </a:rPr>
               <a:pPr/>
-              <a:t>14-9-8</a:t>
+              <a:t>14-9-9</a:t>
             </a:fld>
             <a:endParaRPr lang="zh-CN" altLang="en-US">
               <a:solidFill>
@@ -20295,7 +20295,7 @@
           <a:p>
             <a:fld id="{530820CF-B880-4189-942D-D702A7CBA730}" type="datetimeFigureOut">
               <a:rPr lang="zh-CN" altLang="en-US" smtClean="0"/>
-              <a:t>14-9-8</a:t>
+              <a:t>14-9-9</a:t>
             </a:fld>
             <a:endParaRPr lang="zh-CN" altLang="en-US"/>
           </a:p>
@@ -20545,7 +20545,7 @@
                 <a:ea typeface="宋体"/>
               </a:rPr>
               <a:pPr/>
-              <a:t>14-9-8</a:t>
+              <a:t>14-9-9</a:t>
             </a:fld>
             <a:endParaRPr lang="zh-CN" altLang="en-US">
               <a:solidFill>
@@ -20875,7 +20875,7 @@
                 <a:ea typeface="宋体"/>
               </a:rPr>
               <a:pPr/>
-              <a:t>14-9-8</a:t>
+              <a:t>14-9-9</a:t>
             </a:fld>
             <a:endParaRPr lang="zh-CN" altLang="en-US">
               <a:solidFill>
@@ -21339,7 +21339,7 @@
                 <a:ea typeface="宋体"/>
               </a:rPr>
               <a:pPr/>
-              <a:t>14-9-8</a:t>
+              <a:t>14-9-9</a:t>
             </a:fld>
             <a:endParaRPr lang="zh-CN" altLang="en-US">
               <a:solidFill>
@@ -21499,7 +21499,7 @@
                 <a:ea typeface="宋体"/>
               </a:rPr>
               <a:pPr/>
-              <a:t>14-9-8</a:t>
+              <a:t>14-9-9</a:t>
             </a:fld>
             <a:endParaRPr lang="zh-CN" altLang="en-US">
               <a:solidFill>
@@ -21636,7 +21636,7 @@
                 <a:ea typeface="宋体"/>
               </a:rPr>
               <a:pPr/>
-              <a:t>14-9-8</a:t>
+              <a:t>14-9-9</a:t>
             </a:fld>
             <a:endParaRPr lang="zh-CN" altLang="en-US">
               <a:solidFill>
@@ -21955,7 +21955,7 @@
                 <a:ea typeface="宋体"/>
               </a:rPr>
               <a:pPr/>
-              <a:t>14-9-8</a:t>
+              <a:t>14-9-9</a:t>
             </a:fld>
             <a:endParaRPr lang="zh-CN" altLang="en-US">
               <a:solidFill>
@@ -22250,7 +22250,7 @@
                 <a:ea typeface="宋体"/>
               </a:rPr>
               <a:pPr/>
-              <a:t>14-9-8</a:t>
+              <a:t>14-9-9</a:t>
             </a:fld>
             <a:endParaRPr lang="zh-CN" altLang="en-US">
               <a:solidFill>
@@ -22462,7 +22462,7 @@
                 <a:ea typeface="宋体"/>
               </a:rPr>
               <a:pPr/>
-              <a:t>14-9-8</a:t>
+              <a:t>14-9-9</a:t>
             </a:fld>
             <a:endParaRPr lang="zh-CN" altLang="en-US">
               <a:solidFill>
@@ -22684,7 +22684,7 @@
                 <a:ea typeface="宋体"/>
               </a:rPr>
               <a:pPr/>
-              <a:t>14-9-8</a:t>
+              <a:t>14-9-9</a:t>
             </a:fld>
             <a:endParaRPr lang="zh-CN" altLang="en-US">
               <a:solidFill>
@@ -22968,7 +22968,7 @@
                 <a:ea typeface="宋体"/>
               </a:rPr>
               <a:pPr/>
-              <a:t>14-9-8</a:t>
+              <a:t>14-9-9</a:t>
             </a:fld>
             <a:endParaRPr lang="zh-CN" altLang="en-US">
               <a:solidFill>
@@ -23254,7 +23254,7 @@
           <a:p>
             <a:fld id="{530820CF-B880-4189-942D-D702A7CBA730}" type="datetimeFigureOut">
               <a:rPr lang="zh-CN" altLang="en-US" smtClean="0"/>
-              <a:t>14-9-8</a:t>
+              <a:t>14-9-9</a:t>
             </a:fld>
             <a:endParaRPr lang="zh-CN" altLang="en-US"/>
           </a:p>
@@ -23428,7 +23428,7 @@
                 <a:ea typeface="宋体"/>
               </a:rPr>
               <a:pPr/>
-              <a:t>14-9-8</a:t>
+              <a:t>14-9-9</a:t>
             </a:fld>
             <a:endParaRPr lang="zh-CN" altLang="en-US">
               <a:solidFill>
@@ -23716,7 +23716,7 @@
                 <a:ea typeface="宋体"/>
               </a:rPr>
               <a:pPr/>
-              <a:t>14-9-8</a:t>
+              <a:t>14-9-9</a:t>
             </a:fld>
             <a:endParaRPr lang="zh-CN" altLang="en-US">
               <a:solidFill>
@@ -24046,7 +24046,7 @@
                 <a:ea typeface="宋体"/>
               </a:rPr>
               <a:pPr/>
-              <a:t>14-9-8</a:t>
+              <a:t>14-9-9</a:t>
             </a:fld>
             <a:endParaRPr lang="zh-CN" altLang="en-US">
               <a:solidFill>
@@ -24510,7 +24510,7 @@
                 <a:ea typeface="宋体"/>
               </a:rPr>
               <a:pPr/>
-              <a:t>14-9-8</a:t>
+              <a:t>14-9-9</a:t>
             </a:fld>
             <a:endParaRPr lang="zh-CN" altLang="en-US">
               <a:solidFill>
@@ -24670,7 +24670,7 @@
                 <a:ea typeface="宋体"/>
               </a:rPr>
               <a:pPr/>
-              <a:t>14-9-8</a:t>
+              <a:t>14-9-9</a:t>
             </a:fld>
             <a:endParaRPr lang="zh-CN" altLang="en-US">
               <a:solidFill>
@@ -24807,7 +24807,7 @@
                 <a:ea typeface="宋体"/>
               </a:rPr>
               <a:pPr/>
-              <a:t>14-9-8</a:t>
+              <a:t>14-9-9</a:t>
             </a:fld>
             <a:endParaRPr lang="zh-CN" altLang="en-US">
               <a:solidFill>
@@ -25126,7 +25126,7 @@
                 <a:ea typeface="宋体"/>
               </a:rPr>
               <a:pPr/>
-              <a:t>14-9-8</a:t>
+              <a:t>14-9-9</a:t>
             </a:fld>
             <a:endParaRPr lang="zh-CN" altLang="en-US">
               <a:solidFill>
@@ -25421,7 +25421,7 @@
                 <a:ea typeface="宋体"/>
               </a:rPr>
               <a:pPr/>
-              <a:t>14-9-8</a:t>
+              <a:t>14-9-9</a:t>
             </a:fld>
             <a:endParaRPr lang="zh-CN" altLang="en-US">
               <a:solidFill>
@@ -25633,7 +25633,7 @@
                 <a:ea typeface="宋体"/>
               </a:rPr>
               <a:pPr/>
-              <a:t>14-9-8</a:t>
+              <a:t>14-9-9</a:t>
             </a:fld>
             <a:endParaRPr lang="zh-CN" altLang="en-US">
               <a:solidFill>
@@ -25855,7 +25855,7 @@
                 <a:ea typeface="宋体"/>
               </a:rPr>
               <a:pPr/>
-              <a:t>14-9-8</a:t>
+              <a:t>14-9-9</a:t>
             </a:fld>
             <a:endParaRPr lang="zh-CN" altLang="en-US">
               <a:solidFill>
@@ -26101,7 +26101,7 @@
           <a:p>
             <a:fld id="{530820CF-B880-4189-942D-D702A7CBA730}" type="datetimeFigureOut">
               <a:rPr lang="zh-CN" altLang="en-US" smtClean="0"/>
-              <a:t>14-9-8</a:t>
+              <a:t>14-9-9</a:t>
             </a:fld>
             <a:endParaRPr lang="zh-CN" altLang="en-US"/>
           </a:p>
@@ -26615,7 +26615,7 @@
                 <a:ea typeface="宋体"/>
               </a:rPr>
               <a:pPr/>
-              <a:t>14-9-8</a:t>
+              <a:t>14-9-9</a:t>
             </a:fld>
             <a:endParaRPr lang="zh-CN" altLang="en-US">
               <a:solidFill>
@@ -27167,7 +27167,7 @@
                 <a:ea typeface="宋体"/>
               </a:rPr>
               <a:pPr/>
-              <a:t>14-9-8</a:t>
+              <a:t>14-9-9</a:t>
             </a:fld>
             <a:endParaRPr lang="zh-CN" altLang="en-US">
               <a:solidFill>
@@ -27719,7 +27719,7 @@
                 <a:ea typeface="宋体"/>
               </a:rPr>
               <a:pPr/>
-              <a:t>14-9-8</a:t>
+              <a:t>14-9-9</a:t>
             </a:fld>
             <a:endParaRPr lang="zh-CN" altLang="en-US">
               <a:solidFill>
@@ -28271,7 +28271,7 @@
                 <a:ea typeface="宋体"/>
               </a:rPr>
               <a:pPr/>
-              <a:t>14-9-8</a:t>
+              <a:t>14-9-9</a:t>
             </a:fld>
             <a:endParaRPr lang="zh-CN" altLang="en-US">
               <a:solidFill>
@@ -28823,7 +28823,7 @@
                 <a:ea typeface="宋体"/>
               </a:rPr>
               <a:pPr/>
-              <a:t>14-9-8</a:t>
+              <a:t>14-9-9</a:t>
             </a:fld>
             <a:endParaRPr lang="zh-CN" altLang="en-US">
               <a:solidFill>
@@ -29375,7 +29375,7 @@
                 <a:ea typeface="宋体"/>
               </a:rPr>
               <a:pPr/>
-              <a:t>14-9-8</a:t>
+              <a:t>14-9-9</a:t>
             </a:fld>
             <a:endParaRPr lang="zh-CN" altLang="en-US">
               <a:solidFill>
@@ -29927,7 +29927,7 @@
                 <a:ea typeface="宋体"/>
               </a:rPr>
               <a:pPr/>
-              <a:t>14-9-8</a:t>
+              <a:t>14-9-9</a:t>
             </a:fld>
             <a:endParaRPr lang="zh-CN" altLang="en-US">
               <a:solidFill>
@@ -30479,7 +30479,7 @@
                 <a:ea typeface="宋体"/>
               </a:rPr>
               <a:pPr/>
-              <a:t>14-9-8</a:t>
+              <a:t>14-9-9</a:t>
             </a:fld>
             <a:endParaRPr lang="zh-CN" altLang="en-US">
               <a:solidFill>
@@ -36740,7 +36740,15 @@
           <a:p>
             <a:r>
               <a:rPr lang="en-US" altLang="zh-CN" dirty="0" smtClean="0"/>
-              <a:t>Major Release</a:t>
+              <a:t>Current </a:t>
+            </a:r>
+            <a:r>
+              <a:rPr lang="en-US" altLang="zh-CN" dirty="0" smtClean="0"/>
+              <a:t>Major </a:t>
+            </a:r>
+            <a:r>
+              <a:rPr lang="en-US" altLang="zh-CN" dirty="0" smtClean="0"/>
+              <a:t>Release</a:t>
             </a:r>
             <a:endParaRPr lang="zh-CN" altLang="en-US" dirty="0"/>
           </a:p>

</xml_diff>

<commit_message>
add sort based shuffle
</commit_message>
<xml_diff>
--- a/SACC2014/SACC2014.pptx
+++ b/SACC2014/SACC2014.pptx
@@ -15,7 +15,7 @@
   <p:sldIdLst>
     <p:sldId id="256" r:id="rId10"/>
     <p:sldId id="284" r:id="rId11"/>
-    <p:sldId id="286" r:id="rId12"/>
+    <p:sldId id="287" r:id="rId12"/>
     <p:sldId id="257" r:id="rId13"/>
     <p:sldId id="259" r:id="rId14"/>
     <p:sldId id="260" r:id="rId15"/>
@@ -142,7 +142,7 @@
   </p:defaultTextStyle>
   <p:extLst>
     <p:ext uri="{EFAFB233-063F-42B5-8137-9DF3F51BA10A}">
-      <p15:sldGuideLst xmlns="" xmlns:p15="http://schemas.microsoft.com/office/powerpoint/2012/main">
+      <p15:sldGuideLst xmlns:p15="http://schemas.microsoft.com/office/powerpoint/2012/main" xmlns="">
         <p15:guide id="1" orient="horz" pos="2160">
           <p15:clr>
             <a:srgbClr val="A4A3A4"/>
@@ -340,7 +340,7 @@
           <a:p>
             <a:fld id="{530820CF-B880-4189-942D-D702A7CBA730}" type="datetimeFigureOut">
               <a:rPr lang="zh-CN" altLang="en-US" smtClean="0"/>
-              <a:t>14-9-9</a:t>
+              <a:t>14-9-11</a:t>
             </a:fld>
             <a:endParaRPr lang="zh-CN" altLang="en-US"/>
           </a:p>
@@ -505,7 +505,7 @@
           <a:p>
             <a:fld id="{530820CF-B880-4189-942D-D702A7CBA730}" type="datetimeFigureOut">
               <a:rPr lang="zh-CN" altLang="en-US" smtClean="0"/>
-              <a:t>14-9-9</a:t>
+              <a:t>14-9-11</a:t>
             </a:fld>
             <a:endParaRPr lang="zh-CN" altLang="en-US"/>
           </a:p>
@@ -680,7 +680,7 @@
           <a:p>
             <a:fld id="{530820CF-B880-4189-942D-D702A7CBA730}" type="datetimeFigureOut">
               <a:rPr lang="zh-CN" altLang="en-US" smtClean="0"/>
-              <a:t>14-9-9</a:t>
+              <a:t>14-9-11</a:t>
             </a:fld>
             <a:endParaRPr lang="zh-CN" altLang="en-US"/>
           </a:p>
@@ -926,7 +926,7 @@
                 <a:ea typeface="宋体"/>
               </a:rPr>
               <a:pPr/>
-              <a:t>14-9-9</a:t>
+              <a:t>14-9-11</a:t>
             </a:fld>
             <a:endParaRPr lang="zh-CN" altLang="en-US">
               <a:solidFill>
@@ -1138,7 +1138,7 @@
                 <a:ea typeface="宋体"/>
               </a:rPr>
               <a:pPr/>
-              <a:t>14-9-9</a:t>
+              <a:t>14-9-11</a:t>
             </a:fld>
             <a:endParaRPr lang="zh-CN" altLang="en-US">
               <a:solidFill>
@@ -1426,7 +1426,7 @@
                 <a:ea typeface="宋体"/>
               </a:rPr>
               <a:pPr/>
-              <a:t>14-9-9</a:t>
+              <a:t>14-9-11</a:t>
             </a:fld>
             <a:endParaRPr lang="zh-CN" altLang="en-US">
               <a:solidFill>
@@ -1756,7 +1756,7 @@
                 <a:ea typeface="宋体"/>
               </a:rPr>
               <a:pPr/>
-              <a:t>14-9-9</a:t>
+              <a:t>14-9-11</a:t>
             </a:fld>
             <a:endParaRPr lang="zh-CN" altLang="en-US">
               <a:solidFill>
@@ -2220,7 +2220,7 @@
                 <a:ea typeface="宋体"/>
               </a:rPr>
               <a:pPr/>
-              <a:t>14-9-9</a:t>
+              <a:t>14-9-11</a:t>
             </a:fld>
             <a:endParaRPr lang="zh-CN" altLang="en-US">
               <a:solidFill>
@@ -2380,7 +2380,7 @@
                 <a:ea typeface="宋体"/>
               </a:rPr>
               <a:pPr/>
-              <a:t>14-9-9</a:t>
+              <a:t>14-9-11</a:t>
             </a:fld>
             <a:endParaRPr lang="zh-CN" altLang="en-US">
               <a:solidFill>
@@ -2517,7 +2517,7 @@
                 <a:ea typeface="宋体"/>
               </a:rPr>
               <a:pPr/>
-              <a:t>14-9-9</a:t>
+              <a:t>14-9-11</a:t>
             </a:fld>
             <a:endParaRPr lang="zh-CN" altLang="en-US">
               <a:solidFill>
@@ -2836,7 +2836,7 @@
                 <a:ea typeface="宋体"/>
               </a:rPr>
               <a:pPr/>
-              <a:t>14-9-9</a:t>
+              <a:t>14-9-11</a:t>
             </a:fld>
             <a:endParaRPr lang="zh-CN" altLang="en-US">
               <a:solidFill>
@@ -3039,7 +3039,7 @@
           <a:p>
             <a:fld id="{530820CF-B880-4189-942D-D702A7CBA730}" type="datetimeFigureOut">
               <a:rPr lang="zh-CN" altLang="en-US" smtClean="0"/>
-              <a:t>14-9-9</a:t>
+              <a:t>14-9-11</a:t>
             </a:fld>
             <a:endParaRPr lang="zh-CN" altLang="en-US"/>
           </a:p>
@@ -3296,7 +3296,7 @@
                 <a:ea typeface="宋体"/>
               </a:rPr>
               <a:pPr/>
-              <a:t>14-9-9</a:t>
+              <a:t>14-9-11</a:t>
             </a:fld>
             <a:endParaRPr lang="zh-CN" altLang="en-US">
               <a:solidFill>
@@ -3508,7 +3508,7 @@
                 <a:ea typeface="宋体"/>
               </a:rPr>
               <a:pPr/>
-              <a:t>14-9-9</a:t>
+              <a:t>14-9-11</a:t>
             </a:fld>
             <a:endParaRPr lang="zh-CN" altLang="en-US">
               <a:solidFill>
@@ -3730,7 +3730,7 @@
                 <a:ea typeface="宋体"/>
               </a:rPr>
               <a:pPr/>
-              <a:t>14-9-9</a:t>
+              <a:t>14-9-11</a:t>
             </a:fld>
             <a:endParaRPr lang="zh-CN" altLang="en-US">
               <a:solidFill>
@@ -4014,7 +4014,7 @@
                 <a:ea typeface="宋体"/>
               </a:rPr>
               <a:pPr/>
-              <a:t>14-9-9</a:t>
+              <a:t>14-9-11</a:t>
             </a:fld>
             <a:endParaRPr lang="zh-CN" altLang="en-US">
               <a:solidFill>
@@ -4226,7 +4226,7 @@
                 <a:ea typeface="宋体"/>
               </a:rPr>
               <a:pPr/>
-              <a:t>14-9-9</a:t>
+              <a:t>14-9-11</a:t>
             </a:fld>
             <a:endParaRPr lang="zh-CN" altLang="en-US">
               <a:solidFill>
@@ -4514,7 +4514,7 @@
                 <a:ea typeface="宋体"/>
               </a:rPr>
               <a:pPr/>
-              <a:t>14-9-9</a:t>
+              <a:t>14-9-11</a:t>
             </a:fld>
             <a:endParaRPr lang="zh-CN" altLang="en-US">
               <a:solidFill>
@@ -4844,7 +4844,7 @@
                 <a:ea typeface="宋体"/>
               </a:rPr>
               <a:pPr/>
-              <a:t>14-9-9</a:t>
+              <a:t>14-9-11</a:t>
             </a:fld>
             <a:endParaRPr lang="zh-CN" altLang="en-US">
               <a:solidFill>
@@ -5308,7 +5308,7 @@
                 <a:ea typeface="宋体"/>
               </a:rPr>
               <a:pPr/>
-              <a:t>14-9-9</a:t>
+              <a:t>14-9-11</a:t>
             </a:fld>
             <a:endParaRPr lang="zh-CN" altLang="en-US">
               <a:solidFill>
@@ -5468,7 +5468,7 @@
                 <a:ea typeface="宋体"/>
               </a:rPr>
               <a:pPr/>
-              <a:t>14-9-9</a:t>
+              <a:t>14-9-11</a:t>
             </a:fld>
             <a:endParaRPr lang="zh-CN" altLang="en-US">
               <a:solidFill>
@@ -5605,7 +5605,7 @@
                 <a:ea typeface="宋体"/>
               </a:rPr>
               <a:pPr/>
-              <a:t>14-9-9</a:t>
+              <a:t>14-9-11</a:t>
             </a:fld>
             <a:endParaRPr lang="zh-CN" altLang="en-US">
               <a:solidFill>
@@ -5884,7 +5884,7 @@
           <a:p>
             <a:fld id="{530820CF-B880-4189-942D-D702A7CBA730}" type="datetimeFigureOut">
               <a:rPr lang="zh-CN" altLang="en-US" smtClean="0"/>
-              <a:t>14-9-9</a:t>
+              <a:t>14-9-11</a:t>
             </a:fld>
             <a:endParaRPr lang="zh-CN" altLang="en-US"/>
           </a:p>
@@ -6165,7 +6165,7 @@
                 <a:ea typeface="宋体"/>
               </a:rPr>
               <a:pPr/>
-              <a:t>14-9-9</a:t>
+              <a:t>14-9-11</a:t>
             </a:fld>
             <a:endParaRPr lang="zh-CN" altLang="en-US">
               <a:solidFill>
@@ -6460,7 +6460,7 @@
                 <a:ea typeface="宋体"/>
               </a:rPr>
               <a:pPr/>
-              <a:t>14-9-9</a:t>
+              <a:t>14-9-11</a:t>
             </a:fld>
             <a:endParaRPr lang="zh-CN" altLang="en-US">
               <a:solidFill>
@@ -6672,7 +6672,7 @@
                 <a:ea typeface="宋体"/>
               </a:rPr>
               <a:pPr/>
-              <a:t>14-9-9</a:t>
+              <a:t>14-9-11</a:t>
             </a:fld>
             <a:endParaRPr lang="zh-CN" altLang="en-US">
               <a:solidFill>
@@ -6894,7 +6894,7 @@
                 <a:ea typeface="宋体"/>
               </a:rPr>
               <a:pPr/>
-              <a:t>14-9-9</a:t>
+              <a:t>14-9-11</a:t>
             </a:fld>
             <a:endParaRPr lang="zh-CN" altLang="en-US">
               <a:solidFill>
@@ -7178,7 +7178,7 @@
                 <a:ea typeface="宋体"/>
               </a:rPr>
               <a:pPr/>
-              <a:t>14-9-9</a:t>
+              <a:t>14-9-11</a:t>
             </a:fld>
             <a:endParaRPr lang="zh-CN" altLang="en-US">
               <a:solidFill>
@@ -7390,7 +7390,7 @@
                 <a:ea typeface="宋体"/>
               </a:rPr>
               <a:pPr/>
-              <a:t>14-9-9</a:t>
+              <a:t>14-9-11</a:t>
             </a:fld>
             <a:endParaRPr lang="zh-CN" altLang="en-US">
               <a:solidFill>
@@ -7678,7 +7678,7 @@
                 <a:ea typeface="宋体"/>
               </a:rPr>
               <a:pPr/>
-              <a:t>14-9-9</a:t>
+              <a:t>14-9-11</a:t>
             </a:fld>
             <a:endParaRPr lang="zh-CN" altLang="en-US">
               <a:solidFill>
@@ -8008,7 +8008,7 @@
                 <a:ea typeface="宋体"/>
               </a:rPr>
               <a:pPr/>
-              <a:t>14-9-9</a:t>
+              <a:t>14-9-11</a:t>
             </a:fld>
             <a:endParaRPr lang="zh-CN" altLang="en-US">
               <a:solidFill>
@@ -8472,7 +8472,7 @@
                 <a:ea typeface="宋体"/>
               </a:rPr>
               <a:pPr/>
-              <a:t>14-9-9</a:t>
+              <a:t>14-9-11</a:t>
             </a:fld>
             <a:endParaRPr lang="zh-CN" altLang="en-US">
               <a:solidFill>
@@ -8632,7 +8632,7 @@
                 <a:ea typeface="宋体"/>
               </a:rPr>
               <a:pPr/>
-              <a:t>14-9-9</a:t>
+              <a:t>14-9-11</a:t>
             </a:fld>
             <a:endParaRPr lang="zh-CN" altLang="en-US">
               <a:solidFill>
@@ -8953,7 +8953,7 @@
           <a:p>
             <a:fld id="{530820CF-B880-4189-942D-D702A7CBA730}" type="datetimeFigureOut">
               <a:rPr lang="zh-CN" altLang="en-US" smtClean="0"/>
-              <a:t>14-9-9</a:t>
+              <a:t>14-9-11</a:t>
             </a:fld>
             <a:endParaRPr lang="zh-CN" altLang="en-US"/>
           </a:p>
@@ -9052,7 +9052,7 @@
                 <a:ea typeface="宋体"/>
               </a:rPr>
               <a:pPr/>
-              <a:t>14-9-9</a:t>
+              <a:t>14-9-11</a:t>
             </a:fld>
             <a:endParaRPr lang="zh-CN" altLang="en-US">
               <a:solidFill>
@@ -9371,7 +9371,7 @@
                 <a:ea typeface="宋体"/>
               </a:rPr>
               <a:pPr/>
-              <a:t>14-9-9</a:t>
+              <a:t>14-9-11</a:t>
             </a:fld>
             <a:endParaRPr lang="zh-CN" altLang="en-US">
               <a:solidFill>
@@ -9666,7 +9666,7 @@
                 <a:ea typeface="宋体"/>
               </a:rPr>
               <a:pPr/>
-              <a:t>14-9-9</a:t>
+              <a:t>14-9-11</a:t>
             </a:fld>
             <a:endParaRPr lang="zh-CN" altLang="en-US">
               <a:solidFill>
@@ -9878,7 +9878,7 @@
                 <a:ea typeface="宋体"/>
               </a:rPr>
               <a:pPr/>
-              <a:t>14-9-9</a:t>
+              <a:t>14-9-11</a:t>
             </a:fld>
             <a:endParaRPr lang="zh-CN" altLang="en-US">
               <a:solidFill>
@@ -10100,7 +10100,7 @@
                 <a:ea typeface="宋体"/>
               </a:rPr>
               <a:pPr/>
-              <a:t>14-9-9</a:t>
+              <a:t>14-9-11</a:t>
             </a:fld>
             <a:endParaRPr lang="zh-CN" altLang="en-US">
               <a:solidFill>
@@ -10384,7 +10384,7 @@
                 <a:ea typeface="宋体"/>
               </a:rPr>
               <a:pPr/>
-              <a:t>14-9-9</a:t>
+              <a:t>14-9-11</a:t>
             </a:fld>
             <a:endParaRPr lang="zh-CN" altLang="en-US">
               <a:solidFill>
@@ -10596,7 +10596,7 @@
                 <a:ea typeface="宋体"/>
               </a:rPr>
               <a:pPr/>
-              <a:t>14-9-9</a:t>
+              <a:t>14-9-11</a:t>
             </a:fld>
             <a:endParaRPr lang="zh-CN" altLang="en-US">
               <a:solidFill>
@@ -10884,7 +10884,7 @@
                 <a:ea typeface="宋体"/>
               </a:rPr>
               <a:pPr/>
-              <a:t>14-9-9</a:t>
+              <a:t>14-9-11</a:t>
             </a:fld>
             <a:endParaRPr lang="zh-CN" altLang="en-US">
               <a:solidFill>
@@ -11214,7 +11214,7 @@
                 <a:ea typeface="宋体"/>
               </a:rPr>
               <a:pPr/>
-              <a:t>14-9-9</a:t>
+              <a:t>14-9-11</a:t>
             </a:fld>
             <a:endParaRPr lang="zh-CN" altLang="en-US">
               <a:solidFill>
@@ -11678,7 +11678,7 @@
                 <a:ea typeface="宋体"/>
               </a:rPr>
               <a:pPr/>
-              <a:t>14-9-9</a:t>
+              <a:t>14-9-11</a:t>
             </a:fld>
             <a:endParaRPr lang="zh-CN" altLang="en-US">
               <a:solidFill>
@@ -12133,7 +12133,7 @@
           <a:p>
             <a:fld id="{530820CF-B880-4189-942D-D702A7CBA730}" type="datetimeFigureOut">
               <a:rPr lang="zh-CN" altLang="en-US" smtClean="0"/>
-              <a:t>14-9-9</a:t>
+              <a:t>14-9-11</a:t>
             </a:fld>
             <a:endParaRPr lang="zh-CN" altLang="en-US"/>
           </a:p>
@@ -12255,7 +12255,7 @@
                 <a:ea typeface="宋体"/>
               </a:rPr>
               <a:pPr/>
-              <a:t>14-9-9</a:t>
+              <a:t>14-9-11</a:t>
             </a:fld>
             <a:endParaRPr lang="zh-CN" altLang="en-US">
               <a:solidFill>
@@ -12392,7 +12392,7 @@
                 <a:ea typeface="宋体"/>
               </a:rPr>
               <a:pPr/>
-              <a:t>14-9-9</a:t>
+              <a:t>14-9-11</a:t>
             </a:fld>
             <a:endParaRPr lang="zh-CN" altLang="en-US">
               <a:solidFill>
@@ -12711,7 +12711,7 @@
                 <a:ea typeface="宋体"/>
               </a:rPr>
               <a:pPr/>
-              <a:t>14-9-9</a:t>
+              <a:t>14-9-11</a:t>
             </a:fld>
             <a:endParaRPr lang="zh-CN" altLang="en-US">
               <a:solidFill>
@@ -13006,7 +13006,7 @@
                 <a:ea typeface="宋体"/>
               </a:rPr>
               <a:pPr/>
-              <a:t>14-9-9</a:t>
+              <a:t>14-9-11</a:t>
             </a:fld>
             <a:endParaRPr lang="zh-CN" altLang="en-US">
               <a:solidFill>
@@ -13218,7 +13218,7 @@
                 <a:ea typeface="宋体"/>
               </a:rPr>
               <a:pPr/>
-              <a:t>14-9-9</a:t>
+              <a:t>14-9-11</a:t>
             </a:fld>
             <a:endParaRPr lang="zh-CN" altLang="en-US">
               <a:solidFill>
@@ -13440,7 +13440,7 @@
                 <a:ea typeface="宋体"/>
               </a:rPr>
               <a:pPr/>
-              <a:t>14-9-9</a:t>
+              <a:t>14-9-11</a:t>
             </a:fld>
             <a:endParaRPr lang="zh-CN" altLang="en-US">
               <a:solidFill>
@@ -13724,7 +13724,7 @@
                 <a:ea typeface="宋体"/>
               </a:rPr>
               <a:pPr/>
-              <a:t>14-9-9</a:t>
+              <a:t>14-9-11</a:t>
             </a:fld>
             <a:endParaRPr lang="zh-CN" altLang="en-US">
               <a:solidFill>
@@ -13936,7 +13936,7 @@
                 <a:ea typeface="宋体"/>
               </a:rPr>
               <a:pPr/>
-              <a:t>14-9-9</a:t>
+              <a:t>14-9-11</a:t>
             </a:fld>
             <a:endParaRPr lang="zh-CN" altLang="en-US">
               <a:solidFill>
@@ -14224,7 +14224,7 @@
                 <a:ea typeface="宋体"/>
               </a:rPr>
               <a:pPr/>
-              <a:t>14-9-9</a:t>
+              <a:t>14-9-11</a:t>
             </a:fld>
             <a:endParaRPr lang="zh-CN" altLang="en-US">
               <a:solidFill>
@@ -14554,7 +14554,7 @@
                 <a:ea typeface="宋体"/>
               </a:rPr>
               <a:pPr/>
-              <a:t>14-9-9</a:t>
+              <a:t>14-9-11</a:t>
             </a:fld>
             <a:endParaRPr lang="zh-CN" altLang="en-US">
               <a:solidFill>
@@ -14705,7 +14705,7 @@
           <a:p>
             <a:fld id="{530820CF-B880-4189-942D-D702A7CBA730}" type="datetimeFigureOut">
               <a:rPr lang="zh-CN" altLang="en-US" smtClean="0"/>
-              <a:t>14-9-9</a:t>
+              <a:t>14-9-11</a:t>
             </a:fld>
             <a:endParaRPr lang="zh-CN" altLang="en-US"/>
           </a:p>
@@ -15131,7 +15131,7 @@
                 <a:ea typeface="宋体"/>
               </a:rPr>
               <a:pPr/>
-              <a:t>14-9-9</a:t>
+              <a:t>14-9-11</a:t>
             </a:fld>
             <a:endParaRPr lang="zh-CN" altLang="en-US">
               <a:solidFill>
@@ -15291,7 +15291,7 @@
                 <a:ea typeface="宋体"/>
               </a:rPr>
               <a:pPr/>
-              <a:t>14-9-9</a:t>
+              <a:t>14-9-11</a:t>
             </a:fld>
             <a:endParaRPr lang="zh-CN" altLang="en-US">
               <a:solidFill>
@@ -15428,7 +15428,7 @@
                 <a:ea typeface="宋体"/>
               </a:rPr>
               <a:pPr/>
-              <a:t>14-9-9</a:t>
+              <a:t>14-9-11</a:t>
             </a:fld>
             <a:endParaRPr lang="zh-CN" altLang="en-US">
               <a:solidFill>
@@ -15747,7 +15747,7 @@
                 <a:ea typeface="宋体"/>
               </a:rPr>
               <a:pPr/>
-              <a:t>14-9-9</a:t>
+              <a:t>14-9-11</a:t>
             </a:fld>
             <a:endParaRPr lang="zh-CN" altLang="en-US">
               <a:solidFill>
@@ -16042,7 +16042,7 @@
                 <a:ea typeface="宋体"/>
               </a:rPr>
               <a:pPr/>
-              <a:t>14-9-9</a:t>
+              <a:t>14-9-11</a:t>
             </a:fld>
             <a:endParaRPr lang="zh-CN" altLang="en-US">
               <a:solidFill>
@@ -16254,7 +16254,7 @@
                 <a:ea typeface="宋体"/>
               </a:rPr>
               <a:pPr/>
-              <a:t>14-9-9</a:t>
+              <a:t>14-9-11</a:t>
             </a:fld>
             <a:endParaRPr lang="zh-CN" altLang="en-US">
               <a:solidFill>
@@ -16476,7 +16476,7 @@
                 <a:ea typeface="宋体"/>
               </a:rPr>
               <a:pPr/>
-              <a:t>14-9-9</a:t>
+              <a:t>14-9-11</a:t>
             </a:fld>
             <a:endParaRPr lang="zh-CN" altLang="en-US">
               <a:solidFill>
@@ -16760,7 +16760,7 @@
                 <a:ea typeface="宋体"/>
               </a:rPr>
               <a:pPr/>
-              <a:t>14-9-9</a:t>
+              <a:t>14-9-11</a:t>
             </a:fld>
             <a:endParaRPr lang="zh-CN" altLang="en-US">
               <a:solidFill>
@@ -16972,7 +16972,7 @@
                 <a:ea typeface="宋体"/>
               </a:rPr>
               <a:pPr/>
-              <a:t>14-9-9</a:t>
+              <a:t>14-9-11</a:t>
             </a:fld>
             <a:endParaRPr lang="zh-CN" altLang="en-US">
               <a:solidFill>
@@ -17260,7 +17260,7 @@
                 <a:ea typeface="宋体"/>
               </a:rPr>
               <a:pPr/>
-              <a:t>14-9-9</a:t>
+              <a:t>14-9-11</a:t>
             </a:fld>
             <a:endParaRPr lang="zh-CN" altLang="en-US">
               <a:solidFill>
@@ -17388,7 +17388,7 @@
           <a:p>
             <a:fld id="{530820CF-B880-4189-942D-D702A7CBA730}" type="datetimeFigureOut">
               <a:rPr lang="zh-CN" altLang="en-US" smtClean="0"/>
-              <a:t>14-9-9</a:t>
+              <a:t>14-9-11</a:t>
             </a:fld>
             <a:endParaRPr lang="zh-CN" altLang="en-US"/>
           </a:p>
@@ -17680,7 +17680,7 @@
                 <a:ea typeface="宋体"/>
               </a:rPr>
               <a:pPr/>
-              <a:t>14-9-9</a:t>
+              <a:t>14-9-11</a:t>
             </a:fld>
             <a:endParaRPr lang="zh-CN" altLang="en-US">
               <a:solidFill>
@@ -18144,7 +18144,7 @@
                 <a:ea typeface="宋体"/>
               </a:rPr>
               <a:pPr/>
-              <a:t>14-9-9</a:t>
+              <a:t>14-9-11</a:t>
             </a:fld>
             <a:endParaRPr lang="zh-CN" altLang="en-US">
               <a:solidFill>
@@ -18304,7 +18304,7 @@
                 <a:ea typeface="宋体"/>
               </a:rPr>
               <a:pPr/>
-              <a:t>14-9-9</a:t>
+              <a:t>14-9-11</a:t>
             </a:fld>
             <a:endParaRPr lang="zh-CN" altLang="en-US">
               <a:solidFill>
@@ -18441,7 +18441,7 @@
                 <a:ea typeface="宋体"/>
               </a:rPr>
               <a:pPr/>
-              <a:t>14-9-9</a:t>
+              <a:t>14-9-11</a:t>
             </a:fld>
             <a:endParaRPr lang="zh-CN" altLang="en-US">
               <a:solidFill>
@@ -18760,7 +18760,7 @@
                 <a:ea typeface="宋体"/>
               </a:rPr>
               <a:pPr/>
-              <a:t>14-9-9</a:t>
+              <a:t>14-9-11</a:t>
             </a:fld>
             <a:endParaRPr lang="zh-CN" altLang="en-US">
               <a:solidFill>
@@ -19055,7 +19055,7 @@
                 <a:ea typeface="宋体"/>
               </a:rPr>
               <a:pPr/>
-              <a:t>14-9-9</a:t>
+              <a:t>14-9-11</a:t>
             </a:fld>
             <a:endParaRPr lang="zh-CN" altLang="en-US">
               <a:solidFill>
@@ -19267,7 +19267,7 @@
                 <a:ea typeface="宋体"/>
               </a:rPr>
               <a:pPr/>
-              <a:t>14-9-9</a:t>
+              <a:t>14-9-11</a:t>
             </a:fld>
             <a:endParaRPr lang="zh-CN" altLang="en-US">
               <a:solidFill>
@@ -19489,7 +19489,7 @@
                 <a:ea typeface="宋体"/>
               </a:rPr>
               <a:pPr/>
-              <a:t>14-9-9</a:t>
+              <a:t>14-9-11</a:t>
             </a:fld>
             <a:endParaRPr lang="zh-CN" altLang="en-US">
               <a:solidFill>
@@ -19773,7 +19773,7 @@
                 <a:ea typeface="宋体"/>
               </a:rPr>
               <a:pPr/>
-              <a:t>14-9-9</a:t>
+              <a:t>14-9-11</a:t>
             </a:fld>
             <a:endParaRPr lang="zh-CN" altLang="en-US">
               <a:solidFill>
@@ -19985,7 +19985,7 @@
                 <a:ea typeface="宋体"/>
               </a:rPr>
               <a:pPr/>
-              <a:t>14-9-9</a:t>
+              <a:t>14-9-11</a:t>
             </a:fld>
             <a:endParaRPr lang="zh-CN" altLang="en-US">
               <a:solidFill>
@@ -20295,7 +20295,7 @@
           <a:p>
             <a:fld id="{530820CF-B880-4189-942D-D702A7CBA730}" type="datetimeFigureOut">
               <a:rPr lang="zh-CN" altLang="en-US" smtClean="0"/>
-              <a:t>14-9-9</a:t>
+              <a:t>14-9-11</a:t>
             </a:fld>
             <a:endParaRPr lang="zh-CN" altLang="en-US"/>
           </a:p>
@@ -20545,7 +20545,7 @@
                 <a:ea typeface="宋体"/>
               </a:rPr>
               <a:pPr/>
-              <a:t>14-9-9</a:t>
+              <a:t>14-9-11</a:t>
             </a:fld>
             <a:endParaRPr lang="zh-CN" altLang="en-US">
               <a:solidFill>
@@ -20875,7 +20875,7 @@
                 <a:ea typeface="宋体"/>
               </a:rPr>
               <a:pPr/>
-              <a:t>14-9-9</a:t>
+              <a:t>14-9-11</a:t>
             </a:fld>
             <a:endParaRPr lang="zh-CN" altLang="en-US">
               <a:solidFill>
@@ -21339,7 +21339,7 @@
                 <a:ea typeface="宋体"/>
               </a:rPr>
               <a:pPr/>
-              <a:t>14-9-9</a:t>
+              <a:t>14-9-11</a:t>
             </a:fld>
             <a:endParaRPr lang="zh-CN" altLang="en-US">
               <a:solidFill>
@@ -21499,7 +21499,7 @@
                 <a:ea typeface="宋体"/>
               </a:rPr>
               <a:pPr/>
-              <a:t>14-9-9</a:t>
+              <a:t>14-9-11</a:t>
             </a:fld>
             <a:endParaRPr lang="zh-CN" altLang="en-US">
               <a:solidFill>
@@ -21636,7 +21636,7 @@
                 <a:ea typeface="宋体"/>
               </a:rPr>
               <a:pPr/>
-              <a:t>14-9-9</a:t>
+              <a:t>14-9-11</a:t>
             </a:fld>
             <a:endParaRPr lang="zh-CN" altLang="en-US">
               <a:solidFill>
@@ -21955,7 +21955,7 @@
                 <a:ea typeface="宋体"/>
               </a:rPr>
               <a:pPr/>
-              <a:t>14-9-9</a:t>
+              <a:t>14-9-11</a:t>
             </a:fld>
             <a:endParaRPr lang="zh-CN" altLang="en-US">
               <a:solidFill>
@@ -22250,7 +22250,7 @@
                 <a:ea typeface="宋体"/>
               </a:rPr>
               <a:pPr/>
-              <a:t>14-9-9</a:t>
+              <a:t>14-9-11</a:t>
             </a:fld>
             <a:endParaRPr lang="zh-CN" altLang="en-US">
               <a:solidFill>
@@ -22462,7 +22462,7 @@
                 <a:ea typeface="宋体"/>
               </a:rPr>
               <a:pPr/>
-              <a:t>14-9-9</a:t>
+              <a:t>14-9-11</a:t>
             </a:fld>
             <a:endParaRPr lang="zh-CN" altLang="en-US">
               <a:solidFill>
@@ -22684,7 +22684,7 @@
                 <a:ea typeface="宋体"/>
               </a:rPr>
               <a:pPr/>
-              <a:t>14-9-9</a:t>
+              <a:t>14-9-11</a:t>
             </a:fld>
             <a:endParaRPr lang="zh-CN" altLang="en-US">
               <a:solidFill>
@@ -22968,7 +22968,7 @@
                 <a:ea typeface="宋体"/>
               </a:rPr>
               <a:pPr/>
-              <a:t>14-9-9</a:t>
+              <a:t>14-9-11</a:t>
             </a:fld>
             <a:endParaRPr lang="zh-CN" altLang="en-US">
               <a:solidFill>
@@ -23254,7 +23254,7 @@
           <a:p>
             <a:fld id="{530820CF-B880-4189-942D-D702A7CBA730}" type="datetimeFigureOut">
               <a:rPr lang="zh-CN" altLang="en-US" smtClean="0"/>
-              <a:t>14-9-9</a:t>
+              <a:t>14-9-11</a:t>
             </a:fld>
             <a:endParaRPr lang="zh-CN" altLang="en-US"/>
           </a:p>
@@ -23428,7 +23428,7 @@
                 <a:ea typeface="宋体"/>
               </a:rPr>
               <a:pPr/>
-              <a:t>14-9-9</a:t>
+              <a:t>14-9-11</a:t>
             </a:fld>
             <a:endParaRPr lang="zh-CN" altLang="en-US">
               <a:solidFill>
@@ -23716,7 +23716,7 @@
                 <a:ea typeface="宋体"/>
               </a:rPr>
               <a:pPr/>
-              <a:t>14-9-9</a:t>
+              <a:t>14-9-11</a:t>
             </a:fld>
             <a:endParaRPr lang="zh-CN" altLang="en-US">
               <a:solidFill>
@@ -24046,7 +24046,7 @@
                 <a:ea typeface="宋体"/>
               </a:rPr>
               <a:pPr/>
-              <a:t>14-9-9</a:t>
+              <a:t>14-9-11</a:t>
             </a:fld>
             <a:endParaRPr lang="zh-CN" altLang="en-US">
               <a:solidFill>
@@ -24510,7 +24510,7 @@
                 <a:ea typeface="宋体"/>
               </a:rPr>
               <a:pPr/>
-              <a:t>14-9-9</a:t>
+              <a:t>14-9-11</a:t>
             </a:fld>
             <a:endParaRPr lang="zh-CN" altLang="en-US">
               <a:solidFill>
@@ -24670,7 +24670,7 @@
                 <a:ea typeface="宋体"/>
               </a:rPr>
               <a:pPr/>
-              <a:t>14-9-9</a:t>
+              <a:t>14-9-11</a:t>
             </a:fld>
             <a:endParaRPr lang="zh-CN" altLang="en-US">
               <a:solidFill>
@@ -24807,7 +24807,7 @@
                 <a:ea typeface="宋体"/>
               </a:rPr>
               <a:pPr/>
-              <a:t>14-9-9</a:t>
+              <a:t>14-9-11</a:t>
             </a:fld>
             <a:endParaRPr lang="zh-CN" altLang="en-US">
               <a:solidFill>
@@ -25126,7 +25126,7 @@
                 <a:ea typeface="宋体"/>
               </a:rPr>
               <a:pPr/>
-              <a:t>14-9-9</a:t>
+              <a:t>14-9-11</a:t>
             </a:fld>
             <a:endParaRPr lang="zh-CN" altLang="en-US">
               <a:solidFill>
@@ -25421,7 +25421,7 @@
                 <a:ea typeface="宋体"/>
               </a:rPr>
               <a:pPr/>
-              <a:t>14-9-9</a:t>
+              <a:t>14-9-11</a:t>
             </a:fld>
             <a:endParaRPr lang="zh-CN" altLang="en-US">
               <a:solidFill>
@@ -25633,7 +25633,7 @@
                 <a:ea typeface="宋体"/>
               </a:rPr>
               <a:pPr/>
-              <a:t>14-9-9</a:t>
+              <a:t>14-9-11</a:t>
             </a:fld>
             <a:endParaRPr lang="zh-CN" altLang="en-US">
               <a:solidFill>
@@ -25855,7 +25855,7 @@
                 <a:ea typeface="宋体"/>
               </a:rPr>
               <a:pPr/>
-              <a:t>14-9-9</a:t>
+              <a:t>14-9-11</a:t>
             </a:fld>
             <a:endParaRPr lang="zh-CN" altLang="en-US">
               <a:solidFill>
@@ -26101,7 +26101,7 @@
           <a:p>
             <a:fld id="{530820CF-B880-4189-942D-D702A7CBA730}" type="datetimeFigureOut">
               <a:rPr lang="zh-CN" altLang="en-US" smtClean="0"/>
-              <a:t>14-9-9</a:t>
+              <a:t>14-9-11</a:t>
             </a:fld>
             <a:endParaRPr lang="zh-CN" altLang="en-US"/>
           </a:p>
@@ -26615,7 +26615,7 @@
                 <a:ea typeface="宋体"/>
               </a:rPr>
               <a:pPr/>
-              <a:t>14-9-9</a:t>
+              <a:t>14-9-11</a:t>
             </a:fld>
             <a:endParaRPr lang="zh-CN" altLang="en-US">
               <a:solidFill>
@@ -27167,7 +27167,7 @@
                 <a:ea typeface="宋体"/>
               </a:rPr>
               <a:pPr/>
-              <a:t>14-9-9</a:t>
+              <a:t>14-9-11</a:t>
             </a:fld>
             <a:endParaRPr lang="zh-CN" altLang="en-US">
               <a:solidFill>
@@ -27719,7 +27719,7 @@
                 <a:ea typeface="宋体"/>
               </a:rPr>
               <a:pPr/>
-              <a:t>14-9-9</a:t>
+              <a:t>14-9-11</a:t>
             </a:fld>
             <a:endParaRPr lang="zh-CN" altLang="en-US">
               <a:solidFill>
@@ -28271,7 +28271,7 @@
                 <a:ea typeface="宋体"/>
               </a:rPr>
               <a:pPr/>
-              <a:t>14-9-9</a:t>
+              <a:t>14-9-11</a:t>
             </a:fld>
             <a:endParaRPr lang="zh-CN" altLang="en-US">
               <a:solidFill>
@@ -28823,7 +28823,7 @@
                 <a:ea typeface="宋体"/>
               </a:rPr>
               <a:pPr/>
-              <a:t>14-9-9</a:t>
+              <a:t>14-9-11</a:t>
             </a:fld>
             <a:endParaRPr lang="zh-CN" altLang="en-US">
               <a:solidFill>
@@ -29375,7 +29375,7 @@
                 <a:ea typeface="宋体"/>
               </a:rPr>
               <a:pPr/>
-              <a:t>14-9-9</a:t>
+              <a:t>14-9-11</a:t>
             </a:fld>
             <a:endParaRPr lang="zh-CN" altLang="en-US">
               <a:solidFill>
@@ -29927,7 +29927,7 @@
                 <a:ea typeface="宋体"/>
               </a:rPr>
               <a:pPr/>
-              <a:t>14-9-9</a:t>
+              <a:t>14-9-11</a:t>
             </a:fld>
             <a:endParaRPr lang="zh-CN" altLang="en-US">
               <a:solidFill>
@@ -30479,7 +30479,7 @@
                 <a:ea typeface="宋体"/>
               </a:rPr>
               <a:pPr/>
-              <a:t>14-9-9</a:t>
+              <a:t>14-9-11</a:t>
             </a:fld>
             <a:endParaRPr lang="zh-CN" altLang="en-US">
               <a:solidFill>
@@ -32185,38 +32185,6 @@
       </p:pic>
       <p:sp>
         <p:nvSpPr>
-          <p:cNvPr id="5" name="文本框 4"/>
-          <p:cNvSpPr txBox="1"/>
-          <p:nvPr/>
-        </p:nvSpPr>
-        <p:spPr>
-          <a:xfrm>
-            <a:off x="9042400" y="6034505"/>
-            <a:ext cx="184666" cy="369332"/>
-          </a:xfrm>
-          <a:prstGeom prst="rect">
-            <a:avLst/>
-          </a:prstGeom>
-          <a:noFill/>
-        </p:spPr>
-        <p:txBody>
-          <a:bodyPr wrap="none" rtlCol="0">
-            <a:spAutoFit/>
-          </a:bodyPr>
-          <a:lstStyle/>
-          <a:p>
-            <a:endParaRPr kumimoji="1" lang="zh-CN" altLang="en-US" dirty="0">
-              <a:solidFill>
-                <a:prstClr val="black"/>
-              </a:solidFill>
-              <a:latin typeface="Calibri"/>
-              <a:ea typeface="宋体"/>
-            </a:endParaRPr>
-          </a:p>
-        </p:txBody>
-      </p:sp>
-      <p:sp>
-        <p:nvSpPr>
           <p:cNvPr id="6" name="文本框 5"/>
           <p:cNvSpPr txBox="1"/>
           <p:nvPr/>
@@ -32249,70 +32217,6 @@
       </p:sp>
       <p:sp>
         <p:nvSpPr>
-          <p:cNvPr id="7" name="文本框 6"/>
-          <p:cNvSpPr txBox="1"/>
-          <p:nvPr/>
-        </p:nvSpPr>
-        <p:spPr>
-          <a:xfrm>
-            <a:off x="8890000" y="5882105"/>
-            <a:ext cx="184666" cy="369332"/>
-          </a:xfrm>
-          <a:prstGeom prst="rect">
-            <a:avLst/>
-          </a:prstGeom>
-          <a:noFill/>
-        </p:spPr>
-        <p:txBody>
-          <a:bodyPr wrap="none" rtlCol="0">
-            <a:spAutoFit/>
-          </a:bodyPr>
-          <a:lstStyle/>
-          <a:p>
-            <a:endParaRPr kumimoji="1" lang="zh-CN" altLang="en-US" dirty="0">
-              <a:solidFill>
-                <a:prstClr val="black"/>
-              </a:solidFill>
-              <a:latin typeface="Calibri"/>
-              <a:ea typeface="宋体"/>
-            </a:endParaRPr>
-          </a:p>
-        </p:txBody>
-      </p:sp>
-      <p:sp>
-        <p:nvSpPr>
-          <p:cNvPr id="8" name="文本框 7"/>
-          <p:cNvSpPr txBox="1"/>
-          <p:nvPr/>
-        </p:nvSpPr>
-        <p:spPr>
-          <a:xfrm>
-            <a:off x="9042400" y="6034505"/>
-            <a:ext cx="184666" cy="369332"/>
-          </a:xfrm>
-          <a:prstGeom prst="rect">
-            <a:avLst/>
-          </a:prstGeom>
-          <a:noFill/>
-        </p:spPr>
-        <p:txBody>
-          <a:bodyPr wrap="none" rtlCol="0">
-            <a:spAutoFit/>
-          </a:bodyPr>
-          <a:lstStyle/>
-          <a:p>
-            <a:endParaRPr kumimoji="1" lang="zh-CN" altLang="en-US" dirty="0">
-              <a:solidFill>
-                <a:prstClr val="black"/>
-              </a:solidFill>
-              <a:latin typeface="Calibri"/>
-              <a:ea typeface="宋体"/>
-            </a:endParaRPr>
-          </a:p>
-        </p:txBody>
-      </p:sp>
-      <p:sp>
-        <p:nvSpPr>
           <p:cNvPr id="9" name="文本框 8"/>
           <p:cNvSpPr txBox="1"/>
           <p:nvPr/>
@@ -32340,6 +32244,43 @@
               <a:latin typeface="Calibri"/>
               <a:ea typeface="宋体"/>
             </a:endParaRPr>
+          </a:p>
+        </p:txBody>
+      </p:sp>
+      <p:sp>
+        <p:nvSpPr>
+          <p:cNvPr id="11" name="矩形 10"/>
+          <p:cNvSpPr/>
+          <p:nvPr/>
+        </p:nvSpPr>
+        <p:spPr>
+          <a:xfrm>
+            <a:off x="5292080" y="5684762"/>
+            <a:ext cx="3409167" cy="369332"/>
+          </a:xfrm>
+          <a:prstGeom prst="rect">
+            <a:avLst/>
+          </a:prstGeom>
+        </p:spPr>
+        <p:txBody>
+          <a:bodyPr wrap="square">
+            <a:spAutoFit/>
+          </a:bodyPr>
+          <a:lstStyle/>
+          <a:p>
+            <a:r>
+              <a:rPr lang="en-US" altLang="zh-CN" dirty="0" smtClean="0"/>
+              <a:t>※ </a:t>
+            </a:r>
+            <a:r>
+              <a:rPr lang="en-US" altLang="zh-CN" dirty="0" smtClean="0"/>
+              <a:t>Sort</a:t>
+            </a:r>
+            <a:r>
+              <a:rPr lang="en-US" altLang="zh-CN" dirty="0"/>
+              <a:t>-based shuffle supported</a:t>
+            </a:r>
+            <a:endParaRPr lang="zh-CN" altLang="en-US" dirty="0"/>
           </a:p>
         </p:txBody>
       </p:sp>
@@ -36704,6 +36645,20 @@
 <file path=ppt/slides/slide3.xml><?xml version="1.0" encoding="utf-8"?>
 <p:sld xmlns:a="http://schemas.openxmlformats.org/drawingml/2006/main" xmlns:r="http://schemas.openxmlformats.org/officeDocument/2006/relationships" xmlns:p="http://schemas.openxmlformats.org/presentationml/2006/main">
   <p:cSld>
+    <p:bg>
+      <p:bgPr>
+        <a:blipFill dpi="0" rotWithShape="1">
+          <a:blip r:embed="rId2">
+            <a:lum/>
+          </a:blip>
+          <a:srcRect/>
+          <a:stretch>
+            <a:fillRect/>
+          </a:stretch>
+        </a:blipFill>
+        <a:effectLst/>
+      </p:bgPr>
+    </p:bg>
     <p:spTree>
       <p:nvGrpSpPr>
         <p:cNvPr id="1" name=""/>
@@ -36739,16 +36694,8 @@
           <a:lstStyle/>
           <a:p>
             <a:r>
-              <a:rPr lang="en-US" altLang="zh-CN" dirty="0" smtClean="0"/>
-              <a:t>Current </a:t>
-            </a:r>
-            <a:r>
-              <a:rPr lang="en-US" altLang="zh-CN" dirty="0" smtClean="0"/>
-              <a:t>Major </a:t>
-            </a:r>
-            <a:r>
-              <a:rPr lang="en-US" altLang="zh-CN" dirty="0" smtClean="0"/>
-              <a:t>Release</a:t>
+              <a:rPr lang="en-US" altLang="zh-CN" dirty="0"/>
+              <a:t>Current Major Release</a:t>
             </a:r>
             <a:endParaRPr lang="zh-CN" altLang="en-US" dirty="0"/>
           </a:p>
@@ -36772,17 +36719,21 @@
             <a:endParaRPr lang="en-US" altLang="zh-CN" dirty="0" smtClean="0"/>
           </a:p>
           <a:p>
-            <a:endParaRPr lang="en-US" altLang="zh-CN" dirty="0" smtClean="0"/>
-          </a:p>
-          <a:p>
-            <a:endParaRPr lang="en-US" altLang="zh-CN" dirty="0" smtClean="0"/>
-          </a:p>
-          <a:p>
-            <a:r>
-              <a:rPr lang="en-US" altLang="zh-CN" sz="4800" b="1" dirty="0" smtClean="0"/>
-              <a:t>Just released Spark 1.1</a:t>
-            </a:r>
-            <a:endParaRPr lang="en-US" altLang="zh-CN" sz="4800" b="1" dirty="0"/>
+            <a:endParaRPr lang="en-US" altLang="zh-CN" dirty="0"/>
+          </a:p>
+          <a:p>
+            <a:endParaRPr lang="en-US" altLang="zh-CN" b="1" dirty="0" smtClean="0"/>
+          </a:p>
+          <a:p>
+            <a:r>
+              <a:rPr lang="en-US" altLang="zh-CN" b="1" dirty="0" smtClean="0"/>
+              <a:t>Just </a:t>
+            </a:r>
+            <a:r>
+              <a:rPr lang="en-US" altLang="zh-CN" b="1" dirty="0"/>
+              <a:t>released Spark 1.1</a:t>
+            </a:r>
+            <a:endParaRPr lang="en-US" altLang="zh-CN" b="1" dirty="0"/>
           </a:p>
         </p:txBody>
       </p:sp>
@@ -36949,7 +36900,7 @@
     </p:spTree>
     <p:extLst>
       <p:ext uri="{BB962C8B-B14F-4D97-AF65-F5344CB8AC3E}">
-        <p14:creationId xmlns:p14="http://schemas.microsoft.com/office/powerpoint/2010/main" val="967110715"/>
+        <p14:creationId xmlns:p14="http://schemas.microsoft.com/office/powerpoint/2010/main" val="1561467821"/>
       </p:ext>
     </p:extLst>
   </p:cSld>

</xml_diff>

<commit_message>
add some 1.1 new feature
</commit_message>
<xml_diff>
--- a/SACC2014/SACC2014.pptx
+++ b/SACC2014/SACC2014.pptx
@@ -142,7 +142,7 @@
   </p:defaultTextStyle>
   <p:extLst>
     <p:ext uri="{EFAFB233-063F-42B5-8137-9DF3F51BA10A}">
-      <p15:sldGuideLst xmlns:p15="http://schemas.microsoft.com/office/powerpoint/2012/main" xmlns="">
+      <p15:sldGuideLst xmlns="" xmlns:p15="http://schemas.microsoft.com/office/powerpoint/2012/main">
         <p15:guide id="1" orient="horz" pos="2160">
           <p15:clr>
             <a:srgbClr val="A4A3A4"/>
@@ -340,7 +340,7 @@
           <a:p>
             <a:fld id="{530820CF-B880-4189-942D-D702A7CBA730}" type="datetimeFigureOut">
               <a:rPr lang="zh-CN" altLang="en-US" smtClean="0"/>
-              <a:t>14-9-11</a:t>
+              <a:t>14-9-14</a:t>
             </a:fld>
             <a:endParaRPr lang="zh-CN" altLang="en-US"/>
           </a:p>
@@ -505,7 +505,7 @@
           <a:p>
             <a:fld id="{530820CF-B880-4189-942D-D702A7CBA730}" type="datetimeFigureOut">
               <a:rPr lang="zh-CN" altLang="en-US" smtClean="0"/>
-              <a:t>14-9-11</a:t>
+              <a:t>14-9-14</a:t>
             </a:fld>
             <a:endParaRPr lang="zh-CN" altLang="en-US"/>
           </a:p>
@@ -680,7 +680,7 @@
           <a:p>
             <a:fld id="{530820CF-B880-4189-942D-D702A7CBA730}" type="datetimeFigureOut">
               <a:rPr lang="zh-CN" altLang="en-US" smtClean="0"/>
-              <a:t>14-9-11</a:t>
+              <a:t>14-9-14</a:t>
             </a:fld>
             <a:endParaRPr lang="zh-CN" altLang="en-US"/>
           </a:p>
@@ -926,7 +926,7 @@
                 <a:ea typeface="宋体"/>
               </a:rPr>
               <a:pPr/>
-              <a:t>14-9-11</a:t>
+              <a:t>14-9-14</a:t>
             </a:fld>
             <a:endParaRPr lang="zh-CN" altLang="en-US">
               <a:solidFill>
@@ -1138,7 +1138,7 @@
                 <a:ea typeface="宋体"/>
               </a:rPr>
               <a:pPr/>
-              <a:t>14-9-11</a:t>
+              <a:t>14-9-14</a:t>
             </a:fld>
             <a:endParaRPr lang="zh-CN" altLang="en-US">
               <a:solidFill>
@@ -1426,7 +1426,7 @@
                 <a:ea typeface="宋体"/>
               </a:rPr>
               <a:pPr/>
-              <a:t>14-9-11</a:t>
+              <a:t>14-9-14</a:t>
             </a:fld>
             <a:endParaRPr lang="zh-CN" altLang="en-US">
               <a:solidFill>
@@ -1756,7 +1756,7 @@
                 <a:ea typeface="宋体"/>
               </a:rPr>
               <a:pPr/>
-              <a:t>14-9-11</a:t>
+              <a:t>14-9-14</a:t>
             </a:fld>
             <a:endParaRPr lang="zh-CN" altLang="en-US">
               <a:solidFill>
@@ -2220,7 +2220,7 @@
                 <a:ea typeface="宋体"/>
               </a:rPr>
               <a:pPr/>
-              <a:t>14-9-11</a:t>
+              <a:t>14-9-14</a:t>
             </a:fld>
             <a:endParaRPr lang="zh-CN" altLang="en-US">
               <a:solidFill>
@@ -2380,7 +2380,7 @@
                 <a:ea typeface="宋体"/>
               </a:rPr>
               <a:pPr/>
-              <a:t>14-9-11</a:t>
+              <a:t>14-9-14</a:t>
             </a:fld>
             <a:endParaRPr lang="zh-CN" altLang="en-US">
               <a:solidFill>
@@ -2517,7 +2517,7 @@
                 <a:ea typeface="宋体"/>
               </a:rPr>
               <a:pPr/>
-              <a:t>14-9-11</a:t>
+              <a:t>14-9-14</a:t>
             </a:fld>
             <a:endParaRPr lang="zh-CN" altLang="en-US">
               <a:solidFill>
@@ -2836,7 +2836,7 @@
                 <a:ea typeface="宋体"/>
               </a:rPr>
               <a:pPr/>
-              <a:t>14-9-11</a:t>
+              <a:t>14-9-14</a:t>
             </a:fld>
             <a:endParaRPr lang="zh-CN" altLang="en-US">
               <a:solidFill>
@@ -3039,7 +3039,7 @@
           <a:p>
             <a:fld id="{530820CF-B880-4189-942D-D702A7CBA730}" type="datetimeFigureOut">
               <a:rPr lang="zh-CN" altLang="en-US" smtClean="0"/>
-              <a:t>14-9-11</a:t>
+              <a:t>14-9-14</a:t>
             </a:fld>
             <a:endParaRPr lang="zh-CN" altLang="en-US"/>
           </a:p>
@@ -3296,7 +3296,7 @@
                 <a:ea typeface="宋体"/>
               </a:rPr>
               <a:pPr/>
-              <a:t>14-9-11</a:t>
+              <a:t>14-9-14</a:t>
             </a:fld>
             <a:endParaRPr lang="zh-CN" altLang="en-US">
               <a:solidFill>
@@ -3508,7 +3508,7 @@
                 <a:ea typeface="宋体"/>
               </a:rPr>
               <a:pPr/>
-              <a:t>14-9-11</a:t>
+              <a:t>14-9-14</a:t>
             </a:fld>
             <a:endParaRPr lang="zh-CN" altLang="en-US">
               <a:solidFill>
@@ -3730,7 +3730,7 @@
                 <a:ea typeface="宋体"/>
               </a:rPr>
               <a:pPr/>
-              <a:t>14-9-11</a:t>
+              <a:t>14-9-14</a:t>
             </a:fld>
             <a:endParaRPr lang="zh-CN" altLang="en-US">
               <a:solidFill>
@@ -4014,7 +4014,7 @@
                 <a:ea typeface="宋体"/>
               </a:rPr>
               <a:pPr/>
-              <a:t>14-9-11</a:t>
+              <a:t>14-9-14</a:t>
             </a:fld>
             <a:endParaRPr lang="zh-CN" altLang="en-US">
               <a:solidFill>
@@ -4226,7 +4226,7 @@
                 <a:ea typeface="宋体"/>
               </a:rPr>
               <a:pPr/>
-              <a:t>14-9-11</a:t>
+              <a:t>14-9-14</a:t>
             </a:fld>
             <a:endParaRPr lang="zh-CN" altLang="en-US">
               <a:solidFill>
@@ -4514,7 +4514,7 @@
                 <a:ea typeface="宋体"/>
               </a:rPr>
               <a:pPr/>
-              <a:t>14-9-11</a:t>
+              <a:t>14-9-14</a:t>
             </a:fld>
             <a:endParaRPr lang="zh-CN" altLang="en-US">
               <a:solidFill>
@@ -4844,7 +4844,7 @@
                 <a:ea typeface="宋体"/>
               </a:rPr>
               <a:pPr/>
-              <a:t>14-9-11</a:t>
+              <a:t>14-9-14</a:t>
             </a:fld>
             <a:endParaRPr lang="zh-CN" altLang="en-US">
               <a:solidFill>
@@ -5308,7 +5308,7 @@
                 <a:ea typeface="宋体"/>
               </a:rPr>
               <a:pPr/>
-              <a:t>14-9-11</a:t>
+              <a:t>14-9-14</a:t>
             </a:fld>
             <a:endParaRPr lang="zh-CN" altLang="en-US">
               <a:solidFill>
@@ -5468,7 +5468,7 @@
                 <a:ea typeface="宋体"/>
               </a:rPr>
               <a:pPr/>
-              <a:t>14-9-11</a:t>
+              <a:t>14-9-14</a:t>
             </a:fld>
             <a:endParaRPr lang="zh-CN" altLang="en-US">
               <a:solidFill>
@@ -5605,7 +5605,7 @@
                 <a:ea typeface="宋体"/>
               </a:rPr>
               <a:pPr/>
-              <a:t>14-9-11</a:t>
+              <a:t>14-9-14</a:t>
             </a:fld>
             <a:endParaRPr lang="zh-CN" altLang="en-US">
               <a:solidFill>
@@ -5884,7 +5884,7 @@
           <a:p>
             <a:fld id="{530820CF-B880-4189-942D-D702A7CBA730}" type="datetimeFigureOut">
               <a:rPr lang="zh-CN" altLang="en-US" smtClean="0"/>
-              <a:t>14-9-11</a:t>
+              <a:t>14-9-14</a:t>
             </a:fld>
             <a:endParaRPr lang="zh-CN" altLang="en-US"/>
           </a:p>
@@ -6165,7 +6165,7 @@
                 <a:ea typeface="宋体"/>
               </a:rPr>
               <a:pPr/>
-              <a:t>14-9-11</a:t>
+              <a:t>14-9-14</a:t>
             </a:fld>
             <a:endParaRPr lang="zh-CN" altLang="en-US">
               <a:solidFill>
@@ -6460,7 +6460,7 @@
                 <a:ea typeface="宋体"/>
               </a:rPr>
               <a:pPr/>
-              <a:t>14-9-11</a:t>
+              <a:t>14-9-14</a:t>
             </a:fld>
             <a:endParaRPr lang="zh-CN" altLang="en-US">
               <a:solidFill>
@@ -6672,7 +6672,7 @@
                 <a:ea typeface="宋体"/>
               </a:rPr>
               <a:pPr/>
-              <a:t>14-9-11</a:t>
+              <a:t>14-9-14</a:t>
             </a:fld>
             <a:endParaRPr lang="zh-CN" altLang="en-US">
               <a:solidFill>
@@ -6894,7 +6894,7 @@
                 <a:ea typeface="宋体"/>
               </a:rPr>
               <a:pPr/>
-              <a:t>14-9-11</a:t>
+              <a:t>14-9-14</a:t>
             </a:fld>
             <a:endParaRPr lang="zh-CN" altLang="en-US">
               <a:solidFill>
@@ -7178,7 +7178,7 @@
                 <a:ea typeface="宋体"/>
               </a:rPr>
               <a:pPr/>
-              <a:t>14-9-11</a:t>
+              <a:t>14-9-14</a:t>
             </a:fld>
             <a:endParaRPr lang="zh-CN" altLang="en-US">
               <a:solidFill>
@@ -7390,7 +7390,7 @@
                 <a:ea typeface="宋体"/>
               </a:rPr>
               <a:pPr/>
-              <a:t>14-9-11</a:t>
+              <a:t>14-9-14</a:t>
             </a:fld>
             <a:endParaRPr lang="zh-CN" altLang="en-US">
               <a:solidFill>
@@ -7678,7 +7678,7 @@
                 <a:ea typeface="宋体"/>
               </a:rPr>
               <a:pPr/>
-              <a:t>14-9-11</a:t>
+              <a:t>14-9-14</a:t>
             </a:fld>
             <a:endParaRPr lang="zh-CN" altLang="en-US">
               <a:solidFill>
@@ -8008,7 +8008,7 @@
                 <a:ea typeface="宋体"/>
               </a:rPr>
               <a:pPr/>
-              <a:t>14-9-11</a:t>
+              <a:t>14-9-14</a:t>
             </a:fld>
             <a:endParaRPr lang="zh-CN" altLang="en-US">
               <a:solidFill>
@@ -8472,7 +8472,7 @@
                 <a:ea typeface="宋体"/>
               </a:rPr>
               <a:pPr/>
-              <a:t>14-9-11</a:t>
+              <a:t>14-9-14</a:t>
             </a:fld>
             <a:endParaRPr lang="zh-CN" altLang="en-US">
               <a:solidFill>
@@ -8632,7 +8632,7 @@
                 <a:ea typeface="宋体"/>
               </a:rPr>
               <a:pPr/>
-              <a:t>14-9-11</a:t>
+              <a:t>14-9-14</a:t>
             </a:fld>
             <a:endParaRPr lang="zh-CN" altLang="en-US">
               <a:solidFill>
@@ -8953,7 +8953,7 @@
           <a:p>
             <a:fld id="{530820CF-B880-4189-942D-D702A7CBA730}" type="datetimeFigureOut">
               <a:rPr lang="zh-CN" altLang="en-US" smtClean="0"/>
-              <a:t>14-9-11</a:t>
+              <a:t>14-9-14</a:t>
             </a:fld>
             <a:endParaRPr lang="zh-CN" altLang="en-US"/>
           </a:p>
@@ -9052,7 +9052,7 @@
                 <a:ea typeface="宋体"/>
               </a:rPr>
               <a:pPr/>
-              <a:t>14-9-11</a:t>
+              <a:t>14-9-14</a:t>
             </a:fld>
             <a:endParaRPr lang="zh-CN" altLang="en-US">
               <a:solidFill>
@@ -9371,7 +9371,7 @@
                 <a:ea typeface="宋体"/>
               </a:rPr>
               <a:pPr/>
-              <a:t>14-9-11</a:t>
+              <a:t>14-9-14</a:t>
             </a:fld>
             <a:endParaRPr lang="zh-CN" altLang="en-US">
               <a:solidFill>
@@ -9666,7 +9666,7 @@
                 <a:ea typeface="宋体"/>
               </a:rPr>
               <a:pPr/>
-              <a:t>14-9-11</a:t>
+              <a:t>14-9-14</a:t>
             </a:fld>
             <a:endParaRPr lang="zh-CN" altLang="en-US">
               <a:solidFill>
@@ -9878,7 +9878,7 @@
                 <a:ea typeface="宋体"/>
               </a:rPr>
               <a:pPr/>
-              <a:t>14-9-11</a:t>
+              <a:t>14-9-14</a:t>
             </a:fld>
             <a:endParaRPr lang="zh-CN" altLang="en-US">
               <a:solidFill>
@@ -10100,7 +10100,7 @@
                 <a:ea typeface="宋体"/>
               </a:rPr>
               <a:pPr/>
-              <a:t>14-9-11</a:t>
+              <a:t>14-9-14</a:t>
             </a:fld>
             <a:endParaRPr lang="zh-CN" altLang="en-US">
               <a:solidFill>
@@ -10384,7 +10384,7 @@
                 <a:ea typeface="宋体"/>
               </a:rPr>
               <a:pPr/>
-              <a:t>14-9-11</a:t>
+              <a:t>14-9-14</a:t>
             </a:fld>
             <a:endParaRPr lang="zh-CN" altLang="en-US">
               <a:solidFill>
@@ -10596,7 +10596,7 @@
                 <a:ea typeface="宋体"/>
               </a:rPr>
               <a:pPr/>
-              <a:t>14-9-11</a:t>
+              <a:t>14-9-14</a:t>
             </a:fld>
             <a:endParaRPr lang="zh-CN" altLang="en-US">
               <a:solidFill>
@@ -10884,7 +10884,7 @@
                 <a:ea typeface="宋体"/>
               </a:rPr>
               <a:pPr/>
-              <a:t>14-9-11</a:t>
+              <a:t>14-9-14</a:t>
             </a:fld>
             <a:endParaRPr lang="zh-CN" altLang="en-US">
               <a:solidFill>
@@ -11214,7 +11214,7 @@
                 <a:ea typeface="宋体"/>
               </a:rPr>
               <a:pPr/>
-              <a:t>14-9-11</a:t>
+              <a:t>14-9-14</a:t>
             </a:fld>
             <a:endParaRPr lang="zh-CN" altLang="en-US">
               <a:solidFill>
@@ -11678,7 +11678,7 @@
                 <a:ea typeface="宋体"/>
               </a:rPr>
               <a:pPr/>
-              <a:t>14-9-11</a:t>
+              <a:t>14-9-14</a:t>
             </a:fld>
             <a:endParaRPr lang="zh-CN" altLang="en-US">
               <a:solidFill>
@@ -12133,7 +12133,7 @@
           <a:p>
             <a:fld id="{530820CF-B880-4189-942D-D702A7CBA730}" type="datetimeFigureOut">
               <a:rPr lang="zh-CN" altLang="en-US" smtClean="0"/>
-              <a:t>14-9-11</a:t>
+              <a:t>14-9-14</a:t>
             </a:fld>
             <a:endParaRPr lang="zh-CN" altLang="en-US"/>
           </a:p>
@@ -12255,7 +12255,7 @@
                 <a:ea typeface="宋体"/>
               </a:rPr>
               <a:pPr/>
-              <a:t>14-9-11</a:t>
+              <a:t>14-9-14</a:t>
             </a:fld>
             <a:endParaRPr lang="zh-CN" altLang="en-US">
               <a:solidFill>
@@ -12392,7 +12392,7 @@
                 <a:ea typeface="宋体"/>
               </a:rPr>
               <a:pPr/>
-              <a:t>14-9-11</a:t>
+              <a:t>14-9-14</a:t>
             </a:fld>
             <a:endParaRPr lang="zh-CN" altLang="en-US">
               <a:solidFill>
@@ -12711,7 +12711,7 @@
                 <a:ea typeface="宋体"/>
               </a:rPr>
               <a:pPr/>
-              <a:t>14-9-11</a:t>
+              <a:t>14-9-14</a:t>
             </a:fld>
             <a:endParaRPr lang="zh-CN" altLang="en-US">
               <a:solidFill>
@@ -13006,7 +13006,7 @@
                 <a:ea typeface="宋体"/>
               </a:rPr>
               <a:pPr/>
-              <a:t>14-9-11</a:t>
+              <a:t>14-9-14</a:t>
             </a:fld>
             <a:endParaRPr lang="zh-CN" altLang="en-US">
               <a:solidFill>
@@ -13218,7 +13218,7 @@
                 <a:ea typeface="宋体"/>
               </a:rPr>
               <a:pPr/>
-              <a:t>14-9-11</a:t>
+              <a:t>14-9-14</a:t>
             </a:fld>
             <a:endParaRPr lang="zh-CN" altLang="en-US">
               <a:solidFill>
@@ -13440,7 +13440,7 @@
                 <a:ea typeface="宋体"/>
               </a:rPr>
               <a:pPr/>
-              <a:t>14-9-11</a:t>
+              <a:t>14-9-14</a:t>
             </a:fld>
             <a:endParaRPr lang="zh-CN" altLang="en-US">
               <a:solidFill>
@@ -13724,7 +13724,7 @@
                 <a:ea typeface="宋体"/>
               </a:rPr>
               <a:pPr/>
-              <a:t>14-9-11</a:t>
+              <a:t>14-9-14</a:t>
             </a:fld>
             <a:endParaRPr lang="zh-CN" altLang="en-US">
               <a:solidFill>
@@ -13936,7 +13936,7 @@
                 <a:ea typeface="宋体"/>
               </a:rPr>
               <a:pPr/>
-              <a:t>14-9-11</a:t>
+              <a:t>14-9-14</a:t>
             </a:fld>
             <a:endParaRPr lang="zh-CN" altLang="en-US">
               <a:solidFill>
@@ -14224,7 +14224,7 @@
                 <a:ea typeface="宋体"/>
               </a:rPr>
               <a:pPr/>
-              <a:t>14-9-11</a:t>
+              <a:t>14-9-14</a:t>
             </a:fld>
             <a:endParaRPr lang="zh-CN" altLang="en-US">
               <a:solidFill>
@@ -14554,7 +14554,7 @@
                 <a:ea typeface="宋体"/>
               </a:rPr>
               <a:pPr/>
-              <a:t>14-9-11</a:t>
+              <a:t>14-9-14</a:t>
             </a:fld>
             <a:endParaRPr lang="zh-CN" altLang="en-US">
               <a:solidFill>
@@ -14705,7 +14705,7 @@
           <a:p>
             <a:fld id="{530820CF-B880-4189-942D-D702A7CBA730}" type="datetimeFigureOut">
               <a:rPr lang="zh-CN" altLang="en-US" smtClean="0"/>
-              <a:t>14-9-11</a:t>
+              <a:t>14-9-14</a:t>
             </a:fld>
             <a:endParaRPr lang="zh-CN" altLang="en-US"/>
           </a:p>
@@ -15131,7 +15131,7 @@
                 <a:ea typeface="宋体"/>
               </a:rPr>
               <a:pPr/>
-              <a:t>14-9-11</a:t>
+              <a:t>14-9-14</a:t>
             </a:fld>
             <a:endParaRPr lang="zh-CN" altLang="en-US">
               <a:solidFill>
@@ -15291,7 +15291,7 @@
                 <a:ea typeface="宋体"/>
               </a:rPr>
               <a:pPr/>
-              <a:t>14-9-11</a:t>
+              <a:t>14-9-14</a:t>
             </a:fld>
             <a:endParaRPr lang="zh-CN" altLang="en-US">
               <a:solidFill>
@@ -15428,7 +15428,7 @@
                 <a:ea typeface="宋体"/>
               </a:rPr>
               <a:pPr/>
-              <a:t>14-9-11</a:t>
+              <a:t>14-9-14</a:t>
             </a:fld>
             <a:endParaRPr lang="zh-CN" altLang="en-US">
               <a:solidFill>
@@ -15747,7 +15747,7 @@
                 <a:ea typeface="宋体"/>
               </a:rPr>
               <a:pPr/>
-              <a:t>14-9-11</a:t>
+              <a:t>14-9-14</a:t>
             </a:fld>
             <a:endParaRPr lang="zh-CN" altLang="en-US">
               <a:solidFill>
@@ -16042,7 +16042,7 @@
                 <a:ea typeface="宋体"/>
               </a:rPr>
               <a:pPr/>
-              <a:t>14-9-11</a:t>
+              <a:t>14-9-14</a:t>
             </a:fld>
             <a:endParaRPr lang="zh-CN" altLang="en-US">
               <a:solidFill>
@@ -16254,7 +16254,7 @@
                 <a:ea typeface="宋体"/>
               </a:rPr>
               <a:pPr/>
-              <a:t>14-9-11</a:t>
+              <a:t>14-9-14</a:t>
             </a:fld>
             <a:endParaRPr lang="zh-CN" altLang="en-US">
               <a:solidFill>
@@ -16476,7 +16476,7 @@
                 <a:ea typeface="宋体"/>
               </a:rPr>
               <a:pPr/>
-              <a:t>14-9-11</a:t>
+              <a:t>14-9-14</a:t>
             </a:fld>
             <a:endParaRPr lang="zh-CN" altLang="en-US">
               <a:solidFill>
@@ -16760,7 +16760,7 @@
                 <a:ea typeface="宋体"/>
               </a:rPr>
               <a:pPr/>
-              <a:t>14-9-11</a:t>
+              <a:t>14-9-14</a:t>
             </a:fld>
             <a:endParaRPr lang="zh-CN" altLang="en-US">
               <a:solidFill>
@@ -16972,7 +16972,7 @@
                 <a:ea typeface="宋体"/>
               </a:rPr>
               <a:pPr/>
-              <a:t>14-9-11</a:t>
+              <a:t>14-9-14</a:t>
             </a:fld>
             <a:endParaRPr lang="zh-CN" altLang="en-US">
               <a:solidFill>
@@ -17260,7 +17260,7 @@
                 <a:ea typeface="宋体"/>
               </a:rPr>
               <a:pPr/>
-              <a:t>14-9-11</a:t>
+              <a:t>14-9-14</a:t>
             </a:fld>
             <a:endParaRPr lang="zh-CN" altLang="en-US">
               <a:solidFill>
@@ -17388,7 +17388,7 @@
           <a:p>
             <a:fld id="{530820CF-B880-4189-942D-D702A7CBA730}" type="datetimeFigureOut">
               <a:rPr lang="zh-CN" altLang="en-US" smtClean="0"/>
-              <a:t>14-9-11</a:t>
+              <a:t>14-9-14</a:t>
             </a:fld>
             <a:endParaRPr lang="zh-CN" altLang="en-US"/>
           </a:p>
@@ -17680,7 +17680,7 @@
                 <a:ea typeface="宋体"/>
               </a:rPr>
               <a:pPr/>
-              <a:t>14-9-11</a:t>
+              <a:t>14-9-14</a:t>
             </a:fld>
             <a:endParaRPr lang="zh-CN" altLang="en-US">
               <a:solidFill>
@@ -18144,7 +18144,7 @@
                 <a:ea typeface="宋体"/>
               </a:rPr>
               <a:pPr/>
-              <a:t>14-9-11</a:t>
+              <a:t>14-9-14</a:t>
             </a:fld>
             <a:endParaRPr lang="zh-CN" altLang="en-US">
               <a:solidFill>
@@ -18304,7 +18304,7 @@
                 <a:ea typeface="宋体"/>
               </a:rPr>
               <a:pPr/>
-              <a:t>14-9-11</a:t>
+              <a:t>14-9-14</a:t>
             </a:fld>
             <a:endParaRPr lang="zh-CN" altLang="en-US">
               <a:solidFill>
@@ -18441,7 +18441,7 @@
                 <a:ea typeface="宋体"/>
               </a:rPr>
               <a:pPr/>
-              <a:t>14-9-11</a:t>
+              <a:t>14-9-14</a:t>
             </a:fld>
             <a:endParaRPr lang="zh-CN" altLang="en-US">
               <a:solidFill>
@@ -18760,7 +18760,7 @@
                 <a:ea typeface="宋体"/>
               </a:rPr>
               <a:pPr/>
-              <a:t>14-9-11</a:t>
+              <a:t>14-9-14</a:t>
             </a:fld>
             <a:endParaRPr lang="zh-CN" altLang="en-US">
               <a:solidFill>
@@ -19055,7 +19055,7 @@
                 <a:ea typeface="宋体"/>
               </a:rPr>
               <a:pPr/>
-              <a:t>14-9-11</a:t>
+              <a:t>14-9-14</a:t>
             </a:fld>
             <a:endParaRPr lang="zh-CN" altLang="en-US">
               <a:solidFill>
@@ -19267,7 +19267,7 @@
                 <a:ea typeface="宋体"/>
               </a:rPr>
               <a:pPr/>
-              <a:t>14-9-11</a:t>
+              <a:t>14-9-14</a:t>
             </a:fld>
             <a:endParaRPr lang="zh-CN" altLang="en-US">
               <a:solidFill>
@@ -19489,7 +19489,7 @@
                 <a:ea typeface="宋体"/>
               </a:rPr>
               <a:pPr/>
-              <a:t>14-9-11</a:t>
+              <a:t>14-9-14</a:t>
             </a:fld>
             <a:endParaRPr lang="zh-CN" altLang="en-US">
               <a:solidFill>
@@ -19773,7 +19773,7 @@
                 <a:ea typeface="宋体"/>
               </a:rPr>
               <a:pPr/>
-              <a:t>14-9-11</a:t>
+              <a:t>14-9-14</a:t>
             </a:fld>
             <a:endParaRPr lang="zh-CN" altLang="en-US">
               <a:solidFill>
@@ -19985,7 +19985,7 @@
                 <a:ea typeface="宋体"/>
               </a:rPr>
               <a:pPr/>
-              <a:t>14-9-11</a:t>
+              <a:t>14-9-14</a:t>
             </a:fld>
             <a:endParaRPr lang="zh-CN" altLang="en-US">
               <a:solidFill>
@@ -20295,7 +20295,7 @@
           <a:p>
             <a:fld id="{530820CF-B880-4189-942D-D702A7CBA730}" type="datetimeFigureOut">
               <a:rPr lang="zh-CN" altLang="en-US" smtClean="0"/>
-              <a:t>14-9-11</a:t>
+              <a:t>14-9-14</a:t>
             </a:fld>
             <a:endParaRPr lang="zh-CN" altLang="en-US"/>
           </a:p>
@@ -20545,7 +20545,7 @@
                 <a:ea typeface="宋体"/>
               </a:rPr>
               <a:pPr/>
-              <a:t>14-9-11</a:t>
+              <a:t>14-9-14</a:t>
             </a:fld>
             <a:endParaRPr lang="zh-CN" altLang="en-US">
               <a:solidFill>
@@ -20875,7 +20875,7 @@
                 <a:ea typeface="宋体"/>
               </a:rPr>
               <a:pPr/>
-              <a:t>14-9-11</a:t>
+              <a:t>14-9-14</a:t>
             </a:fld>
             <a:endParaRPr lang="zh-CN" altLang="en-US">
               <a:solidFill>
@@ -21339,7 +21339,7 @@
                 <a:ea typeface="宋体"/>
               </a:rPr>
               <a:pPr/>
-              <a:t>14-9-11</a:t>
+              <a:t>14-9-14</a:t>
             </a:fld>
             <a:endParaRPr lang="zh-CN" altLang="en-US">
               <a:solidFill>
@@ -21499,7 +21499,7 @@
                 <a:ea typeface="宋体"/>
               </a:rPr>
               <a:pPr/>
-              <a:t>14-9-11</a:t>
+              <a:t>14-9-14</a:t>
             </a:fld>
             <a:endParaRPr lang="zh-CN" altLang="en-US">
               <a:solidFill>
@@ -21636,7 +21636,7 @@
                 <a:ea typeface="宋体"/>
               </a:rPr>
               <a:pPr/>
-              <a:t>14-9-11</a:t>
+              <a:t>14-9-14</a:t>
             </a:fld>
             <a:endParaRPr lang="zh-CN" altLang="en-US">
               <a:solidFill>
@@ -21955,7 +21955,7 @@
                 <a:ea typeface="宋体"/>
               </a:rPr>
               <a:pPr/>
-              <a:t>14-9-11</a:t>
+              <a:t>14-9-14</a:t>
             </a:fld>
             <a:endParaRPr lang="zh-CN" altLang="en-US">
               <a:solidFill>
@@ -22250,7 +22250,7 @@
                 <a:ea typeface="宋体"/>
               </a:rPr>
               <a:pPr/>
-              <a:t>14-9-11</a:t>
+              <a:t>14-9-14</a:t>
             </a:fld>
             <a:endParaRPr lang="zh-CN" altLang="en-US">
               <a:solidFill>
@@ -22462,7 +22462,7 @@
                 <a:ea typeface="宋体"/>
               </a:rPr>
               <a:pPr/>
-              <a:t>14-9-11</a:t>
+              <a:t>14-9-14</a:t>
             </a:fld>
             <a:endParaRPr lang="zh-CN" altLang="en-US">
               <a:solidFill>
@@ -22684,7 +22684,7 @@
                 <a:ea typeface="宋体"/>
               </a:rPr>
               <a:pPr/>
-              <a:t>14-9-11</a:t>
+              <a:t>14-9-14</a:t>
             </a:fld>
             <a:endParaRPr lang="zh-CN" altLang="en-US">
               <a:solidFill>
@@ -22968,7 +22968,7 @@
                 <a:ea typeface="宋体"/>
               </a:rPr>
               <a:pPr/>
-              <a:t>14-9-11</a:t>
+              <a:t>14-9-14</a:t>
             </a:fld>
             <a:endParaRPr lang="zh-CN" altLang="en-US">
               <a:solidFill>
@@ -23254,7 +23254,7 @@
           <a:p>
             <a:fld id="{530820CF-B880-4189-942D-D702A7CBA730}" type="datetimeFigureOut">
               <a:rPr lang="zh-CN" altLang="en-US" smtClean="0"/>
-              <a:t>14-9-11</a:t>
+              <a:t>14-9-14</a:t>
             </a:fld>
             <a:endParaRPr lang="zh-CN" altLang="en-US"/>
           </a:p>
@@ -23428,7 +23428,7 @@
                 <a:ea typeface="宋体"/>
               </a:rPr>
               <a:pPr/>
-              <a:t>14-9-11</a:t>
+              <a:t>14-9-14</a:t>
             </a:fld>
             <a:endParaRPr lang="zh-CN" altLang="en-US">
               <a:solidFill>
@@ -23716,7 +23716,7 @@
                 <a:ea typeface="宋体"/>
               </a:rPr>
               <a:pPr/>
-              <a:t>14-9-11</a:t>
+              <a:t>14-9-14</a:t>
             </a:fld>
             <a:endParaRPr lang="zh-CN" altLang="en-US">
               <a:solidFill>
@@ -24046,7 +24046,7 @@
                 <a:ea typeface="宋体"/>
               </a:rPr>
               <a:pPr/>
-              <a:t>14-9-11</a:t>
+              <a:t>14-9-14</a:t>
             </a:fld>
             <a:endParaRPr lang="zh-CN" altLang="en-US">
               <a:solidFill>
@@ -24510,7 +24510,7 @@
                 <a:ea typeface="宋体"/>
               </a:rPr>
               <a:pPr/>
-              <a:t>14-9-11</a:t>
+              <a:t>14-9-14</a:t>
             </a:fld>
             <a:endParaRPr lang="zh-CN" altLang="en-US">
               <a:solidFill>
@@ -24670,7 +24670,7 @@
                 <a:ea typeface="宋体"/>
               </a:rPr>
               <a:pPr/>
-              <a:t>14-9-11</a:t>
+              <a:t>14-9-14</a:t>
             </a:fld>
             <a:endParaRPr lang="zh-CN" altLang="en-US">
               <a:solidFill>
@@ -24807,7 +24807,7 @@
                 <a:ea typeface="宋体"/>
               </a:rPr>
               <a:pPr/>
-              <a:t>14-9-11</a:t>
+              <a:t>14-9-14</a:t>
             </a:fld>
             <a:endParaRPr lang="zh-CN" altLang="en-US">
               <a:solidFill>
@@ -25126,7 +25126,7 @@
                 <a:ea typeface="宋体"/>
               </a:rPr>
               <a:pPr/>
-              <a:t>14-9-11</a:t>
+              <a:t>14-9-14</a:t>
             </a:fld>
             <a:endParaRPr lang="zh-CN" altLang="en-US">
               <a:solidFill>
@@ -25421,7 +25421,7 @@
                 <a:ea typeface="宋体"/>
               </a:rPr>
               <a:pPr/>
-              <a:t>14-9-11</a:t>
+              <a:t>14-9-14</a:t>
             </a:fld>
             <a:endParaRPr lang="zh-CN" altLang="en-US">
               <a:solidFill>
@@ -25633,7 +25633,7 @@
                 <a:ea typeface="宋体"/>
               </a:rPr>
               <a:pPr/>
-              <a:t>14-9-11</a:t>
+              <a:t>14-9-14</a:t>
             </a:fld>
             <a:endParaRPr lang="zh-CN" altLang="en-US">
               <a:solidFill>
@@ -25855,7 +25855,7 @@
                 <a:ea typeface="宋体"/>
               </a:rPr>
               <a:pPr/>
-              <a:t>14-9-11</a:t>
+              <a:t>14-9-14</a:t>
             </a:fld>
             <a:endParaRPr lang="zh-CN" altLang="en-US">
               <a:solidFill>
@@ -26101,7 +26101,7 @@
           <a:p>
             <a:fld id="{530820CF-B880-4189-942D-D702A7CBA730}" type="datetimeFigureOut">
               <a:rPr lang="zh-CN" altLang="en-US" smtClean="0"/>
-              <a:t>14-9-11</a:t>
+              <a:t>14-9-14</a:t>
             </a:fld>
             <a:endParaRPr lang="zh-CN" altLang="en-US"/>
           </a:p>
@@ -26615,7 +26615,7 @@
                 <a:ea typeface="宋体"/>
               </a:rPr>
               <a:pPr/>
-              <a:t>14-9-11</a:t>
+              <a:t>14-9-14</a:t>
             </a:fld>
             <a:endParaRPr lang="zh-CN" altLang="en-US">
               <a:solidFill>
@@ -27167,7 +27167,7 @@
                 <a:ea typeface="宋体"/>
               </a:rPr>
               <a:pPr/>
-              <a:t>14-9-11</a:t>
+              <a:t>14-9-14</a:t>
             </a:fld>
             <a:endParaRPr lang="zh-CN" altLang="en-US">
               <a:solidFill>
@@ -27719,7 +27719,7 @@
                 <a:ea typeface="宋体"/>
               </a:rPr>
               <a:pPr/>
-              <a:t>14-9-11</a:t>
+              <a:t>14-9-14</a:t>
             </a:fld>
             <a:endParaRPr lang="zh-CN" altLang="en-US">
               <a:solidFill>
@@ -28271,7 +28271,7 @@
                 <a:ea typeface="宋体"/>
               </a:rPr>
               <a:pPr/>
-              <a:t>14-9-11</a:t>
+              <a:t>14-9-14</a:t>
             </a:fld>
             <a:endParaRPr lang="zh-CN" altLang="en-US">
               <a:solidFill>
@@ -28823,7 +28823,7 @@
                 <a:ea typeface="宋体"/>
               </a:rPr>
               <a:pPr/>
-              <a:t>14-9-11</a:t>
+              <a:t>14-9-14</a:t>
             </a:fld>
             <a:endParaRPr lang="zh-CN" altLang="en-US">
               <a:solidFill>
@@ -29375,7 +29375,7 @@
                 <a:ea typeface="宋体"/>
               </a:rPr>
               <a:pPr/>
-              <a:t>14-9-11</a:t>
+              <a:t>14-9-14</a:t>
             </a:fld>
             <a:endParaRPr lang="zh-CN" altLang="en-US">
               <a:solidFill>
@@ -29927,7 +29927,7 @@
                 <a:ea typeface="宋体"/>
               </a:rPr>
               <a:pPr/>
-              <a:t>14-9-11</a:t>
+              <a:t>14-9-14</a:t>
             </a:fld>
             <a:endParaRPr lang="zh-CN" altLang="en-US">
               <a:solidFill>
@@ -30479,7 +30479,7 @@
                 <a:ea typeface="宋体"/>
               </a:rPr>
               <a:pPr/>
-              <a:t>14-9-11</a:t>
+              <a:t>14-9-14</a:t>
             </a:fld>
             <a:endParaRPr lang="zh-CN" altLang="en-US">
               <a:solidFill>
@@ -32270,11 +32270,7 @@
           <a:p>
             <a:r>
               <a:rPr lang="en-US" altLang="zh-CN" dirty="0" smtClean="0"/>
-              <a:t>※ </a:t>
-            </a:r>
-            <a:r>
-              <a:rPr lang="en-US" altLang="zh-CN" dirty="0" smtClean="0"/>
-              <a:t>Sort</a:t>
+              <a:t>※ Sort</a:t>
             </a:r>
             <a:r>
               <a:rPr lang="en-US" altLang="zh-CN" dirty="0"/>
@@ -33136,6 +33132,30 @@
           <a:xfrm>
             <a:off x="827584" y="2204864"/>
             <a:ext cx="5588334" cy="3240360"/>
+          </a:xfrm>
+          <a:prstGeom prst="rect">
+            <a:avLst/>
+          </a:prstGeom>
+        </p:spPr>
+      </p:pic>
+      <p:pic>
+        <p:nvPicPr>
+          <p:cNvPr id="11" name="图片 10"/>
+          <p:cNvPicPr>
+            <a:picLocks noChangeAspect="1"/>
+          </p:cNvPicPr>
+          <p:nvPr/>
+        </p:nvPicPr>
+        <p:blipFill>
+          <a:blip r:embed="rId4"/>
+          <a:stretch>
+            <a:fillRect/>
+          </a:stretch>
+        </p:blipFill>
+        <p:spPr>
+          <a:xfrm>
+            <a:off x="6515303" y="4437112"/>
+            <a:ext cx="2638979" cy="1875901"/>
           </a:xfrm>
           <a:prstGeom prst="rect">
             <a:avLst/>
@@ -33272,7 +33292,11 @@
           <a:p>
             <a:r>
               <a:rPr lang="en-US" altLang="zh-CN" dirty="0"/>
-              <a:t>dimensionality reduction</a:t>
+              <a:t>dimensionality </a:t>
+            </a:r>
+            <a:r>
+              <a:rPr lang="en-US" altLang="zh-CN" dirty="0" smtClean="0"/>
+              <a:t>reduction</a:t>
             </a:r>
             <a:endParaRPr lang="zh-CN" altLang="en-US" dirty="0"/>
           </a:p>
@@ -33486,6 +33510,57 @@
           </a:prstGeom>
         </p:spPr>
       </p:pic>
+      <p:sp>
+        <p:nvSpPr>
+          <p:cNvPr id="15" name="矩形 14"/>
+          <p:cNvSpPr/>
+          <p:nvPr/>
+        </p:nvSpPr>
+        <p:spPr>
+          <a:xfrm>
+            <a:off x="2915816" y="5589240"/>
+            <a:ext cx="3006080" cy="646331"/>
+          </a:xfrm>
+          <a:prstGeom prst="rect">
+            <a:avLst/>
+          </a:prstGeom>
+        </p:spPr>
+        <p:style>
+          <a:lnRef idx="3">
+            <a:schemeClr val="lt1"/>
+          </a:lnRef>
+          <a:fillRef idx="1">
+            <a:schemeClr val="accent1"/>
+          </a:fillRef>
+          <a:effectRef idx="1">
+            <a:schemeClr val="accent1"/>
+          </a:effectRef>
+          <a:fontRef idx="minor">
+            <a:schemeClr val="lt1"/>
+          </a:fontRef>
+        </p:style>
+        <p:txBody>
+          <a:bodyPr wrap="square">
+            <a:spAutoFit/>
+          </a:bodyPr>
+          <a:lstStyle/>
+          <a:p>
+            <a:pPr algn="ctr"/>
+            <a:r>
+              <a:rPr lang="en-US" altLang="zh-CN" dirty="0"/>
+              <a:t>feature extraction supported:</a:t>
+            </a:r>
+          </a:p>
+          <a:p>
+            <a:pPr algn="ctr"/>
+            <a:r>
+              <a:rPr lang="en-US" altLang="zh-CN" dirty="0"/>
+              <a:t>Word2Vec , TF-IDF</a:t>
+            </a:r>
+            <a:endParaRPr lang="zh-CN" altLang="en-US" dirty="0"/>
+          </a:p>
+        </p:txBody>
+      </p:sp>
     </p:spTree>
     <p:extLst>
       <p:ext uri="{BB962C8B-B14F-4D97-AF65-F5344CB8AC3E}">
@@ -34419,7 +34494,7 @@
         </p:blipFill>
         <p:spPr>
           <a:xfrm>
-            <a:off x="395536" y="1772816"/>
+            <a:off x="611560" y="1772816"/>
             <a:ext cx="8172400" cy="4045055"/>
           </a:xfrm>
         </p:spPr>
@@ -36733,7 +36808,6 @@
               <a:rPr lang="en-US" altLang="zh-CN" b="1" dirty="0"/>
               <a:t>released Spark 1.1</a:t>
             </a:r>
-            <a:endParaRPr lang="en-US" altLang="zh-CN" b="1" dirty="0"/>
           </a:p>
         </p:txBody>
       </p:sp>

</xml_diff>

<commit_message>
add new cache --- unroll partition safely
</commit_message>
<xml_diff>
--- a/SACC2014/SACC2014.pptx
+++ b/SACC2014/SACC2014.pptx
@@ -38646,6 +38646,51 @@
               <a:latin typeface="Calibri"/>
               <a:ea typeface="宋体"/>
             </a:endParaRPr>
+          </a:p>
+        </p:txBody>
+      </p:sp>
+      <p:sp>
+        <p:nvSpPr>
+          <p:cNvPr id="3" name="矩形 2"/>
+          <p:cNvSpPr/>
+          <p:nvPr/>
+        </p:nvSpPr>
+        <p:spPr>
+          <a:xfrm>
+            <a:off x="3059832" y="5661248"/>
+            <a:ext cx="3532638" cy="369332"/>
+          </a:xfrm>
+          <a:prstGeom prst="rect">
+            <a:avLst/>
+          </a:prstGeom>
+        </p:spPr>
+        <p:style>
+          <a:lnRef idx="2">
+            <a:schemeClr val="accent1">
+              <a:shade val="50000"/>
+            </a:schemeClr>
+          </a:lnRef>
+          <a:fillRef idx="1">
+            <a:schemeClr val="accent1"/>
+          </a:fillRef>
+          <a:effectRef idx="0">
+            <a:schemeClr val="accent1"/>
+          </a:effectRef>
+          <a:fontRef idx="minor">
+            <a:schemeClr val="lt1"/>
+          </a:fontRef>
+        </p:style>
+        <p:txBody>
+          <a:bodyPr wrap="none">
+            <a:spAutoFit/>
+          </a:bodyPr>
+          <a:lstStyle/>
+          <a:p>
+            <a:r>
+              <a:rPr lang="en-US" altLang="zh-CN" dirty="0"/>
+              <a:t>unroll partition safely when caching</a:t>
+            </a:r>
+            <a:endParaRPr lang="zh-CN" altLang="en-US" dirty="0"/>
           </a:p>
         </p:txBody>
       </p:sp>

</xml_diff>

<commit_message>
Programmatically Specifying the Schema
</commit_message>
<xml_diff>
--- a/SACC2014/SACC2014.pptx
+++ b/SACC2014/SACC2014.pptx
@@ -143,7 +143,7 @@
   </p:defaultTextStyle>
   <p:extLst>
     <p:ext uri="{EFAFB233-063F-42B5-8137-9DF3F51BA10A}">
-      <p15:sldGuideLst xmlns:p15="http://schemas.microsoft.com/office/powerpoint/2012/main" xmlns="">
+      <p15:sldGuideLst xmlns="" xmlns:p15="http://schemas.microsoft.com/office/powerpoint/2012/main">
         <p15:guide id="1" orient="horz" pos="2160">
           <p15:clr>
             <a:srgbClr val="A4A3A4"/>
@@ -35256,6 +35256,52 @@
               <a:latin typeface="Calibri"/>
               <a:ea typeface="宋体"/>
             </a:endParaRPr>
+          </a:p>
+        </p:txBody>
+      </p:sp>
+      <p:sp>
+        <p:nvSpPr>
+          <p:cNvPr id="4" name="矩形 3"/>
+          <p:cNvSpPr/>
+          <p:nvPr/>
+        </p:nvSpPr>
+        <p:spPr>
+          <a:xfrm>
+            <a:off x="2051720" y="5301208"/>
+            <a:ext cx="4680520" cy="369332"/>
+          </a:xfrm>
+          <a:prstGeom prst="rect">
+            <a:avLst/>
+          </a:prstGeom>
+        </p:spPr>
+        <p:style>
+          <a:lnRef idx="2">
+            <a:schemeClr val="accent1">
+              <a:shade val="50000"/>
+            </a:schemeClr>
+          </a:lnRef>
+          <a:fillRef idx="1">
+            <a:schemeClr val="accent1"/>
+          </a:fillRef>
+          <a:effectRef idx="0">
+            <a:schemeClr val="accent1"/>
+          </a:effectRef>
+          <a:fontRef idx="minor">
+            <a:schemeClr val="lt1"/>
+          </a:fontRef>
+        </p:style>
+        <p:txBody>
+          <a:bodyPr wrap="square">
+            <a:spAutoFit/>
+          </a:bodyPr>
+          <a:lstStyle/>
+          <a:p>
+            <a:pPr algn="ctr"/>
+            <a:r>
+              <a:rPr lang="en-US" altLang="zh-CN" dirty="0"/>
+              <a:t>Programmatically Specifying the Schema</a:t>
+            </a:r>
+            <a:endParaRPr lang="zh-CN" altLang="en-US" dirty="0"/>
           </a:p>
         </p:txBody>
       </p:sp>

</xml_diff>